<commit_message>
Updated presentation, added quiz.
</commit_message>
<xml_diff>
--- a/Aplikacja pogodowa na Androida.pptx
+++ b/Aplikacja pogodowa na Androida.pptx
@@ -16,7 +16,12 @@
     <p:sldId id="263" r:id="rId10"/>
     <p:sldId id="265" r:id="rId11"/>
     <p:sldId id="266" r:id="rId12"/>
-    <p:sldId id="267" r:id="rId13"/>
+    <p:sldId id="273" r:id="rId13"/>
+    <p:sldId id="267" r:id="rId14"/>
+    <p:sldId id="268" r:id="rId15"/>
+    <p:sldId id="269" r:id="rId16"/>
+    <p:sldId id="270" r:id="rId17"/>
+    <p:sldId id="272" r:id="rId18"/>
   </p:sldIdLst>
   <p:sldSz cx="12192000" cy="6858000"/>
   <p:notesSz cx="6858000" cy="9144000"/>
@@ -115,7 +120,332 @@
       </a:defRPr>
     </a:lvl9pPr>
   </p:defaultTextStyle>
+  <p:extLst>
+    <p:ext uri="{EFAFB233-063F-42B5-8137-9DF3F51BA10A}">
+      <p15:sldGuideLst xmlns:p15="http://schemas.microsoft.com/office/powerpoint/2012/main"/>
+    </p:ext>
+  </p:extLst>
 </p:presentation>
+</file>
+
+<file path=ppt/revisionInfo.xml><?xml version="1.0" encoding="utf-8"?>
+<p1510:revInfo xmlns:a="http://schemas.openxmlformats.org/drawingml/2006/main" xmlns:r="http://schemas.openxmlformats.org/officeDocument/2006/relationships" xmlns:p1510="http://schemas.microsoft.com/office/powerpoint/2015/10/main">
+  <p1510:revLst>
+    <p1510:client id="{EE9FE3F3-00D8-8CBD-E79C-73E334440792}" v="311" dt="2024-05-04T09:50:22.287"/>
+    <p1510:client id="{F36797D2-35CD-C12F-47BF-616E2B702B19}" v="2" dt="2024-05-04T08:47:48.111"/>
+  </p1510:revLst>
+</p1510:revInfo>
+</file>
+
+<file path=ppt/changesInfos/changesInfo1.xml><?xml version="1.0" encoding="utf-8"?>
+<pc:chgInfo xmlns:a="http://schemas.openxmlformats.org/drawingml/2006/main" xmlns:r="http://schemas.openxmlformats.org/officeDocument/2006/relationships" xmlns:ac="http://schemas.microsoft.com/office/drawing/2013/main/command" xmlns:pc="http://schemas.microsoft.com/office/powerpoint/2013/main/command">
+  <pc:docChgLst>
+    <pc:chgData name="Jakub Wiatr" userId="S::jwiatr@student.agh.edu.pl::c51b12c6-656a-4510-9a8b-8a6a353c1a14" providerId="AD" clId="Web-{F36797D2-35CD-C12F-47BF-616E2B702B19}"/>
+    <pc:docChg chg="addSld">
+      <pc:chgData name="Jakub Wiatr" userId="S::jwiatr@student.agh.edu.pl::c51b12c6-656a-4510-9a8b-8a6a353c1a14" providerId="AD" clId="Web-{F36797D2-35CD-C12F-47BF-616E2B702B19}" dt="2024-05-04T08:47:48.111" v="1"/>
+      <pc:docMkLst>
+        <pc:docMk/>
+      </pc:docMkLst>
+      <pc:sldChg chg="new">
+        <pc:chgData name="Jakub Wiatr" userId="S::jwiatr@student.agh.edu.pl::c51b12c6-656a-4510-9a8b-8a6a353c1a14" providerId="AD" clId="Web-{F36797D2-35CD-C12F-47BF-616E2B702B19}" dt="2024-05-04T08:47:45.627" v="0"/>
+        <pc:sldMkLst>
+          <pc:docMk/>
+          <pc:sldMk cId="3212077194" sldId="268"/>
+        </pc:sldMkLst>
+      </pc:sldChg>
+      <pc:sldChg chg="new">
+        <pc:chgData name="Jakub Wiatr" userId="S::jwiatr@student.agh.edu.pl::c51b12c6-656a-4510-9a8b-8a6a353c1a14" providerId="AD" clId="Web-{F36797D2-35CD-C12F-47BF-616E2B702B19}" dt="2024-05-04T08:47:48.111" v="1"/>
+        <pc:sldMkLst>
+          <pc:docMk/>
+          <pc:sldMk cId="2508872199" sldId="269"/>
+        </pc:sldMkLst>
+      </pc:sldChg>
+    </pc:docChg>
+  </pc:docChgLst>
+  <pc:docChgLst>
+    <pc:chgData name="Jakub Wiatr" userId="S::jwiatr@student.agh.edu.pl::c51b12c6-656a-4510-9a8b-8a6a353c1a14" providerId="AD" clId="Web-{EE9FE3F3-00D8-8CBD-E79C-73E334440792}"/>
+    <pc:docChg chg="addSld delSld modSld sldOrd">
+      <pc:chgData name="Jakub Wiatr" userId="S::jwiatr@student.agh.edu.pl::c51b12c6-656a-4510-9a8b-8a6a353c1a14" providerId="AD" clId="Web-{EE9FE3F3-00D8-8CBD-E79C-73E334440792}" dt="2024-05-04T09:50:20.240" v="243" actId="20577"/>
+      <pc:docMkLst>
+        <pc:docMk/>
+      </pc:docMkLst>
+      <pc:sldChg chg="modSp">
+        <pc:chgData name="Jakub Wiatr" userId="S::jwiatr@student.agh.edu.pl::c51b12c6-656a-4510-9a8b-8a6a353c1a14" providerId="AD" clId="Web-{EE9FE3F3-00D8-8CBD-E79C-73E334440792}" dt="2024-05-04T09:50:20.240" v="243" actId="20577"/>
+        <pc:sldMkLst>
+          <pc:docMk/>
+          <pc:sldMk cId="3212077194" sldId="268"/>
+        </pc:sldMkLst>
+        <pc:spChg chg="mod">
+          <ac:chgData name="Jakub Wiatr" userId="S::jwiatr@student.agh.edu.pl::c51b12c6-656a-4510-9a8b-8a6a353c1a14" providerId="AD" clId="Web-{EE9FE3F3-00D8-8CBD-E79C-73E334440792}" dt="2024-05-04T09:50:20.240" v="243" actId="20577"/>
+          <ac:spMkLst>
+            <pc:docMk/>
+            <pc:sldMk cId="3212077194" sldId="268"/>
+            <ac:spMk id="3" creationId="{7E187508-2999-E309-638E-2BE9C68B01B8}"/>
+          </ac:spMkLst>
+        </pc:spChg>
+      </pc:sldChg>
+      <pc:sldChg chg="addSp delSp modSp">
+        <pc:chgData name="Jakub Wiatr" userId="S::jwiatr@student.agh.edu.pl::c51b12c6-656a-4510-9a8b-8a6a353c1a14" providerId="AD" clId="Web-{EE9FE3F3-00D8-8CBD-E79C-73E334440792}" dt="2024-05-04T09:33:29.142" v="123" actId="1076"/>
+        <pc:sldMkLst>
+          <pc:docMk/>
+          <pc:sldMk cId="2508872199" sldId="269"/>
+        </pc:sldMkLst>
+        <pc:spChg chg="mod">
+          <ac:chgData name="Jakub Wiatr" userId="S::jwiatr@student.agh.edu.pl::c51b12c6-656a-4510-9a8b-8a6a353c1a14" providerId="AD" clId="Web-{EE9FE3F3-00D8-8CBD-E79C-73E334440792}" dt="2024-05-04T09:31:46.248" v="97" actId="20577"/>
+          <ac:spMkLst>
+            <pc:docMk/>
+            <pc:sldMk cId="2508872199" sldId="269"/>
+            <ac:spMk id="2" creationId="{26A9AB5A-4272-F863-AFED-718BB9082247}"/>
+          </ac:spMkLst>
+        </pc:spChg>
+        <pc:spChg chg="del">
+          <ac:chgData name="Jakub Wiatr" userId="S::jwiatr@student.agh.edu.pl::c51b12c6-656a-4510-9a8b-8a6a353c1a14" providerId="AD" clId="Web-{EE9FE3F3-00D8-8CBD-E79C-73E334440792}" dt="2024-05-04T09:31:59.233" v="98"/>
+          <ac:spMkLst>
+            <pc:docMk/>
+            <pc:sldMk cId="2508872199" sldId="269"/>
+            <ac:spMk id="3" creationId="{024D161E-AE13-1344-4842-6E1D6E4545C4}"/>
+          </ac:spMkLst>
+        </pc:spChg>
+        <pc:spChg chg="add mod">
+          <ac:chgData name="Jakub Wiatr" userId="S::jwiatr@student.agh.edu.pl::c51b12c6-656a-4510-9a8b-8a6a353c1a14" providerId="AD" clId="Web-{EE9FE3F3-00D8-8CBD-E79C-73E334440792}" dt="2024-05-04T09:33:29.142" v="123" actId="1076"/>
+          <ac:spMkLst>
+            <pc:docMk/>
+            <pc:sldMk cId="2508872199" sldId="269"/>
+            <ac:spMk id="11" creationId="{C6B66A61-1AE6-58F7-74B5-9473BA81C8E4}"/>
+          </ac:spMkLst>
+        </pc:spChg>
+        <pc:picChg chg="add del">
+          <ac:chgData name="Jakub Wiatr" userId="S::jwiatr@student.agh.edu.pl::c51b12c6-656a-4510-9a8b-8a6a353c1a14" providerId="AD" clId="Web-{EE9FE3F3-00D8-8CBD-E79C-73E334440792}" dt="2024-05-04T09:26:15.911" v="83"/>
+          <ac:picMkLst>
+            <pc:docMk/>
+            <pc:sldMk cId="2508872199" sldId="269"/>
+            <ac:picMk id="5" creationId="{0B2ECDE6-1D95-F909-9763-59BC1CB827FA}"/>
+          </ac:picMkLst>
+        </pc:picChg>
+        <pc:picChg chg="add mod">
+          <ac:chgData name="Jakub Wiatr" userId="S::jwiatr@student.agh.edu.pl::c51b12c6-656a-4510-9a8b-8a6a353c1a14" providerId="AD" clId="Web-{EE9FE3F3-00D8-8CBD-E79C-73E334440792}" dt="2024-05-04T09:31:36.061" v="88" actId="1076"/>
+          <ac:picMkLst>
+            <pc:docMk/>
+            <pc:sldMk cId="2508872199" sldId="269"/>
+            <ac:picMk id="7" creationId="{FEA52D90-C60C-8660-6CE6-1F1151981E32}"/>
+          </ac:picMkLst>
+        </pc:picChg>
+        <pc:picChg chg="add mod ord">
+          <ac:chgData name="Jakub Wiatr" userId="S::jwiatr@student.agh.edu.pl::c51b12c6-656a-4510-9a8b-8a6a353c1a14" providerId="AD" clId="Web-{EE9FE3F3-00D8-8CBD-E79C-73E334440792}" dt="2024-05-04T09:33:24.298" v="122" actId="1076"/>
+          <ac:picMkLst>
+            <pc:docMk/>
+            <pc:sldMk cId="2508872199" sldId="269"/>
+            <ac:picMk id="8" creationId="{2C308CAF-9E8B-A3A1-8693-E270C47C6245}"/>
+          </ac:picMkLst>
+        </pc:picChg>
+        <pc:picChg chg="add del mod">
+          <ac:chgData name="Jakub Wiatr" userId="S::jwiatr@student.agh.edu.pl::c51b12c6-656a-4510-9a8b-8a6a353c1a14" providerId="AD" clId="Web-{EE9FE3F3-00D8-8CBD-E79C-73E334440792}" dt="2024-05-04T09:32:57.907" v="103"/>
+          <ac:picMkLst>
+            <pc:docMk/>
+            <pc:sldMk cId="2508872199" sldId="269"/>
+            <ac:picMk id="9" creationId="{34AD5B6D-9766-6B62-564F-8131A2A396FD}"/>
+          </ac:picMkLst>
+        </pc:picChg>
+      </pc:sldChg>
+      <pc:sldChg chg="addSp delSp modSp new">
+        <pc:chgData name="Jakub Wiatr" userId="S::jwiatr@student.agh.edu.pl::c51b12c6-656a-4510-9a8b-8a6a353c1a14" providerId="AD" clId="Web-{EE9FE3F3-00D8-8CBD-E79C-73E334440792}" dt="2024-05-04T09:37:14.414" v="136"/>
+        <pc:sldMkLst>
+          <pc:docMk/>
+          <pc:sldMk cId="911334357" sldId="270"/>
+        </pc:sldMkLst>
+        <pc:spChg chg="mod">
+          <ac:chgData name="Jakub Wiatr" userId="S::jwiatr@student.agh.edu.pl::c51b12c6-656a-4510-9a8b-8a6a353c1a14" providerId="AD" clId="Web-{EE9FE3F3-00D8-8CBD-E79C-73E334440792}" dt="2024-05-04T09:34:53.051" v="131" actId="20577"/>
+          <ac:spMkLst>
+            <pc:docMk/>
+            <pc:sldMk cId="911334357" sldId="270"/>
+            <ac:spMk id="2" creationId="{7290EBE8-B550-D4D8-353A-E08A4B838078}"/>
+          </ac:spMkLst>
+        </pc:spChg>
+        <pc:spChg chg="del">
+          <ac:chgData name="Jakub Wiatr" userId="S::jwiatr@student.agh.edu.pl::c51b12c6-656a-4510-9a8b-8a6a353c1a14" providerId="AD" clId="Web-{EE9FE3F3-00D8-8CBD-E79C-73E334440792}" dt="2024-05-04T09:34:55.113" v="132"/>
+          <ac:spMkLst>
+            <pc:docMk/>
+            <pc:sldMk cId="911334357" sldId="270"/>
+            <ac:spMk id="3" creationId="{D1E21A4C-9927-5D6A-AD25-364D36F71B3D}"/>
+          </ac:spMkLst>
+        </pc:spChg>
+        <pc:spChg chg="add del mod">
+          <ac:chgData name="Jakub Wiatr" userId="S::jwiatr@student.agh.edu.pl::c51b12c6-656a-4510-9a8b-8a6a353c1a14" providerId="AD" clId="Web-{EE9FE3F3-00D8-8CBD-E79C-73E334440792}" dt="2024-05-04T09:37:14.414" v="136"/>
+          <ac:spMkLst>
+            <pc:docMk/>
+            <pc:sldMk cId="911334357" sldId="270"/>
+            <ac:spMk id="6" creationId="{51D52DC9-95DD-C441-527F-32B80C9F6A26}"/>
+          </ac:spMkLst>
+        </pc:spChg>
+        <pc:picChg chg="add del mod ord">
+          <ac:chgData name="Jakub Wiatr" userId="S::jwiatr@student.agh.edu.pl::c51b12c6-656a-4510-9a8b-8a6a353c1a14" providerId="AD" clId="Web-{EE9FE3F3-00D8-8CBD-E79C-73E334440792}" dt="2024-05-04T09:37:13.492" v="135"/>
+          <ac:picMkLst>
+            <pc:docMk/>
+            <pc:sldMk cId="911334357" sldId="270"/>
+            <ac:picMk id="4" creationId="{B56F782E-B5AA-E21C-0F87-B5DEB74AEF55}"/>
+          </ac:picMkLst>
+        </pc:picChg>
+        <pc:picChg chg="add mod ord">
+          <ac:chgData name="Jakub Wiatr" userId="S::jwiatr@student.agh.edu.pl::c51b12c6-656a-4510-9a8b-8a6a353c1a14" providerId="AD" clId="Web-{EE9FE3F3-00D8-8CBD-E79C-73E334440792}" dt="2024-05-04T09:37:14.414" v="136"/>
+          <ac:picMkLst>
+            <pc:docMk/>
+            <pc:sldMk cId="911334357" sldId="270"/>
+            <ac:picMk id="7" creationId="{A01C630D-94E9-B72D-ED54-6318120A5604}"/>
+          </ac:picMkLst>
+        </pc:picChg>
+      </pc:sldChg>
+      <pc:sldChg chg="modSp new del">
+        <pc:chgData name="Jakub Wiatr" userId="S::jwiatr@student.agh.edu.pl::c51b12c6-656a-4510-9a8b-8a6a353c1a14" providerId="AD" clId="Web-{EE9FE3F3-00D8-8CBD-E79C-73E334440792}" dt="2024-05-04T09:39:10.542" v="151"/>
+        <pc:sldMkLst>
+          <pc:docMk/>
+          <pc:sldMk cId="282242530" sldId="271"/>
+        </pc:sldMkLst>
+        <pc:spChg chg="mod">
+          <ac:chgData name="Jakub Wiatr" userId="S::jwiatr@student.agh.edu.pl::c51b12c6-656a-4510-9a8b-8a6a353c1a14" providerId="AD" clId="Web-{EE9FE3F3-00D8-8CBD-E79C-73E334440792}" dt="2024-05-04T09:38:53.620" v="148" actId="20577"/>
+          <ac:spMkLst>
+            <pc:docMk/>
+            <pc:sldMk cId="282242530" sldId="271"/>
+            <ac:spMk id="2" creationId="{BDAC9BBA-4238-6D65-FE89-42E82A766FA7}"/>
+          </ac:spMkLst>
+        </pc:spChg>
+        <pc:spChg chg="mod">
+          <ac:chgData name="Jakub Wiatr" userId="S::jwiatr@student.agh.edu.pl::c51b12c6-656a-4510-9a8b-8a6a353c1a14" providerId="AD" clId="Web-{EE9FE3F3-00D8-8CBD-E79C-73E334440792}" dt="2024-05-04T09:38:39.088" v="143" actId="1076"/>
+          <ac:spMkLst>
+            <pc:docMk/>
+            <pc:sldMk cId="282242530" sldId="271"/>
+            <ac:spMk id="3" creationId="{682EF403-11E3-64D6-7EF6-85DADA703CCD}"/>
+          </ac:spMkLst>
+        </pc:spChg>
+      </pc:sldChg>
+      <pc:sldChg chg="modSp add ord replId">
+        <pc:chgData name="Jakub Wiatr" userId="S::jwiatr@student.agh.edu.pl::c51b12c6-656a-4510-9a8b-8a6a353c1a14" providerId="AD" clId="Web-{EE9FE3F3-00D8-8CBD-E79C-73E334440792}" dt="2024-05-04T09:41:40.469" v="169" actId="20577"/>
+        <pc:sldMkLst>
+          <pc:docMk/>
+          <pc:sldMk cId="2399576122" sldId="272"/>
+        </pc:sldMkLst>
+        <pc:spChg chg="mod">
+          <ac:chgData name="Jakub Wiatr" userId="S::jwiatr@student.agh.edu.pl::c51b12c6-656a-4510-9a8b-8a6a353c1a14" providerId="AD" clId="Web-{EE9FE3F3-00D8-8CBD-E79C-73E334440792}" dt="2024-05-04T09:41:40.469" v="169" actId="20577"/>
+          <ac:spMkLst>
+            <pc:docMk/>
+            <pc:sldMk cId="2399576122" sldId="272"/>
+            <ac:spMk id="2" creationId="{4652AB7B-027D-C765-D4EA-D50A06A0C5C0}"/>
+          </ac:spMkLst>
+        </pc:spChg>
+        <pc:spChg chg="mod">
+          <ac:chgData name="Jakub Wiatr" userId="S::jwiatr@student.agh.edu.pl::c51b12c6-656a-4510-9a8b-8a6a353c1a14" providerId="AD" clId="Web-{EE9FE3F3-00D8-8CBD-E79C-73E334440792}" dt="2024-05-04T09:39:33.074" v="161" actId="1076"/>
+          <ac:spMkLst>
+            <pc:docMk/>
+            <pc:sldMk cId="2399576122" sldId="272"/>
+            <ac:spMk id="3" creationId="{B621761A-B99C-DD9C-B836-6A1354073E4A}"/>
+          </ac:spMkLst>
+        </pc:spChg>
+      </pc:sldChg>
+      <pc:sldChg chg="addSp delSp modSp add replId">
+        <pc:chgData name="Jakub Wiatr" userId="S::jwiatr@student.agh.edu.pl::c51b12c6-656a-4510-9a8b-8a6a353c1a14" providerId="AD" clId="Web-{EE9FE3F3-00D8-8CBD-E79C-73E334440792}" dt="2024-05-04T09:48:08.987" v="231" actId="20577"/>
+        <pc:sldMkLst>
+          <pc:docMk/>
+          <pc:sldMk cId="268790272" sldId="273"/>
+        </pc:sldMkLst>
+        <pc:spChg chg="mod">
+          <ac:chgData name="Jakub Wiatr" userId="S::jwiatr@student.agh.edu.pl::c51b12c6-656a-4510-9a8b-8a6a353c1a14" providerId="AD" clId="Web-{EE9FE3F3-00D8-8CBD-E79C-73E334440792}" dt="2024-05-04T09:45:27.760" v="175" actId="20577"/>
+          <ac:spMkLst>
+            <pc:docMk/>
+            <pc:sldMk cId="268790272" sldId="273"/>
+            <ac:spMk id="2" creationId="{7C3786DF-1EE8-6CD9-807B-CDD38FC38E4C}"/>
+          </ac:spMkLst>
+        </pc:spChg>
+        <pc:spChg chg="add del mod">
+          <ac:chgData name="Jakub Wiatr" userId="S::jwiatr@student.agh.edu.pl::c51b12c6-656a-4510-9a8b-8a6a353c1a14" providerId="AD" clId="Web-{EE9FE3F3-00D8-8CBD-E79C-73E334440792}" dt="2024-05-04T09:47:34.173" v="190"/>
+          <ac:spMkLst>
+            <pc:docMk/>
+            <pc:sldMk cId="268790272" sldId="273"/>
+            <ac:spMk id="7" creationId="{762EAFCF-4C21-03E2-0C1B-760AA2BFB219}"/>
+          </ac:spMkLst>
+        </pc:spChg>
+        <pc:spChg chg="del">
+          <ac:chgData name="Jakub Wiatr" userId="S::jwiatr@student.agh.edu.pl::c51b12c6-656a-4510-9a8b-8a6a353c1a14" providerId="AD" clId="Web-{EE9FE3F3-00D8-8CBD-E79C-73E334440792}" dt="2024-05-04T09:45:40.229" v="178"/>
+          <ac:spMkLst>
+            <pc:docMk/>
+            <pc:sldMk cId="268790272" sldId="273"/>
+            <ac:spMk id="8" creationId="{4FD8C83E-EF7C-99FA-E008-E63BBEE99F7A}"/>
+          </ac:spMkLst>
+        </pc:spChg>
+        <pc:spChg chg="add mod">
+          <ac:chgData name="Jakub Wiatr" userId="S::jwiatr@student.agh.edu.pl::c51b12c6-656a-4510-9a8b-8a6a353c1a14" providerId="AD" clId="Web-{EE9FE3F3-00D8-8CBD-E79C-73E334440792}" dt="2024-05-04T09:48:08.987" v="231" actId="20577"/>
+          <ac:spMkLst>
+            <pc:docMk/>
+            <pc:sldMk cId="268790272" sldId="273"/>
+            <ac:spMk id="14" creationId="{5091A99C-5E3C-1808-BBF1-D92ABF5132F9}"/>
+          </ac:spMkLst>
+        </pc:spChg>
+        <pc:picChg chg="add del mod ord">
+          <ac:chgData name="Jakub Wiatr" userId="S::jwiatr@student.agh.edu.pl::c51b12c6-656a-4510-9a8b-8a6a353c1a14" providerId="AD" clId="Web-{EE9FE3F3-00D8-8CBD-E79C-73E334440792}" dt="2024-05-04T09:45:49.730" v="182"/>
+          <ac:picMkLst>
+            <pc:docMk/>
+            <pc:sldMk cId="268790272" sldId="273"/>
+            <ac:picMk id="3" creationId="{2FDDC180-F28D-A2BA-FE8F-11878BF16D42}"/>
+          </ac:picMkLst>
+        </pc:picChg>
+        <pc:picChg chg="add mod">
+          <ac:chgData name="Jakub Wiatr" userId="S::jwiatr@student.agh.edu.pl::c51b12c6-656a-4510-9a8b-8a6a353c1a14" providerId="AD" clId="Web-{EE9FE3F3-00D8-8CBD-E79C-73E334440792}" dt="2024-05-04T09:47:23.548" v="188" actId="1076"/>
+          <ac:picMkLst>
+            <pc:docMk/>
+            <pc:sldMk cId="268790272" sldId="273"/>
+            <ac:picMk id="4" creationId="{DC9A3371-662D-8E21-4911-B35D7DF57824}"/>
+          </ac:picMkLst>
+        </pc:picChg>
+        <pc:picChg chg="del">
+          <ac:chgData name="Jakub Wiatr" userId="S::jwiatr@student.agh.edu.pl::c51b12c6-656a-4510-9a8b-8a6a353c1a14" providerId="AD" clId="Web-{EE9FE3F3-00D8-8CBD-E79C-73E334440792}" dt="2024-05-04T09:45:29.744" v="176"/>
+          <ac:picMkLst>
+            <pc:docMk/>
+            <pc:sldMk cId="268790272" sldId="273"/>
+            <ac:picMk id="6" creationId="{C00CB891-72AA-F225-D104-F3D79DD36056}"/>
+          </ac:picMkLst>
+        </pc:picChg>
+        <pc:picChg chg="del">
+          <ac:chgData name="Jakub Wiatr" userId="S::jwiatr@student.agh.edu.pl::c51b12c6-656a-4510-9a8b-8a6a353c1a14" providerId="AD" clId="Web-{EE9FE3F3-00D8-8CBD-E79C-73E334440792}" dt="2024-05-04T09:45:42.307" v="179"/>
+          <ac:picMkLst>
+            <pc:docMk/>
+            <pc:sldMk cId="268790272" sldId="273"/>
+            <ac:picMk id="9" creationId="{D9322B17-6DB4-7511-90C1-81FA9245460F}"/>
+          </ac:picMkLst>
+        </pc:picChg>
+        <pc:picChg chg="add del mod ord">
+          <ac:chgData name="Jakub Wiatr" userId="S::jwiatr@student.agh.edu.pl::c51b12c6-656a-4510-9a8b-8a6a353c1a14" providerId="AD" clId="Web-{EE9FE3F3-00D8-8CBD-E79C-73E334440792}" dt="2024-05-04T09:47:24.735" v="189"/>
+          <ac:picMkLst>
+            <pc:docMk/>
+            <pc:sldMk cId="268790272" sldId="273"/>
+            <ac:picMk id="10" creationId="{B8432494-BEEC-1D47-CA7D-FAFB047575F7}"/>
+          </ac:picMkLst>
+        </pc:picChg>
+        <pc:picChg chg="add mod ord">
+          <ac:chgData name="Jakub Wiatr" userId="S::jwiatr@student.agh.edu.pl::c51b12c6-656a-4510-9a8b-8a6a353c1a14" providerId="AD" clId="Web-{EE9FE3F3-00D8-8CBD-E79C-73E334440792}" dt="2024-05-04T09:47:34.173" v="190"/>
+          <ac:picMkLst>
+            <pc:docMk/>
+            <pc:sldMk cId="268790272" sldId="273"/>
+            <ac:picMk id="11" creationId="{0217CD34-D9AF-9F0B-AC44-A47AEF1EB428}"/>
+          </ac:picMkLst>
+        </pc:picChg>
+        <pc:picChg chg="add mod">
+          <ac:chgData name="Jakub Wiatr" userId="S::jwiatr@student.agh.edu.pl::c51b12c6-656a-4510-9a8b-8a6a353c1a14" providerId="AD" clId="Web-{EE9FE3F3-00D8-8CBD-E79C-73E334440792}" dt="2024-05-04T09:47:43.861" v="192" actId="1076"/>
+          <ac:picMkLst>
+            <pc:docMk/>
+            <pc:sldMk cId="268790272" sldId="273"/>
+            <ac:picMk id="12" creationId="{5E9C0772-05D9-6521-8F21-D2291EE376D9}"/>
+          </ac:picMkLst>
+        </pc:picChg>
+        <pc:picChg chg="del">
+          <ac:chgData name="Jakub Wiatr" userId="S::jwiatr@student.agh.edu.pl::c51b12c6-656a-4510-9a8b-8a6a353c1a14" providerId="AD" clId="Web-{EE9FE3F3-00D8-8CBD-E79C-73E334440792}" dt="2024-05-04T09:45:30.338" v="177"/>
+          <ac:picMkLst>
+            <pc:docMk/>
+            <pc:sldMk cId="268790272" sldId="273"/>
+            <ac:picMk id="13" creationId="{6758111E-0A7C-DBE4-CB5A-0A010FB3AEB9}"/>
+          </ac:picMkLst>
+        </pc:picChg>
+      </pc:sldChg>
+    </pc:docChg>
+  </pc:docChgLst>
+</pc:chgInfo>
 </file>
 
 <file path=ppt/slideLayouts/slideLayout1.xml><?xml version="1.0" encoding="utf-8"?>
@@ -303,7 +633,7 @@
           <a:p>
             <a:fld id="{3CBA437C-320B-41BD-8D25-7EE00E3E3CF4}" type="datetimeFigureOut">
               <a:rPr lang="pl-PL" smtClean="0"/>
-              <a:t>30.04.2024</a:t>
+              <a:t>04.05.2024</a:t>
             </a:fld>
             <a:endParaRPr lang="pl-PL"/>
           </a:p>
@@ -601,7 +931,7 @@
           <a:p>
             <a:fld id="{3CBA437C-320B-41BD-8D25-7EE00E3E3CF4}" type="datetimeFigureOut">
               <a:rPr lang="pl-PL" smtClean="0"/>
-              <a:t>30.04.2024</a:t>
+              <a:t>04.05.2024</a:t>
             </a:fld>
             <a:endParaRPr lang="pl-PL"/>
           </a:p>
@@ -793,7 +1123,7 @@
           <a:p>
             <a:fld id="{3CBA437C-320B-41BD-8D25-7EE00E3E3CF4}" type="datetimeFigureOut">
               <a:rPr lang="pl-PL" smtClean="0"/>
-              <a:t>30.04.2024</a:t>
+              <a:t>04.05.2024</a:t>
             </a:fld>
             <a:endParaRPr lang="pl-PL"/>
           </a:p>
@@ -1054,7 +1384,7 @@
           <a:p>
             <a:fld id="{3CBA437C-320B-41BD-8D25-7EE00E3E3CF4}" type="datetimeFigureOut">
               <a:rPr lang="pl-PL" smtClean="0"/>
-              <a:t>30.04.2024</a:t>
+              <a:t>04.05.2024</a:t>
             </a:fld>
             <a:endParaRPr lang="pl-PL"/>
           </a:p>
@@ -1478,7 +1808,7 @@
           <a:p>
             <a:fld id="{3CBA437C-320B-41BD-8D25-7EE00E3E3CF4}" type="datetimeFigureOut">
               <a:rPr lang="pl-PL" smtClean="0"/>
-              <a:t>30.04.2024</a:t>
+              <a:t>04.05.2024</a:t>
             </a:fld>
             <a:endParaRPr lang="pl-PL"/>
           </a:p>
@@ -2015,7 +2345,7 @@
           <a:p>
             <a:fld id="{3CBA437C-320B-41BD-8D25-7EE00E3E3CF4}" type="datetimeFigureOut">
               <a:rPr lang="pl-PL" smtClean="0"/>
-              <a:t>30.04.2024</a:t>
+              <a:t>04.05.2024</a:t>
             </a:fld>
             <a:endParaRPr lang="pl-PL"/>
           </a:p>
@@ -2879,7 +3209,7 @@
           <a:p>
             <a:fld id="{3CBA437C-320B-41BD-8D25-7EE00E3E3CF4}" type="datetimeFigureOut">
               <a:rPr lang="pl-PL" smtClean="0"/>
-              <a:t>30.04.2024</a:t>
+              <a:t>04.05.2024</a:t>
             </a:fld>
             <a:endParaRPr lang="pl-PL"/>
           </a:p>
@@ -3049,7 +3379,7 @@
           <a:p>
             <a:fld id="{3CBA437C-320B-41BD-8D25-7EE00E3E3CF4}" type="datetimeFigureOut">
               <a:rPr lang="pl-PL" smtClean="0"/>
-              <a:t>30.04.2024</a:t>
+              <a:t>04.05.2024</a:t>
             </a:fld>
             <a:endParaRPr lang="pl-PL"/>
           </a:p>
@@ -3233,7 +3563,7 @@
           <a:p>
             <a:fld id="{3CBA437C-320B-41BD-8D25-7EE00E3E3CF4}" type="datetimeFigureOut">
               <a:rPr lang="pl-PL" smtClean="0"/>
-              <a:t>30.04.2024</a:t>
+              <a:t>04.05.2024</a:t>
             </a:fld>
             <a:endParaRPr lang="pl-PL"/>
           </a:p>
@@ -3403,7 +3733,7 @@
           <a:p>
             <a:fld id="{3CBA437C-320B-41BD-8D25-7EE00E3E3CF4}" type="datetimeFigureOut">
               <a:rPr lang="pl-PL" smtClean="0"/>
-              <a:t>30.04.2024</a:t>
+              <a:t>04.05.2024</a:t>
             </a:fld>
             <a:endParaRPr lang="pl-PL"/>
           </a:p>
@@ -3647,7 +3977,7 @@
           <a:p>
             <a:fld id="{3CBA437C-320B-41BD-8D25-7EE00E3E3CF4}" type="datetimeFigureOut">
               <a:rPr lang="pl-PL" smtClean="0"/>
-              <a:t>30.04.2024</a:t>
+              <a:t>04.05.2024</a:t>
             </a:fld>
             <a:endParaRPr lang="pl-PL"/>
           </a:p>
@@ -3883,7 +4213,7 @@
           <a:p>
             <a:fld id="{3CBA437C-320B-41BD-8D25-7EE00E3E3CF4}" type="datetimeFigureOut">
               <a:rPr lang="pl-PL" smtClean="0"/>
-              <a:t>30.04.2024</a:t>
+              <a:t>04.05.2024</a:t>
             </a:fld>
             <a:endParaRPr lang="pl-PL"/>
           </a:p>
@@ -4349,7 +4679,7 @@
           <a:p>
             <a:fld id="{3CBA437C-320B-41BD-8D25-7EE00E3E3CF4}" type="datetimeFigureOut">
               <a:rPr lang="pl-PL" smtClean="0"/>
-              <a:t>30.04.2024</a:t>
+              <a:t>04.05.2024</a:t>
             </a:fld>
             <a:endParaRPr lang="pl-PL"/>
           </a:p>
@@ -4467,7 +4797,7 @@
           <a:p>
             <a:fld id="{3CBA437C-320B-41BD-8D25-7EE00E3E3CF4}" type="datetimeFigureOut">
               <a:rPr lang="pl-PL" smtClean="0"/>
-              <a:t>30.04.2024</a:t>
+              <a:t>04.05.2024</a:t>
             </a:fld>
             <a:endParaRPr lang="pl-PL"/>
           </a:p>
@@ -4562,7 +4892,7 @@
           <a:p>
             <a:fld id="{3CBA437C-320B-41BD-8D25-7EE00E3E3CF4}" type="datetimeFigureOut">
               <a:rPr lang="pl-PL" smtClean="0"/>
-              <a:t>30.04.2024</a:t>
+              <a:t>04.05.2024</a:t>
             </a:fld>
             <a:endParaRPr lang="pl-PL"/>
           </a:p>
@@ -4817,7 +5147,7 @@
           <a:p>
             <a:fld id="{3CBA437C-320B-41BD-8D25-7EE00E3E3CF4}" type="datetimeFigureOut">
               <a:rPr lang="pl-PL" smtClean="0"/>
-              <a:t>30.04.2024</a:t>
+              <a:t>04.05.2024</a:t>
             </a:fld>
             <a:endParaRPr lang="pl-PL"/>
           </a:p>
@@ -5117,7 +5447,7 @@
           <a:p>
             <a:fld id="{3CBA437C-320B-41BD-8D25-7EE00E3E3CF4}" type="datetimeFigureOut">
               <a:rPr lang="pl-PL" smtClean="0"/>
-              <a:t>30.04.2024</a:t>
+              <a:t>04.05.2024</a:t>
             </a:fld>
             <a:endParaRPr lang="pl-PL"/>
           </a:p>
@@ -5351,7 +5681,7 @@
           <a:p>
             <a:fld id="{3CBA437C-320B-41BD-8D25-7EE00E3E3CF4}" type="datetimeFigureOut">
               <a:rPr lang="pl-PL" smtClean="0"/>
-              <a:t>30.04.2024</a:t>
+              <a:t>04.05.2024</a:t>
             </a:fld>
             <a:endParaRPr lang="pl-PL"/>
           </a:p>
@@ -6579,6 +6909,191 @@
           <p:cNvPr id="2" name="Title 1">
             <a:extLst>
               <a:ext uri="{FF2B5EF4-FFF2-40B4-BE49-F238E27FC236}">
+                <a16:creationId xmlns:a16="http://schemas.microsoft.com/office/drawing/2014/main" id="{7C3786DF-1EE8-6CD9-807B-CDD38FC38E4C}"/>
+              </a:ext>
+            </a:extLst>
+          </p:cNvPr>
+          <p:cNvSpPr>
+            <a:spLocks noGrp="1"/>
+          </p:cNvSpPr>
+          <p:nvPr>
+            <p:ph type="title"/>
+          </p:nvPr>
+        </p:nvSpPr>
+        <p:spPr/>
+        <p:txBody>
+          <a:bodyPr/>
+          <a:lstStyle/>
+          <a:p>
+            <a:r>
+              <a:rPr lang="pl-PL" dirty="0"/>
+              <a:t>Przykłady funkcji</a:t>
+            </a:r>
+          </a:p>
+        </p:txBody>
+      </p:sp>
+      <p:pic>
+        <p:nvPicPr>
+          <p:cNvPr id="4" name="Obraz 3" descr="Obraz zawierający zrzut ekranu, tekst, Czcionka&#10;&#10;Opis wygenerowany automatycznie">
+            <a:extLst>
+              <a:ext uri="{FF2B5EF4-FFF2-40B4-BE49-F238E27FC236}">
+                <a16:creationId xmlns:a16="http://schemas.microsoft.com/office/drawing/2014/main" id="{DC9A3371-662D-8E21-4911-B35D7DF57824}"/>
+              </a:ext>
+            </a:extLst>
+          </p:cNvPr>
+          <p:cNvPicPr>
+            <a:picLocks noChangeAspect="1"/>
+          </p:cNvPicPr>
+          <p:nvPr/>
+        </p:nvPicPr>
+        <p:blipFill>
+          <a:blip r:embed="rId2"/>
+          <a:stretch>
+            <a:fillRect/>
+          </a:stretch>
+        </p:blipFill>
+        <p:spPr>
+          <a:xfrm>
+            <a:off x="1043502" y="1737154"/>
+            <a:ext cx="10341833" cy="1694935"/>
+          </a:xfrm>
+          <a:prstGeom prst="rect">
+            <a:avLst/>
+          </a:prstGeom>
+        </p:spPr>
+      </p:pic>
+      <p:pic>
+        <p:nvPicPr>
+          <p:cNvPr id="11" name="Symbol zastępczy zawartości 10" descr="Obraz zawierający tekst, zrzut ekranu, Czcionka&#10;&#10;Opis wygenerowany automatycznie">
+            <a:extLst>
+              <a:ext uri="{FF2B5EF4-FFF2-40B4-BE49-F238E27FC236}">
+                <a16:creationId xmlns:a16="http://schemas.microsoft.com/office/drawing/2014/main" id="{0217CD34-D9AF-9F0B-AC44-A47AEF1EB428}"/>
+              </a:ext>
+            </a:extLst>
+          </p:cNvPr>
+          <p:cNvPicPr>
+            <a:picLocks noGrp="1" noChangeAspect="1"/>
+          </p:cNvPicPr>
+          <p:nvPr>
+            <p:ph idx="1"/>
+          </p:nvPr>
+        </p:nvPicPr>
+        <p:blipFill>
+          <a:blip r:embed="rId3"/>
+          <a:stretch>
+            <a:fillRect/>
+          </a:stretch>
+        </p:blipFill>
+        <p:spPr>
+          <a:xfrm>
+            <a:off x="1507735" y="8493304"/>
+            <a:ext cx="5191125" cy="1266825"/>
+          </a:xfrm>
+        </p:spPr>
+      </p:pic>
+      <p:pic>
+        <p:nvPicPr>
+          <p:cNvPr id="12" name="Obraz 11" descr="Obraz zawierający tekst, zrzut ekranu, Czcionka&#10;&#10;Opis wygenerowany automatycznie">
+            <a:extLst>
+              <a:ext uri="{FF2B5EF4-FFF2-40B4-BE49-F238E27FC236}">
+                <a16:creationId xmlns:a16="http://schemas.microsoft.com/office/drawing/2014/main" id="{5E9C0772-05D9-6521-8F21-D2291EE376D9}"/>
+              </a:ext>
+            </a:extLst>
+          </p:cNvPr>
+          <p:cNvPicPr>
+            <a:picLocks noChangeAspect="1"/>
+          </p:cNvPicPr>
+          <p:nvPr/>
+        </p:nvPicPr>
+        <p:blipFill>
+          <a:blip r:embed="rId3"/>
+          <a:stretch>
+            <a:fillRect/>
+          </a:stretch>
+        </p:blipFill>
+        <p:spPr>
+          <a:xfrm>
+            <a:off x="915815" y="4144533"/>
+            <a:ext cx="5191125" cy="1266825"/>
+          </a:xfrm>
+          <a:prstGeom prst="rect">
+            <a:avLst/>
+          </a:prstGeom>
+        </p:spPr>
+      </p:pic>
+      <p:sp>
+        <p:nvSpPr>
+          <p:cNvPr id="14" name="pole tekstowe 13">
+            <a:extLst>
+              <a:ext uri="{FF2B5EF4-FFF2-40B4-BE49-F238E27FC236}">
+                <a16:creationId xmlns:a16="http://schemas.microsoft.com/office/drawing/2014/main" id="{5091A99C-5E3C-1808-BBF1-D92ABF5132F9}"/>
+              </a:ext>
+            </a:extLst>
+          </p:cNvPr>
+          <p:cNvSpPr txBox="1"/>
+          <p:nvPr/>
+        </p:nvSpPr>
+        <p:spPr>
+          <a:xfrm>
+            <a:off x="8279027" y="4015946"/>
+            <a:ext cx="1637270" cy="1477328"/>
+          </a:xfrm>
+          <a:prstGeom prst="rect">
+            <a:avLst/>
+          </a:prstGeom>
+          <a:noFill/>
+        </p:spPr>
+        <p:txBody>
+          <a:bodyPr rot="0" spcFirstLastPara="0" vertOverflow="overflow" horzOverflow="overflow" vert="horz" wrap="square" lIns="91440" tIns="45720" rIns="91440" bIns="45720" numCol="1" spcCol="0" rtlCol="0" fromWordArt="0" anchor="t" anchorCtr="0" forceAA="0" compatLnSpc="1">
+            <a:prstTxWarp prst="textNoShape">
+              <a:avLst/>
+            </a:prstTxWarp>
+            <a:spAutoFit/>
+          </a:bodyPr>
+          <a:lstStyle/>
+          <a:p>
+            <a:r>
+              <a:rPr lang="pl-PL" dirty="0"/>
+              <a:t>Tu dodam drugi sposób dodania funkcji do guzika</a:t>
+            </a:r>
+          </a:p>
+        </p:txBody>
+      </p:sp>
+    </p:spTree>
+    <p:extLst>
+      <p:ext uri="{BB962C8B-B14F-4D97-AF65-F5344CB8AC3E}">
+        <p14:creationId xmlns:p14="http://schemas.microsoft.com/office/powerpoint/2010/main" val="268790272"/>
+      </p:ext>
+    </p:extLst>
+  </p:cSld>
+  <p:clrMapOvr>
+    <a:masterClrMapping/>
+  </p:clrMapOvr>
+</p:sld>
+</file>
+
+<file path=ppt/slides/slide13.xml><?xml version="1.0" encoding="utf-8"?>
+<p:sld xmlns:a="http://schemas.openxmlformats.org/drawingml/2006/main" xmlns:r="http://schemas.openxmlformats.org/officeDocument/2006/relationships" xmlns:p="http://schemas.openxmlformats.org/presentationml/2006/main">
+  <p:cSld>
+    <p:spTree>
+      <p:nvGrpSpPr>
+        <p:cNvPr id="1" name=""/>
+        <p:cNvGrpSpPr/>
+        <p:nvPr/>
+      </p:nvGrpSpPr>
+      <p:grpSpPr>
+        <a:xfrm>
+          <a:off x="0" y="0"/>
+          <a:ext cx="0" cy="0"/>
+          <a:chOff x="0" y="0"/>
+          <a:chExt cx="0" cy="0"/>
+        </a:xfrm>
+      </p:grpSpPr>
+      <p:sp>
+        <p:nvSpPr>
+          <p:cNvPr id="2" name="Title 1">
+            <a:extLst>
+              <a:ext uri="{FF2B5EF4-FFF2-40B4-BE49-F238E27FC236}">
                 <a16:creationId xmlns:a16="http://schemas.microsoft.com/office/drawing/2014/main" id="{3C95D18D-1890-238C-500E-7B0313447585}"/>
               </a:ext>
             </a:extLst>
@@ -6733,6 +7248,913 @@
     <p:extLst>
       <p:ext uri="{BB962C8B-B14F-4D97-AF65-F5344CB8AC3E}">
         <p14:creationId xmlns:p14="http://schemas.microsoft.com/office/powerpoint/2010/main" val="1344183901"/>
+      </p:ext>
+    </p:extLst>
+  </p:cSld>
+  <p:clrMapOvr>
+    <a:masterClrMapping/>
+  </p:clrMapOvr>
+</p:sld>
+</file>
+
+<file path=ppt/slides/slide14.xml><?xml version="1.0" encoding="utf-8"?>
+<p:sld xmlns:a="http://schemas.openxmlformats.org/drawingml/2006/main" xmlns:r="http://schemas.openxmlformats.org/officeDocument/2006/relationships" xmlns:p="http://schemas.openxmlformats.org/presentationml/2006/main">
+  <p:cSld>
+    <p:spTree>
+      <p:nvGrpSpPr>
+        <p:cNvPr id="1" name=""/>
+        <p:cNvGrpSpPr/>
+        <p:nvPr/>
+      </p:nvGrpSpPr>
+      <p:grpSpPr>
+        <a:xfrm>
+          <a:off x="0" y="0"/>
+          <a:ext cx="0" cy="0"/>
+          <a:chOff x="0" y="0"/>
+          <a:chExt cx="0" cy="0"/>
+        </a:xfrm>
+      </p:grpSpPr>
+      <p:sp>
+        <p:nvSpPr>
+          <p:cNvPr id="2" name="Tytuł 1">
+            <a:extLst>
+              <a:ext uri="{FF2B5EF4-FFF2-40B4-BE49-F238E27FC236}">
+                <a16:creationId xmlns:a16="http://schemas.microsoft.com/office/drawing/2014/main" id="{16DF0D97-7848-D1BF-A6ED-41F4B2A7BCE2}"/>
+              </a:ext>
+            </a:extLst>
+          </p:cNvPr>
+          <p:cNvSpPr>
+            <a:spLocks noGrp="1"/>
+          </p:cNvSpPr>
+          <p:nvPr>
+            <p:ph type="title"/>
+          </p:nvPr>
+        </p:nvSpPr>
+        <p:spPr/>
+        <p:txBody>
+          <a:bodyPr/>
+          <a:lstStyle/>
+          <a:p>
+            <a:endParaRPr lang="pl-PL"/>
+          </a:p>
+        </p:txBody>
+      </p:sp>
+      <p:sp>
+        <p:nvSpPr>
+          <p:cNvPr id="3" name="Symbol zastępczy zawartości 2">
+            <a:extLst>
+              <a:ext uri="{FF2B5EF4-FFF2-40B4-BE49-F238E27FC236}">
+                <a16:creationId xmlns:a16="http://schemas.microsoft.com/office/drawing/2014/main" id="{7E187508-2999-E309-638E-2BE9C68B01B8}"/>
+              </a:ext>
+            </a:extLst>
+          </p:cNvPr>
+          <p:cNvSpPr>
+            <a:spLocks noGrp="1"/>
+          </p:cNvSpPr>
+          <p:nvPr>
+            <p:ph idx="1"/>
+          </p:nvPr>
+        </p:nvSpPr>
+        <p:spPr/>
+        <p:txBody>
+          <a:bodyPr/>
+          <a:lstStyle/>
+          <a:p>
+            <a:pPr indent="-305435"/>
+            <a:r>
+              <a:rPr lang="pl-PL" dirty="0">
+                <a:ln>
+                  <a:solidFill>
+                    <a:prstClr val="black">
+                      <a:lumMod val="75000"/>
+                      <a:lumOff val="25000"/>
+                      <a:alpha val="10000"/>
+                    </a:prstClr>
+                  </a:solidFill>
+                </a:ln>
+                <a:effectLst>
+                  <a:outerShdw blurRad="9525" dist="25400" dir="14640000" algn="tl" rotWithShape="0">
+                    <a:prstClr val="black">
+                      <a:alpha val="30000"/>
+                    </a:prstClr>
+                  </a:outerShdw>
+                </a:effectLst>
+              </a:rPr>
+              <a:t>Tu cos daj o tym </a:t>
+            </a:r>
+            <a:r>
+              <a:rPr lang="pl-PL" dirty="0" err="1">
+                <a:ln>
+                  <a:solidFill>
+                    <a:prstClr val="black">
+                      <a:lumMod val="75000"/>
+                      <a:lumOff val="25000"/>
+                      <a:alpha val="10000"/>
+                    </a:prstClr>
+                  </a:solidFill>
+                </a:ln>
+                <a:effectLst>
+                  <a:outerShdw blurRad="9525" dist="25400" dir="14640000" algn="tl" rotWithShape="0">
+                    <a:prstClr val="black">
+                      <a:alpha val="30000"/>
+                    </a:prstClr>
+                  </a:outerShdw>
+                </a:effectLst>
+              </a:rPr>
+              <a:t>api</a:t>
+            </a:r>
+            <a:r>
+              <a:rPr lang="pl-PL" dirty="0">
+                <a:ln>
+                  <a:solidFill>
+                    <a:prstClr val="black">
+                      <a:lumMod val="75000"/>
+                      <a:lumOff val="25000"/>
+                      <a:alpha val="10000"/>
+                    </a:prstClr>
+                  </a:solidFill>
+                </a:ln>
+                <a:effectLst>
+                  <a:outerShdw blurRad="9525" dist="25400" dir="14640000" algn="tl" rotWithShape="0">
+                    <a:prstClr val="black">
+                      <a:alpha val="30000"/>
+                    </a:prstClr>
+                  </a:outerShdw>
+                </a:effectLst>
+              </a:rPr>
+              <a:t> które </a:t>
+            </a:r>
+            <a:r>
+              <a:rPr lang="pl-PL" dirty="0" err="1">
+                <a:ln>
+                  <a:solidFill>
+                    <a:prstClr val="black">
+                      <a:lumMod val="75000"/>
+                      <a:lumOff val="25000"/>
+                      <a:alpha val="10000"/>
+                    </a:prstClr>
+                  </a:solidFill>
+                </a:ln>
+                <a:effectLst>
+                  <a:outerShdw blurRad="9525" dist="25400" dir="14640000" algn="tl" rotWithShape="0">
+                    <a:prstClr val="black">
+                      <a:alpha val="30000"/>
+                    </a:prstClr>
+                  </a:outerShdw>
+                </a:effectLst>
+              </a:rPr>
+              <a:t>wybralismy</a:t>
+            </a:r>
+            <a:r>
+              <a:rPr lang="pl-PL" dirty="0">
+                <a:ln>
+                  <a:solidFill>
+                    <a:prstClr val="black">
+                      <a:lumMod val="75000"/>
+                      <a:lumOff val="25000"/>
+                      <a:alpha val="10000"/>
+                    </a:prstClr>
+                  </a:solidFill>
+                </a:ln>
+                <a:effectLst>
+                  <a:outerShdw blurRad="9525" dist="25400" dir="14640000" algn="tl" rotWithShape="0">
+                    <a:prstClr val="black">
+                      <a:alpha val="30000"/>
+                    </a:prstClr>
+                  </a:outerShdw>
+                </a:effectLst>
+              </a:rPr>
+              <a:t> jak </a:t>
+            </a:r>
+            <a:r>
+              <a:rPr lang="pl-PL" dirty="0" err="1">
+                <a:ln>
+                  <a:solidFill>
+                    <a:prstClr val="black">
+                      <a:lumMod val="75000"/>
+                      <a:lumOff val="25000"/>
+                      <a:alpha val="10000"/>
+                    </a:prstClr>
+                  </a:solidFill>
+                </a:ln>
+                <a:effectLst>
+                  <a:outerShdw blurRad="9525" dist="25400" dir="14640000" algn="tl" rotWithShape="0">
+                    <a:prstClr val="black">
+                      <a:alpha val="30000"/>
+                    </a:prstClr>
+                  </a:outerShdw>
+                </a:effectLst>
+              </a:rPr>
+              <a:t>dziala</a:t>
+            </a:r>
+            <a:r>
+              <a:rPr lang="pl-PL" dirty="0">
+                <a:ln>
+                  <a:solidFill>
+                    <a:prstClr val="black">
+                      <a:lumMod val="75000"/>
+                      <a:lumOff val="25000"/>
+                      <a:alpha val="10000"/>
+                    </a:prstClr>
+                  </a:solidFill>
+                </a:ln>
+                <a:effectLst>
+                  <a:outerShdw blurRad="9525" dist="25400" dir="14640000" algn="tl" rotWithShape="0">
+                    <a:prstClr val="black">
+                      <a:alpha val="30000"/>
+                    </a:prstClr>
+                  </a:outerShdw>
+                </a:effectLst>
+              </a:rPr>
+              <a:t> tam razem z tym jak te </a:t>
+            </a:r>
+            <a:r>
+              <a:rPr lang="pl-PL" dirty="0" err="1">
+                <a:ln>
+                  <a:solidFill>
+                    <a:prstClr val="black">
+                      <a:lumMod val="75000"/>
+                      <a:lumOff val="25000"/>
+                      <a:alpha val="10000"/>
+                    </a:prstClr>
+                  </a:solidFill>
+                </a:ln>
+                <a:effectLst>
+                  <a:outerShdw blurRad="9525" dist="25400" dir="14640000" algn="tl" rotWithShape="0">
+                    <a:prstClr val="black">
+                      <a:alpha val="30000"/>
+                    </a:prstClr>
+                  </a:outerShdw>
+                </a:effectLst>
+              </a:rPr>
+              <a:t>wspolrzedne</a:t>
+            </a:r>
+            <a:r>
+              <a:rPr lang="pl-PL" dirty="0">
+                <a:ln>
+                  <a:solidFill>
+                    <a:prstClr val="black">
+                      <a:lumMod val="75000"/>
+                      <a:lumOff val="25000"/>
+                      <a:alpha val="10000"/>
+                    </a:prstClr>
+                  </a:solidFill>
+                </a:ln>
+                <a:effectLst>
+                  <a:outerShdw blurRad="9525" dist="25400" dir="14640000" algn="tl" rotWithShape="0">
+                    <a:prstClr val="black">
+                      <a:alpha val="30000"/>
+                    </a:prstClr>
+                  </a:outerShdw>
+                </a:effectLst>
+              </a:rPr>
+              <a:t> </a:t>
+            </a:r>
+            <a:r>
+              <a:rPr lang="pl-PL" dirty="0" err="1">
+                <a:ln>
+                  <a:solidFill>
+                    <a:prstClr val="black">
+                      <a:lumMod val="75000"/>
+                      <a:lumOff val="25000"/>
+                      <a:alpha val="10000"/>
+                    </a:prstClr>
+                  </a:solidFill>
+                </a:ln>
+                <a:effectLst>
+                  <a:outerShdw blurRad="9525" dist="25400" dir="14640000" algn="tl" rotWithShape="0">
+                    <a:prstClr val="black">
+                      <a:alpha val="30000"/>
+                    </a:prstClr>
+                  </a:outerShdw>
+                </a:effectLst>
+              </a:rPr>
+              <a:t>sa</a:t>
+            </a:r>
+            <a:r>
+              <a:rPr lang="pl-PL" dirty="0">
+                <a:ln>
+                  <a:solidFill>
+                    <a:prstClr val="black">
+                      <a:lumMod val="75000"/>
+                      <a:lumOff val="25000"/>
+                      <a:alpha val="10000"/>
+                    </a:prstClr>
+                  </a:solidFill>
+                </a:ln>
+                <a:effectLst>
+                  <a:outerShdw blurRad="9525" dist="25400" dir="14640000" algn="tl" rotWithShape="0">
+                    <a:prstClr val="black">
+                      <a:alpha val="30000"/>
+                    </a:prstClr>
+                  </a:outerShdw>
+                </a:effectLst>
+              </a:rPr>
+              <a:t> zamieniane na </a:t>
+            </a:r>
+            <a:r>
+              <a:rPr lang="pl-PL" dirty="0" err="1">
+                <a:ln>
+                  <a:solidFill>
+                    <a:prstClr val="black">
+                      <a:lumMod val="75000"/>
+                      <a:lumOff val="25000"/>
+                      <a:alpha val="10000"/>
+                    </a:prstClr>
+                  </a:solidFill>
+                </a:ln>
+                <a:effectLst>
+                  <a:outerShdw blurRad="9525" dist="25400" dir="14640000" algn="tl" rotWithShape="0">
+                    <a:prstClr val="black">
+                      <a:alpha val="30000"/>
+                    </a:prstClr>
+                  </a:outerShdw>
+                </a:effectLst>
+              </a:rPr>
+              <a:t>nazwe</a:t>
+            </a:r>
+            <a:r>
+              <a:rPr lang="pl-PL" dirty="0">
+                <a:ln>
+                  <a:solidFill>
+                    <a:prstClr val="black">
+                      <a:lumMod val="75000"/>
+                      <a:lumOff val="25000"/>
+                      <a:alpha val="10000"/>
+                    </a:prstClr>
+                  </a:solidFill>
+                </a:ln>
+                <a:effectLst>
+                  <a:outerShdw blurRad="9525" dist="25400" dir="14640000" algn="tl" rotWithShape="0">
+                    <a:prstClr val="black">
+                      <a:alpha val="30000"/>
+                    </a:prstClr>
+                  </a:outerShdw>
+                </a:effectLst>
+              </a:rPr>
+              <a:t> miasta itp. </a:t>
+            </a:r>
+          </a:p>
+        </p:txBody>
+      </p:sp>
+    </p:spTree>
+    <p:extLst>
+      <p:ext uri="{BB962C8B-B14F-4D97-AF65-F5344CB8AC3E}">
+        <p14:creationId xmlns:p14="http://schemas.microsoft.com/office/powerpoint/2010/main" val="3212077194"/>
+      </p:ext>
+    </p:extLst>
+  </p:cSld>
+  <p:clrMapOvr>
+    <a:masterClrMapping/>
+  </p:clrMapOvr>
+</p:sld>
+</file>
+
+<file path=ppt/slides/slide15.xml><?xml version="1.0" encoding="utf-8"?>
+<p:sld xmlns:a="http://schemas.openxmlformats.org/drawingml/2006/main" xmlns:r="http://schemas.openxmlformats.org/officeDocument/2006/relationships" xmlns:p="http://schemas.openxmlformats.org/presentationml/2006/main">
+  <p:cSld>
+    <p:spTree>
+      <p:nvGrpSpPr>
+        <p:cNvPr id="1" name=""/>
+        <p:cNvGrpSpPr/>
+        <p:nvPr/>
+      </p:nvGrpSpPr>
+      <p:grpSpPr>
+        <a:xfrm>
+          <a:off x="0" y="0"/>
+          <a:ext cx="0" cy="0"/>
+          <a:chOff x="0" y="0"/>
+          <a:chExt cx="0" cy="0"/>
+        </a:xfrm>
+      </p:grpSpPr>
+      <p:sp>
+        <p:nvSpPr>
+          <p:cNvPr id="2" name="Tytuł 1">
+            <a:extLst>
+              <a:ext uri="{FF2B5EF4-FFF2-40B4-BE49-F238E27FC236}">
+                <a16:creationId xmlns:a16="http://schemas.microsoft.com/office/drawing/2014/main" id="{26A9AB5A-4272-F863-AFED-718BB9082247}"/>
+              </a:ext>
+            </a:extLst>
+          </p:cNvPr>
+          <p:cNvSpPr>
+            <a:spLocks noGrp="1"/>
+          </p:cNvSpPr>
+          <p:nvPr>
+            <p:ph type="title"/>
+          </p:nvPr>
+        </p:nvSpPr>
+        <p:spPr/>
+        <p:txBody>
+          <a:bodyPr/>
+          <a:lstStyle/>
+          <a:p>
+            <a:r>
+              <a:rPr lang="pl-PL" dirty="0">
+                <a:ln>
+                  <a:solidFill>
+                    <a:prstClr val="black">
+                      <a:lumMod val="75000"/>
+                      <a:lumOff val="25000"/>
+                      <a:alpha val="10000"/>
+                    </a:prstClr>
+                  </a:solidFill>
+                </a:ln>
+                <a:effectLst>
+                  <a:outerShdw blurRad="9525" dist="25400" dir="14640000" algn="tl" rotWithShape="0">
+                    <a:prstClr val="black">
+                      <a:alpha val="30000"/>
+                    </a:prstClr>
+                  </a:outerShdw>
+                </a:effectLst>
+              </a:rPr>
+              <a:t>Wykorzystanie lokalizacji</a:t>
+            </a:r>
+            <a:endParaRPr lang="pl-PL" dirty="0"/>
+          </a:p>
+        </p:txBody>
+      </p:sp>
+      <p:pic>
+        <p:nvPicPr>
+          <p:cNvPr id="8" name="Symbol zastępczy zawartości 7" descr="Obraz zawierający tekst, zrzut ekranu, Czcionka&#10;&#10;Opis wygenerowany automatycznie">
+            <a:extLst>
+              <a:ext uri="{FF2B5EF4-FFF2-40B4-BE49-F238E27FC236}">
+                <a16:creationId xmlns:a16="http://schemas.microsoft.com/office/drawing/2014/main" id="{2C308CAF-9E8B-A3A1-8693-E270C47C6245}"/>
+              </a:ext>
+            </a:extLst>
+          </p:cNvPr>
+          <p:cNvPicPr>
+            <a:picLocks noGrp="1" noChangeAspect="1"/>
+          </p:cNvPicPr>
+          <p:nvPr>
+            <p:ph idx="1"/>
+          </p:nvPr>
+        </p:nvPicPr>
+        <p:blipFill>
+          <a:blip r:embed="rId2"/>
+          <a:stretch>
+            <a:fillRect/>
+          </a:stretch>
+        </p:blipFill>
+        <p:spPr>
+          <a:xfrm>
+            <a:off x="422141" y="3061864"/>
+            <a:ext cx="7877175" cy="1276350"/>
+          </a:xfrm>
+        </p:spPr>
+      </p:pic>
+      <p:pic>
+        <p:nvPicPr>
+          <p:cNvPr id="7" name="Picture 7" descr="A red location pin with a circle in the middle&#10;&#10;Description automatically generated">
+            <a:extLst>
+              <a:ext uri="{FF2B5EF4-FFF2-40B4-BE49-F238E27FC236}">
+                <a16:creationId xmlns:a16="http://schemas.microsoft.com/office/drawing/2014/main" id="{FEA52D90-C60C-8660-6CE6-1F1151981E32}"/>
+              </a:ext>
+            </a:extLst>
+          </p:cNvPr>
+          <p:cNvPicPr>
+            <a:picLocks noChangeAspect="1"/>
+          </p:cNvPicPr>
+          <p:nvPr/>
+        </p:nvPicPr>
+        <p:blipFill>
+          <a:blip r:embed="rId3">
+            <a:extLst>
+              <a:ext uri="{28A0092B-C50C-407E-A947-70E740481C1C}">
+                <a14:useLocalDpi xmlns:a14="http://schemas.microsoft.com/office/drawing/2010/main" val="0"/>
+              </a:ext>
+            </a:extLst>
+          </a:blip>
+          <a:stretch>
+            <a:fillRect/>
+          </a:stretch>
+        </p:blipFill>
+        <p:spPr>
+          <a:xfrm>
+            <a:off x="8124910" y="1808058"/>
+            <a:ext cx="3299400" cy="3247914"/>
+          </a:xfrm>
+          <a:prstGeom prst="rect">
+            <a:avLst/>
+          </a:prstGeom>
+        </p:spPr>
+      </p:pic>
+      <p:sp>
+        <p:nvSpPr>
+          <p:cNvPr id="11" name="TextBox 11">
+            <a:extLst>
+              <a:ext uri="{FF2B5EF4-FFF2-40B4-BE49-F238E27FC236}">
+                <a16:creationId xmlns:a16="http://schemas.microsoft.com/office/drawing/2014/main" id="{C6B66A61-1AE6-58F7-74B5-9473BA81C8E4}"/>
+              </a:ext>
+            </a:extLst>
+          </p:cNvPr>
+          <p:cNvSpPr txBox="1"/>
+          <p:nvPr/>
+        </p:nvSpPr>
+        <p:spPr>
+          <a:xfrm>
+            <a:off x="1436544" y="2521053"/>
+            <a:ext cx="6954402" cy="523220"/>
+          </a:xfrm>
+          <a:prstGeom prst="rect">
+            <a:avLst/>
+          </a:prstGeom>
+          <a:noFill/>
+        </p:spPr>
+        <p:txBody>
+          <a:bodyPr wrap="square" lIns="91440" tIns="45720" rIns="91440" bIns="45720" rtlCol="0" anchor="t">
+            <a:spAutoFit/>
+          </a:bodyPr>
+          <a:lstStyle/>
+          <a:p>
+            <a:r>
+              <a:rPr lang="pl-PL" sz="2800" dirty="0"/>
+              <a:t>Sprawdzenie uprawnień aplikacji</a:t>
+            </a:r>
+            <a:endParaRPr lang="pl-PL" dirty="0"/>
+          </a:p>
+        </p:txBody>
+      </p:sp>
+    </p:spTree>
+    <p:extLst>
+      <p:ext uri="{BB962C8B-B14F-4D97-AF65-F5344CB8AC3E}">
+        <p14:creationId xmlns:p14="http://schemas.microsoft.com/office/powerpoint/2010/main" val="2508872199"/>
+      </p:ext>
+    </p:extLst>
+  </p:cSld>
+  <p:clrMapOvr>
+    <a:masterClrMapping/>
+  </p:clrMapOvr>
+</p:sld>
+</file>
+
+<file path=ppt/slides/slide16.xml><?xml version="1.0" encoding="utf-8"?>
+<p:sld xmlns:a="http://schemas.openxmlformats.org/drawingml/2006/main" xmlns:r="http://schemas.openxmlformats.org/officeDocument/2006/relationships" xmlns:p="http://schemas.openxmlformats.org/presentationml/2006/main">
+  <p:cSld>
+    <p:spTree>
+      <p:nvGrpSpPr>
+        <p:cNvPr id="1" name=""/>
+        <p:cNvGrpSpPr/>
+        <p:nvPr/>
+      </p:nvGrpSpPr>
+      <p:grpSpPr>
+        <a:xfrm>
+          <a:off x="0" y="0"/>
+          <a:ext cx="0" cy="0"/>
+          <a:chOff x="0" y="0"/>
+          <a:chExt cx="0" cy="0"/>
+        </a:xfrm>
+      </p:grpSpPr>
+      <p:sp>
+        <p:nvSpPr>
+          <p:cNvPr id="2" name="Tytuł 1">
+            <a:extLst>
+              <a:ext uri="{FF2B5EF4-FFF2-40B4-BE49-F238E27FC236}">
+                <a16:creationId xmlns:a16="http://schemas.microsoft.com/office/drawing/2014/main" id="{7290EBE8-B550-D4D8-353A-E08A4B838078}"/>
+              </a:ext>
+            </a:extLst>
+          </p:cNvPr>
+          <p:cNvSpPr>
+            <a:spLocks noGrp="1"/>
+          </p:cNvSpPr>
+          <p:nvPr>
+            <p:ph type="title"/>
+          </p:nvPr>
+        </p:nvSpPr>
+        <p:spPr/>
+        <p:txBody>
+          <a:bodyPr/>
+          <a:lstStyle/>
+          <a:p>
+            <a:r>
+              <a:rPr lang="pl-PL" dirty="0">
+                <a:ln>
+                  <a:solidFill>
+                    <a:prstClr val="black">
+                      <a:lumMod val="75000"/>
+                      <a:lumOff val="25000"/>
+                      <a:alpha val="10000"/>
+                    </a:prstClr>
+                  </a:solidFill>
+                </a:ln>
+                <a:effectLst>
+                  <a:outerShdw blurRad="9525" dist="25400" dir="14640000" algn="tl" rotWithShape="0">
+                    <a:prstClr val="black">
+                      <a:alpha val="30000"/>
+                    </a:prstClr>
+                  </a:outerShdw>
+                </a:effectLst>
+              </a:rPr>
+              <a:t>Wykorzystanie lokalizacji</a:t>
+            </a:r>
+            <a:endParaRPr lang="pl-PL" dirty="0"/>
+          </a:p>
+        </p:txBody>
+      </p:sp>
+      <p:pic>
+        <p:nvPicPr>
+          <p:cNvPr id="7" name="Symbol zastępczy zawartości 6" descr="Obraz zawierający tekst, zrzut ekranu, Czcionka, oprogramowanie&#10;&#10;Opis wygenerowany automatycznie">
+            <a:extLst>
+              <a:ext uri="{FF2B5EF4-FFF2-40B4-BE49-F238E27FC236}">
+                <a16:creationId xmlns:a16="http://schemas.microsoft.com/office/drawing/2014/main" id="{A01C630D-94E9-B72D-ED54-6318120A5604}"/>
+              </a:ext>
+            </a:extLst>
+          </p:cNvPr>
+          <p:cNvPicPr>
+            <a:picLocks noGrp="1" noChangeAspect="1"/>
+          </p:cNvPicPr>
+          <p:nvPr>
+            <p:ph idx="1"/>
+          </p:nvPr>
+        </p:nvPicPr>
+        <p:blipFill>
+          <a:blip r:embed="rId2"/>
+          <a:stretch>
+            <a:fillRect/>
+          </a:stretch>
+        </p:blipFill>
+        <p:spPr>
+          <a:xfrm>
+            <a:off x="1290076" y="2004462"/>
+            <a:ext cx="9601200" cy="3514725"/>
+          </a:xfrm>
+        </p:spPr>
+      </p:pic>
+    </p:spTree>
+    <p:extLst>
+      <p:ext uri="{BB962C8B-B14F-4D97-AF65-F5344CB8AC3E}">
+        <p14:creationId xmlns:p14="http://schemas.microsoft.com/office/powerpoint/2010/main" val="911334357"/>
+      </p:ext>
+    </p:extLst>
+  </p:cSld>
+  <p:clrMapOvr>
+    <a:masterClrMapping/>
+  </p:clrMapOvr>
+</p:sld>
+</file>
+
+<file path=ppt/slides/slide17.xml><?xml version="1.0" encoding="utf-8"?>
+<p:sld xmlns:a="http://schemas.openxmlformats.org/drawingml/2006/main" xmlns:r="http://schemas.openxmlformats.org/officeDocument/2006/relationships" xmlns:p="http://schemas.openxmlformats.org/presentationml/2006/main">
+  <p:cSld>
+    <p:spTree>
+      <p:nvGrpSpPr>
+        <p:cNvPr id="1" name=""/>
+        <p:cNvGrpSpPr/>
+        <p:nvPr/>
+      </p:nvGrpSpPr>
+      <p:grpSpPr>
+        <a:xfrm>
+          <a:off x="0" y="0"/>
+          <a:ext cx="0" cy="0"/>
+          <a:chOff x="0" y="0"/>
+          <a:chExt cx="0" cy="0"/>
+        </a:xfrm>
+      </p:grpSpPr>
+      <p:pic>
+        <p:nvPicPr>
+          <p:cNvPr id="11" name="Picture 10" descr="A yellow sun with black background&#10;&#10;Description automatically generated">
+            <a:extLst>
+              <a:ext uri="{FF2B5EF4-FFF2-40B4-BE49-F238E27FC236}">
+                <a16:creationId xmlns:a16="http://schemas.microsoft.com/office/drawing/2014/main" id="{6758B9F0-4EAD-04A3-6DD6-5EEBBC165C96}"/>
+              </a:ext>
+            </a:extLst>
+          </p:cNvPr>
+          <p:cNvPicPr>
+            <a:picLocks noChangeAspect="1"/>
+          </p:cNvPicPr>
+          <p:nvPr/>
+        </p:nvPicPr>
+        <p:blipFill>
+          <a:blip r:embed="rId2">
+            <a:extLst>
+              <a:ext uri="{28A0092B-C50C-407E-A947-70E740481C1C}">
+                <a14:useLocalDpi xmlns:a14="http://schemas.microsoft.com/office/drawing/2010/main" val="0"/>
+              </a:ext>
+            </a:extLst>
+          </a:blip>
+          <a:stretch>
+            <a:fillRect/>
+          </a:stretch>
+        </p:blipFill>
+        <p:spPr>
+          <a:xfrm>
+            <a:off x="-582964" y="-579337"/>
+            <a:ext cx="1725966" cy="1725966"/>
+          </a:xfrm>
+          <a:prstGeom prst="rect">
+            <a:avLst/>
+          </a:prstGeom>
+        </p:spPr>
+      </p:pic>
+      <p:sp>
+        <p:nvSpPr>
+          <p:cNvPr id="2" name="Title 1">
+            <a:extLst>
+              <a:ext uri="{FF2B5EF4-FFF2-40B4-BE49-F238E27FC236}">
+                <a16:creationId xmlns:a16="http://schemas.microsoft.com/office/drawing/2014/main" id="{4652AB7B-027D-C765-D4EA-D50A06A0C5C0}"/>
+              </a:ext>
+            </a:extLst>
+          </p:cNvPr>
+          <p:cNvSpPr>
+            <a:spLocks noGrp="1"/>
+          </p:cNvSpPr>
+          <p:nvPr>
+            <p:ph type="ctrTitle"/>
+          </p:nvPr>
+        </p:nvSpPr>
+        <p:spPr>
+          <a:xfrm>
+            <a:off x="1370693" y="1718738"/>
+            <a:ext cx="9440034" cy="1828801"/>
+          </a:xfrm>
+        </p:spPr>
+        <p:txBody>
+          <a:bodyPr/>
+          <a:lstStyle/>
+          <a:p>
+            <a:r>
+              <a:rPr lang="pl-PL" dirty="0"/>
+              <a:t>Prezentacja działania aplikacji</a:t>
+            </a:r>
+            <a:endParaRPr lang="pl-PL" dirty="0">
+              <a:ln>
+                <a:solidFill>
+                  <a:prstClr val="black">
+                    <a:lumMod val="75000"/>
+                    <a:lumOff val="25000"/>
+                    <a:alpha val="10000"/>
+                  </a:prstClr>
+                </a:solidFill>
+              </a:ln>
+              <a:effectLst>
+                <a:outerShdw blurRad="9525" dist="25400" dir="14640000" algn="tl" rotWithShape="0">
+                  <a:prstClr val="black">
+                    <a:alpha val="30000"/>
+                  </a:prstClr>
+                </a:outerShdw>
+              </a:effectLst>
+            </a:endParaRPr>
+          </a:p>
+        </p:txBody>
+      </p:sp>
+      <p:sp>
+        <p:nvSpPr>
+          <p:cNvPr id="3" name="Subtitle 2">
+            <a:extLst>
+              <a:ext uri="{FF2B5EF4-FFF2-40B4-BE49-F238E27FC236}">
+                <a16:creationId xmlns:a16="http://schemas.microsoft.com/office/drawing/2014/main" id="{B621761A-B99C-DD9C-B836-6A1354073E4A}"/>
+              </a:ext>
+            </a:extLst>
+          </p:cNvPr>
+          <p:cNvSpPr>
+            <a:spLocks noGrp="1"/>
+          </p:cNvSpPr>
+          <p:nvPr>
+            <p:ph type="subTitle" idx="1"/>
+          </p:nvPr>
+        </p:nvSpPr>
+        <p:spPr>
+          <a:xfrm>
+            <a:off x="1416626" y="6214539"/>
+            <a:ext cx="8359627" cy="740822"/>
+          </a:xfrm>
+        </p:spPr>
+        <p:txBody>
+          <a:bodyPr/>
+          <a:lstStyle/>
+          <a:p>
+            <a:endParaRPr lang="pl-PL">
+              <a:ln>
+                <a:solidFill>
+                  <a:prstClr val="black">
+                    <a:lumMod val="75000"/>
+                    <a:lumOff val="25000"/>
+                    <a:alpha val="10000"/>
+                  </a:prstClr>
+                </a:solidFill>
+              </a:ln>
+              <a:effectLst>
+                <a:outerShdw blurRad="9525" dist="25400" dir="14640000" algn="tl" rotWithShape="0">
+                  <a:prstClr val="black">
+                    <a:alpha val="30000"/>
+                  </a:prstClr>
+                </a:outerShdw>
+              </a:effectLst>
+            </a:endParaRPr>
+          </a:p>
+        </p:txBody>
+      </p:sp>
+      <p:pic>
+        <p:nvPicPr>
+          <p:cNvPr id="13" name="Picture 12" descr="A blue cloud with rain drops&#10;&#10;Description automatically generated">
+            <a:extLst>
+              <a:ext uri="{FF2B5EF4-FFF2-40B4-BE49-F238E27FC236}">
+                <a16:creationId xmlns:a16="http://schemas.microsoft.com/office/drawing/2014/main" id="{D33654B6-7546-AF8B-43F8-A2184F237DF5}"/>
+              </a:ext>
+            </a:extLst>
+          </p:cNvPr>
+          <p:cNvPicPr>
+            <a:picLocks noChangeAspect="1"/>
+          </p:cNvPicPr>
+          <p:nvPr/>
+        </p:nvPicPr>
+        <p:blipFill>
+          <a:blip r:embed="rId3">
+            <a:extLst>
+              <a:ext uri="{28A0092B-C50C-407E-A947-70E740481C1C}">
+                <a14:useLocalDpi xmlns:a14="http://schemas.microsoft.com/office/drawing/2010/main" val="0"/>
+              </a:ext>
+            </a:extLst>
+          </a:blip>
+          <a:stretch>
+            <a:fillRect/>
+          </a:stretch>
+        </p:blipFill>
+        <p:spPr>
+          <a:xfrm>
+            <a:off x="9234718" y="283646"/>
+            <a:ext cx="2071609" cy="2071609"/>
+          </a:xfrm>
+          <a:prstGeom prst="rect">
+            <a:avLst/>
+          </a:prstGeom>
+        </p:spPr>
+      </p:pic>
+      <p:pic>
+        <p:nvPicPr>
+          <p:cNvPr id="15" name="Picture 14" descr="A thermometer with a red circle&#10;&#10;Description automatically generated">
+            <a:extLst>
+              <a:ext uri="{FF2B5EF4-FFF2-40B4-BE49-F238E27FC236}">
+                <a16:creationId xmlns:a16="http://schemas.microsoft.com/office/drawing/2014/main" id="{0D68F01F-8A9F-DEC9-346D-A7A5F91A206F}"/>
+              </a:ext>
+            </a:extLst>
+          </p:cNvPr>
+          <p:cNvPicPr>
+            <a:picLocks noChangeAspect="1"/>
+          </p:cNvPicPr>
+          <p:nvPr/>
+        </p:nvPicPr>
+        <p:blipFill>
+          <a:blip r:embed="rId4">
+            <a:extLst>
+              <a:ext uri="{28A0092B-C50C-407E-A947-70E740481C1C}">
+                <a14:useLocalDpi xmlns:a14="http://schemas.microsoft.com/office/drawing/2010/main" val="0"/>
+              </a:ext>
+            </a:extLst>
+          </a:blip>
+          <a:stretch>
+            <a:fillRect/>
+          </a:stretch>
+        </p:blipFill>
+        <p:spPr>
+          <a:xfrm rot="20616928">
+            <a:off x="379337" y="3633402"/>
+            <a:ext cx="2071919" cy="2071919"/>
+          </a:xfrm>
+          <a:prstGeom prst="rect">
+            <a:avLst/>
+          </a:prstGeom>
+        </p:spPr>
+      </p:pic>
+      <p:pic>
+        <p:nvPicPr>
+          <p:cNvPr id="17" name="Picture 16" descr="A green robot with two arms&#10;&#10;Description automatically generated">
+            <a:extLst>
+              <a:ext uri="{FF2B5EF4-FFF2-40B4-BE49-F238E27FC236}">
+                <a16:creationId xmlns:a16="http://schemas.microsoft.com/office/drawing/2014/main" id="{810F0172-0CF1-B0AC-8ED1-49993D0313F5}"/>
+              </a:ext>
+            </a:extLst>
+          </p:cNvPr>
+          <p:cNvPicPr>
+            <a:picLocks noChangeAspect="1"/>
+          </p:cNvPicPr>
+          <p:nvPr/>
+        </p:nvPicPr>
+        <p:blipFill>
+          <a:blip r:embed="rId5">
+            <a:extLst>
+              <a:ext uri="{28A0092B-C50C-407E-A947-70E740481C1C}">
+                <a14:useLocalDpi xmlns:a14="http://schemas.microsoft.com/office/drawing/2010/main" val="0"/>
+              </a:ext>
+            </a:extLst>
+          </a:blip>
+          <a:stretch>
+            <a:fillRect/>
+          </a:stretch>
+        </p:blipFill>
+        <p:spPr>
+          <a:xfrm>
+            <a:off x="8739117" y="4047108"/>
+            <a:ext cx="2071609" cy="2071609"/>
+          </a:xfrm>
+          <a:prstGeom prst="rect">
+            <a:avLst/>
+          </a:prstGeom>
+        </p:spPr>
+      </p:pic>
+    </p:spTree>
+    <p:extLst>
+      <p:ext uri="{BB962C8B-B14F-4D97-AF65-F5344CB8AC3E}">
+        <p14:creationId xmlns:p14="http://schemas.microsoft.com/office/powerpoint/2010/main" val="2399576122"/>
       </p:ext>
     </p:extLst>
   </p:cSld>

</xml_diff>

<commit_message>
Added API content to presentation
</commit_message>
<xml_diff>
--- a/Aplikacja pogodowa na Androida.pptx
+++ b/Aplikacja pogodowa na Androida.pptx
@@ -18,10 +18,20 @@
     <p:sldId id="266" r:id="rId12"/>
     <p:sldId id="273" r:id="rId13"/>
     <p:sldId id="267" r:id="rId14"/>
-    <p:sldId id="268" r:id="rId15"/>
-    <p:sldId id="269" r:id="rId16"/>
-    <p:sldId id="270" r:id="rId17"/>
-    <p:sldId id="272" r:id="rId18"/>
+    <p:sldId id="274" r:id="rId15"/>
+    <p:sldId id="275" r:id="rId16"/>
+    <p:sldId id="276" r:id="rId17"/>
+    <p:sldId id="277" r:id="rId18"/>
+    <p:sldId id="278" r:id="rId19"/>
+    <p:sldId id="280" r:id="rId20"/>
+    <p:sldId id="282" r:id="rId21"/>
+    <p:sldId id="281" r:id="rId22"/>
+    <p:sldId id="283" r:id="rId23"/>
+    <p:sldId id="284" r:id="rId24"/>
+    <p:sldId id="268" r:id="rId25"/>
+    <p:sldId id="269" r:id="rId26"/>
+    <p:sldId id="270" r:id="rId27"/>
+    <p:sldId id="272" r:id="rId28"/>
   </p:sldIdLst>
   <p:sldSz cx="12192000" cy="6858000"/>
   <p:notesSz cx="6858000" cy="9144000"/>
@@ -126,326 +136,6 @@
     </p:ext>
   </p:extLst>
 </p:presentation>
-</file>
-
-<file path=ppt/revisionInfo.xml><?xml version="1.0" encoding="utf-8"?>
-<p1510:revInfo xmlns:a="http://schemas.openxmlformats.org/drawingml/2006/main" xmlns:r="http://schemas.openxmlformats.org/officeDocument/2006/relationships" xmlns:p1510="http://schemas.microsoft.com/office/powerpoint/2015/10/main">
-  <p1510:revLst>
-    <p1510:client id="{EE9FE3F3-00D8-8CBD-E79C-73E334440792}" v="311" dt="2024-05-04T09:50:22.287"/>
-    <p1510:client id="{F36797D2-35CD-C12F-47BF-616E2B702B19}" v="2" dt="2024-05-04T08:47:48.111"/>
-  </p1510:revLst>
-</p1510:revInfo>
-</file>
-
-<file path=ppt/changesInfos/changesInfo1.xml><?xml version="1.0" encoding="utf-8"?>
-<pc:chgInfo xmlns:a="http://schemas.openxmlformats.org/drawingml/2006/main" xmlns:r="http://schemas.openxmlformats.org/officeDocument/2006/relationships" xmlns:ac="http://schemas.microsoft.com/office/drawing/2013/main/command" xmlns:pc="http://schemas.microsoft.com/office/powerpoint/2013/main/command">
-  <pc:docChgLst>
-    <pc:chgData name="Jakub Wiatr" userId="S::jwiatr@student.agh.edu.pl::c51b12c6-656a-4510-9a8b-8a6a353c1a14" providerId="AD" clId="Web-{F36797D2-35CD-C12F-47BF-616E2B702B19}"/>
-    <pc:docChg chg="addSld">
-      <pc:chgData name="Jakub Wiatr" userId="S::jwiatr@student.agh.edu.pl::c51b12c6-656a-4510-9a8b-8a6a353c1a14" providerId="AD" clId="Web-{F36797D2-35CD-C12F-47BF-616E2B702B19}" dt="2024-05-04T08:47:48.111" v="1"/>
-      <pc:docMkLst>
-        <pc:docMk/>
-      </pc:docMkLst>
-      <pc:sldChg chg="new">
-        <pc:chgData name="Jakub Wiatr" userId="S::jwiatr@student.agh.edu.pl::c51b12c6-656a-4510-9a8b-8a6a353c1a14" providerId="AD" clId="Web-{F36797D2-35CD-C12F-47BF-616E2B702B19}" dt="2024-05-04T08:47:45.627" v="0"/>
-        <pc:sldMkLst>
-          <pc:docMk/>
-          <pc:sldMk cId="3212077194" sldId="268"/>
-        </pc:sldMkLst>
-      </pc:sldChg>
-      <pc:sldChg chg="new">
-        <pc:chgData name="Jakub Wiatr" userId="S::jwiatr@student.agh.edu.pl::c51b12c6-656a-4510-9a8b-8a6a353c1a14" providerId="AD" clId="Web-{F36797D2-35CD-C12F-47BF-616E2B702B19}" dt="2024-05-04T08:47:48.111" v="1"/>
-        <pc:sldMkLst>
-          <pc:docMk/>
-          <pc:sldMk cId="2508872199" sldId="269"/>
-        </pc:sldMkLst>
-      </pc:sldChg>
-    </pc:docChg>
-  </pc:docChgLst>
-  <pc:docChgLst>
-    <pc:chgData name="Jakub Wiatr" userId="S::jwiatr@student.agh.edu.pl::c51b12c6-656a-4510-9a8b-8a6a353c1a14" providerId="AD" clId="Web-{EE9FE3F3-00D8-8CBD-E79C-73E334440792}"/>
-    <pc:docChg chg="addSld delSld modSld sldOrd">
-      <pc:chgData name="Jakub Wiatr" userId="S::jwiatr@student.agh.edu.pl::c51b12c6-656a-4510-9a8b-8a6a353c1a14" providerId="AD" clId="Web-{EE9FE3F3-00D8-8CBD-E79C-73E334440792}" dt="2024-05-04T09:50:20.240" v="243" actId="20577"/>
-      <pc:docMkLst>
-        <pc:docMk/>
-      </pc:docMkLst>
-      <pc:sldChg chg="modSp">
-        <pc:chgData name="Jakub Wiatr" userId="S::jwiatr@student.agh.edu.pl::c51b12c6-656a-4510-9a8b-8a6a353c1a14" providerId="AD" clId="Web-{EE9FE3F3-00D8-8CBD-E79C-73E334440792}" dt="2024-05-04T09:50:20.240" v="243" actId="20577"/>
-        <pc:sldMkLst>
-          <pc:docMk/>
-          <pc:sldMk cId="3212077194" sldId="268"/>
-        </pc:sldMkLst>
-        <pc:spChg chg="mod">
-          <ac:chgData name="Jakub Wiatr" userId="S::jwiatr@student.agh.edu.pl::c51b12c6-656a-4510-9a8b-8a6a353c1a14" providerId="AD" clId="Web-{EE9FE3F3-00D8-8CBD-E79C-73E334440792}" dt="2024-05-04T09:50:20.240" v="243" actId="20577"/>
-          <ac:spMkLst>
-            <pc:docMk/>
-            <pc:sldMk cId="3212077194" sldId="268"/>
-            <ac:spMk id="3" creationId="{7E187508-2999-E309-638E-2BE9C68B01B8}"/>
-          </ac:spMkLst>
-        </pc:spChg>
-      </pc:sldChg>
-      <pc:sldChg chg="addSp delSp modSp">
-        <pc:chgData name="Jakub Wiatr" userId="S::jwiatr@student.agh.edu.pl::c51b12c6-656a-4510-9a8b-8a6a353c1a14" providerId="AD" clId="Web-{EE9FE3F3-00D8-8CBD-E79C-73E334440792}" dt="2024-05-04T09:33:29.142" v="123" actId="1076"/>
-        <pc:sldMkLst>
-          <pc:docMk/>
-          <pc:sldMk cId="2508872199" sldId="269"/>
-        </pc:sldMkLst>
-        <pc:spChg chg="mod">
-          <ac:chgData name="Jakub Wiatr" userId="S::jwiatr@student.agh.edu.pl::c51b12c6-656a-4510-9a8b-8a6a353c1a14" providerId="AD" clId="Web-{EE9FE3F3-00D8-8CBD-E79C-73E334440792}" dt="2024-05-04T09:31:46.248" v="97" actId="20577"/>
-          <ac:spMkLst>
-            <pc:docMk/>
-            <pc:sldMk cId="2508872199" sldId="269"/>
-            <ac:spMk id="2" creationId="{26A9AB5A-4272-F863-AFED-718BB9082247}"/>
-          </ac:spMkLst>
-        </pc:spChg>
-        <pc:spChg chg="del">
-          <ac:chgData name="Jakub Wiatr" userId="S::jwiatr@student.agh.edu.pl::c51b12c6-656a-4510-9a8b-8a6a353c1a14" providerId="AD" clId="Web-{EE9FE3F3-00D8-8CBD-E79C-73E334440792}" dt="2024-05-04T09:31:59.233" v="98"/>
-          <ac:spMkLst>
-            <pc:docMk/>
-            <pc:sldMk cId="2508872199" sldId="269"/>
-            <ac:spMk id="3" creationId="{024D161E-AE13-1344-4842-6E1D6E4545C4}"/>
-          </ac:spMkLst>
-        </pc:spChg>
-        <pc:spChg chg="add mod">
-          <ac:chgData name="Jakub Wiatr" userId="S::jwiatr@student.agh.edu.pl::c51b12c6-656a-4510-9a8b-8a6a353c1a14" providerId="AD" clId="Web-{EE9FE3F3-00D8-8CBD-E79C-73E334440792}" dt="2024-05-04T09:33:29.142" v="123" actId="1076"/>
-          <ac:spMkLst>
-            <pc:docMk/>
-            <pc:sldMk cId="2508872199" sldId="269"/>
-            <ac:spMk id="11" creationId="{C6B66A61-1AE6-58F7-74B5-9473BA81C8E4}"/>
-          </ac:spMkLst>
-        </pc:spChg>
-        <pc:picChg chg="add del">
-          <ac:chgData name="Jakub Wiatr" userId="S::jwiatr@student.agh.edu.pl::c51b12c6-656a-4510-9a8b-8a6a353c1a14" providerId="AD" clId="Web-{EE9FE3F3-00D8-8CBD-E79C-73E334440792}" dt="2024-05-04T09:26:15.911" v="83"/>
-          <ac:picMkLst>
-            <pc:docMk/>
-            <pc:sldMk cId="2508872199" sldId="269"/>
-            <ac:picMk id="5" creationId="{0B2ECDE6-1D95-F909-9763-59BC1CB827FA}"/>
-          </ac:picMkLst>
-        </pc:picChg>
-        <pc:picChg chg="add mod">
-          <ac:chgData name="Jakub Wiatr" userId="S::jwiatr@student.agh.edu.pl::c51b12c6-656a-4510-9a8b-8a6a353c1a14" providerId="AD" clId="Web-{EE9FE3F3-00D8-8CBD-E79C-73E334440792}" dt="2024-05-04T09:31:36.061" v="88" actId="1076"/>
-          <ac:picMkLst>
-            <pc:docMk/>
-            <pc:sldMk cId="2508872199" sldId="269"/>
-            <ac:picMk id="7" creationId="{FEA52D90-C60C-8660-6CE6-1F1151981E32}"/>
-          </ac:picMkLst>
-        </pc:picChg>
-        <pc:picChg chg="add mod ord">
-          <ac:chgData name="Jakub Wiatr" userId="S::jwiatr@student.agh.edu.pl::c51b12c6-656a-4510-9a8b-8a6a353c1a14" providerId="AD" clId="Web-{EE9FE3F3-00D8-8CBD-E79C-73E334440792}" dt="2024-05-04T09:33:24.298" v="122" actId="1076"/>
-          <ac:picMkLst>
-            <pc:docMk/>
-            <pc:sldMk cId="2508872199" sldId="269"/>
-            <ac:picMk id="8" creationId="{2C308CAF-9E8B-A3A1-8693-E270C47C6245}"/>
-          </ac:picMkLst>
-        </pc:picChg>
-        <pc:picChg chg="add del mod">
-          <ac:chgData name="Jakub Wiatr" userId="S::jwiatr@student.agh.edu.pl::c51b12c6-656a-4510-9a8b-8a6a353c1a14" providerId="AD" clId="Web-{EE9FE3F3-00D8-8CBD-E79C-73E334440792}" dt="2024-05-04T09:32:57.907" v="103"/>
-          <ac:picMkLst>
-            <pc:docMk/>
-            <pc:sldMk cId="2508872199" sldId="269"/>
-            <ac:picMk id="9" creationId="{34AD5B6D-9766-6B62-564F-8131A2A396FD}"/>
-          </ac:picMkLst>
-        </pc:picChg>
-      </pc:sldChg>
-      <pc:sldChg chg="addSp delSp modSp new">
-        <pc:chgData name="Jakub Wiatr" userId="S::jwiatr@student.agh.edu.pl::c51b12c6-656a-4510-9a8b-8a6a353c1a14" providerId="AD" clId="Web-{EE9FE3F3-00D8-8CBD-E79C-73E334440792}" dt="2024-05-04T09:37:14.414" v="136"/>
-        <pc:sldMkLst>
-          <pc:docMk/>
-          <pc:sldMk cId="911334357" sldId="270"/>
-        </pc:sldMkLst>
-        <pc:spChg chg="mod">
-          <ac:chgData name="Jakub Wiatr" userId="S::jwiatr@student.agh.edu.pl::c51b12c6-656a-4510-9a8b-8a6a353c1a14" providerId="AD" clId="Web-{EE9FE3F3-00D8-8CBD-E79C-73E334440792}" dt="2024-05-04T09:34:53.051" v="131" actId="20577"/>
-          <ac:spMkLst>
-            <pc:docMk/>
-            <pc:sldMk cId="911334357" sldId="270"/>
-            <ac:spMk id="2" creationId="{7290EBE8-B550-D4D8-353A-E08A4B838078}"/>
-          </ac:spMkLst>
-        </pc:spChg>
-        <pc:spChg chg="del">
-          <ac:chgData name="Jakub Wiatr" userId="S::jwiatr@student.agh.edu.pl::c51b12c6-656a-4510-9a8b-8a6a353c1a14" providerId="AD" clId="Web-{EE9FE3F3-00D8-8CBD-E79C-73E334440792}" dt="2024-05-04T09:34:55.113" v="132"/>
-          <ac:spMkLst>
-            <pc:docMk/>
-            <pc:sldMk cId="911334357" sldId="270"/>
-            <ac:spMk id="3" creationId="{D1E21A4C-9927-5D6A-AD25-364D36F71B3D}"/>
-          </ac:spMkLst>
-        </pc:spChg>
-        <pc:spChg chg="add del mod">
-          <ac:chgData name="Jakub Wiatr" userId="S::jwiatr@student.agh.edu.pl::c51b12c6-656a-4510-9a8b-8a6a353c1a14" providerId="AD" clId="Web-{EE9FE3F3-00D8-8CBD-E79C-73E334440792}" dt="2024-05-04T09:37:14.414" v="136"/>
-          <ac:spMkLst>
-            <pc:docMk/>
-            <pc:sldMk cId="911334357" sldId="270"/>
-            <ac:spMk id="6" creationId="{51D52DC9-95DD-C441-527F-32B80C9F6A26}"/>
-          </ac:spMkLst>
-        </pc:spChg>
-        <pc:picChg chg="add del mod ord">
-          <ac:chgData name="Jakub Wiatr" userId="S::jwiatr@student.agh.edu.pl::c51b12c6-656a-4510-9a8b-8a6a353c1a14" providerId="AD" clId="Web-{EE9FE3F3-00D8-8CBD-E79C-73E334440792}" dt="2024-05-04T09:37:13.492" v="135"/>
-          <ac:picMkLst>
-            <pc:docMk/>
-            <pc:sldMk cId="911334357" sldId="270"/>
-            <ac:picMk id="4" creationId="{B56F782E-B5AA-E21C-0F87-B5DEB74AEF55}"/>
-          </ac:picMkLst>
-        </pc:picChg>
-        <pc:picChg chg="add mod ord">
-          <ac:chgData name="Jakub Wiatr" userId="S::jwiatr@student.agh.edu.pl::c51b12c6-656a-4510-9a8b-8a6a353c1a14" providerId="AD" clId="Web-{EE9FE3F3-00D8-8CBD-E79C-73E334440792}" dt="2024-05-04T09:37:14.414" v="136"/>
-          <ac:picMkLst>
-            <pc:docMk/>
-            <pc:sldMk cId="911334357" sldId="270"/>
-            <ac:picMk id="7" creationId="{A01C630D-94E9-B72D-ED54-6318120A5604}"/>
-          </ac:picMkLst>
-        </pc:picChg>
-      </pc:sldChg>
-      <pc:sldChg chg="modSp new del">
-        <pc:chgData name="Jakub Wiatr" userId="S::jwiatr@student.agh.edu.pl::c51b12c6-656a-4510-9a8b-8a6a353c1a14" providerId="AD" clId="Web-{EE9FE3F3-00D8-8CBD-E79C-73E334440792}" dt="2024-05-04T09:39:10.542" v="151"/>
-        <pc:sldMkLst>
-          <pc:docMk/>
-          <pc:sldMk cId="282242530" sldId="271"/>
-        </pc:sldMkLst>
-        <pc:spChg chg="mod">
-          <ac:chgData name="Jakub Wiatr" userId="S::jwiatr@student.agh.edu.pl::c51b12c6-656a-4510-9a8b-8a6a353c1a14" providerId="AD" clId="Web-{EE9FE3F3-00D8-8CBD-E79C-73E334440792}" dt="2024-05-04T09:38:53.620" v="148" actId="20577"/>
-          <ac:spMkLst>
-            <pc:docMk/>
-            <pc:sldMk cId="282242530" sldId="271"/>
-            <ac:spMk id="2" creationId="{BDAC9BBA-4238-6D65-FE89-42E82A766FA7}"/>
-          </ac:spMkLst>
-        </pc:spChg>
-        <pc:spChg chg="mod">
-          <ac:chgData name="Jakub Wiatr" userId="S::jwiatr@student.agh.edu.pl::c51b12c6-656a-4510-9a8b-8a6a353c1a14" providerId="AD" clId="Web-{EE9FE3F3-00D8-8CBD-E79C-73E334440792}" dt="2024-05-04T09:38:39.088" v="143" actId="1076"/>
-          <ac:spMkLst>
-            <pc:docMk/>
-            <pc:sldMk cId="282242530" sldId="271"/>
-            <ac:spMk id="3" creationId="{682EF403-11E3-64D6-7EF6-85DADA703CCD}"/>
-          </ac:spMkLst>
-        </pc:spChg>
-      </pc:sldChg>
-      <pc:sldChg chg="modSp add ord replId">
-        <pc:chgData name="Jakub Wiatr" userId="S::jwiatr@student.agh.edu.pl::c51b12c6-656a-4510-9a8b-8a6a353c1a14" providerId="AD" clId="Web-{EE9FE3F3-00D8-8CBD-E79C-73E334440792}" dt="2024-05-04T09:41:40.469" v="169" actId="20577"/>
-        <pc:sldMkLst>
-          <pc:docMk/>
-          <pc:sldMk cId="2399576122" sldId="272"/>
-        </pc:sldMkLst>
-        <pc:spChg chg="mod">
-          <ac:chgData name="Jakub Wiatr" userId="S::jwiatr@student.agh.edu.pl::c51b12c6-656a-4510-9a8b-8a6a353c1a14" providerId="AD" clId="Web-{EE9FE3F3-00D8-8CBD-E79C-73E334440792}" dt="2024-05-04T09:41:40.469" v="169" actId="20577"/>
-          <ac:spMkLst>
-            <pc:docMk/>
-            <pc:sldMk cId="2399576122" sldId="272"/>
-            <ac:spMk id="2" creationId="{4652AB7B-027D-C765-D4EA-D50A06A0C5C0}"/>
-          </ac:spMkLst>
-        </pc:spChg>
-        <pc:spChg chg="mod">
-          <ac:chgData name="Jakub Wiatr" userId="S::jwiatr@student.agh.edu.pl::c51b12c6-656a-4510-9a8b-8a6a353c1a14" providerId="AD" clId="Web-{EE9FE3F3-00D8-8CBD-E79C-73E334440792}" dt="2024-05-04T09:39:33.074" v="161" actId="1076"/>
-          <ac:spMkLst>
-            <pc:docMk/>
-            <pc:sldMk cId="2399576122" sldId="272"/>
-            <ac:spMk id="3" creationId="{B621761A-B99C-DD9C-B836-6A1354073E4A}"/>
-          </ac:spMkLst>
-        </pc:spChg>
-      </pc:sldChg>
-      <pc:sldChg chg="addSp delSp modSp add replId">
-        <pc:chgData name="Jakub Wiatr" userId="S::jwiatr@student.agh.edu.pl::c51b12c6-656a-4510-9a8b-8a6a353c1a14" providerId="AD" clId="Web-{EE9FE3F3-00D8-8CBD-E79C-73E334440792}" dt="2024-05-04T09:48:08.987" v="231" actId="20577"/>
-        <pc:sldMkLst>
-          <pc:docMk/>
-          <pc:sldMk cId="268790272" sldId="273"/>
-        </pc:sldMkLst>
-        <pc:spChg chg="mod">
-          <ac:chgData name="Jakub Wiatr" userId="S::jwiatr@student.agh.edu.pl::c51b12c6-656a-4510-9a8b-8a6a353c1a14" providerId="AD" clId="Web-{EE9FE3F3-00D8-8CBD-E79C-73E334440792}" dt="2024-05-04T09:45:27.760" v="175" actId="20577"/>
-          <ac:spMkLst>
-            <pc:docMk/>
-            <pc:sldMk cId="268790272" sldId="273"/>
-            <ac:spMk id="2" creationId="{7C3786DF-1EE8-6CD9-807B-CDD38FC38E4C}"/>
-          </ac:spMkLst>
-        </pc:spChg>
-        <pc:spChg chg="add del mod">
-          <ac:chgData name="Jakub Wiatr" userId="S::jwiatr@student.agh.edu.pl::c51b12c6-656a-4510-9a8b-8a6a353c1a14" providerId="AD" clId="Web-{EE9FE3F3-00D8-8CBD-E79C-73E334440792}" dt="2024-05-04T09:47:34.173" v="190"/>
-          <ac:spMkLst>
-            <pc:docMk/>
-            <pc:sldMk cId="268790272" sldId="273"/>
-            <ac:spMk id="7" creationId="{762EAFCF-4C21-03E2-0C1B-760AA2BFB219}"/>
-          </ac:spMkLst>
-        </pc:spChg>
-        <pc:spChg chg="del">
-          <ac:chgData name="Jakub Wiatr" userId="S::jwiatr@student.agh.edu.pl::c51b12c6-656a-4510-9a8b-8a6a353c1a14" providerId="AD" clId="Web-{EE9FE3F3-00D8-8CBD-E79C-73E334440792}" dt="2024-05-04T09:45:40.229" v="178"/>
-          <ac:spMkLst>
-            <pc:docMk/>
-            <pc:sldMk cId="268790272" sldId="273"/>
-            <ac:spMk id="8" creationId="{4FD8C83E-EF7C-99FA-E008-E63BBEE99F7A}"/>
-          </ac:spMkLst>
-        </pc:spChg>
-        <pc:spChg chg="add mod">
-          <ac:chgData name="Jakub Wiatr" userId="S::jwiatr@student.agh.edu.pl::c51b12c6-656a-4510-9a8b-8a6a353c1a14" providerId="AD" clId="Web-{EE9FE3F3-00D8-8CBD-E79C-73E334440792}" dt="2024-05-04T09:48:08.987" v="231" actId="20577"/>
-          <ac:spMkLst>
-            <pc:docMk/>
-            <pc:sldMk cId="268790272" sldId="273"/>
-            <ac:spMk id="14" creationId="{5091A99C-5E3C-1808-BBF1-D92ABF5132F9}"/>
-          </ac:spMkLst>
-        </pc:spChg>
-        <pc:picChg chg="add del mod ord">
-          <ac:chgData name="Jakub Wiatr" userId="S::jwiatr@student.agh.edu.pl::c51b12c6-656a-4510-9a8b-8a6a353c1a14" providerId="AD" clId="Web-{EE9FE3F3-00D8-8CBD-E79C-73E334440792}" dt="2024-05-04T09:45:49.730" v="182"/>
-          <ac:picMkLst>
-            <pc:docMk/>
-            <pc:sldMk cId="268790272" sldId="273"/>
-            <ac:picMk id="3" creationId="{2FDDC180-F28D-A2BA-FE8F-11878BF16D42}"/>
-          </ac:picMkLst>
-        </pc:picChg>
-        <pc:picChg chg="add mod">
-          <ac:chgData name="Jakub Wiatr" userId="S::jwiatr@student.agh.edu.pl::c51b12c6-656a-4510-9a8b-8a6a353c1a14" providerId="AD" clId="Web-{EE9FE3F3-00D8-8CBD-E79C-73E334440792}" dt="2024-05-04T09:47:23.548" v="188" actId="1076"/>
-          <ac:picMkLst>
-            <pc:docMk/>
-            <pc:sldMk cId="268790272" sldId="273"/>
-            <ac:picMk id="4" creationId="{DC9A3371-662D-8E21-4911-B35D7DF57824}"/>
-          </ac:picMkLst>
-        </pc:picChg>
-        <pc:picChg chg="del">
-          <ac:chgData name="Jakub Wiatr" userId="S::jwiatr@student.agh.edu.pl::c51b12c6-656a-4510-9a8b-8a6a353c1a14" providerId="AD" clId="Web-{EE9FE3F3-00D8-8CBD-E79C-73E334440792}" dt="2024-05-04T09:45:29.744" v="176"/>
-          <ac:picMkLst>
-            <pc:docMk/>
-            <pc:sldMk cId="268790272" sldId="273"/>
-            <ac:picMk id="6" creationId="{C00CB891-72AA-F225-D104-F3D79DD36056}"/>
-          </ac:picMkLst>
-        </pc:picChg>
-        <pc:picChg chg="del">
-          <ac:chgData name="Jakub Wiatr" userId="S::jwiatr@student.agh.edu.pl::c51b12c6-656a-4510-9a8b-8a6a353c1a14" providerId="AD" clId="Web-{EE9FE3F3-00D8-8CBD-E79C-73E334440792}" dt="2024-05-04T09:45:42.307" v="179"/>
-          <ac:picMkLst>
-            <pc:docMk/>
-            <pc:sldMk cId="268790272" sldId="273"/>
-            <ac:picMk id="9" creationId="{D9322B17-6DB4-7511-90C1-81FA9245460F}"/>
-          </ac:picMkLst>
-        </pc:picChg>
-        <pc:picChg chg="add del mod ord">
-          <ac:chgData name="Jakub Wiatr" userId="S::jwiatr@student.agh.edu.pl::c51b12c6-656a-4510-9a8b-8a6a353c1a14" providerId="AD" clId="Web-{EE9FE3F3-00D8-8CBD-E79C-73E334440792}" dt="2024-05-04T09:47:24.735" v="189"/>
-          <ac:picMkLst>
-            <pc:docMk/>
-            <pc:sldMk cId="268790272" sldId="273"/>
-            <ac:picMk id="10" creationId="{B8432494-BEEC-1D47-CA7D-FAFB047575F7}"/>
-          </ac:picMkLst>
-        </pc:picChg>
-        <pc:picChg chg="add mod ord">
-          <ac:chgData name="Jakub Wiatr" userId="S::jwiatr@student.agh.edu.pl::c51b12c6-656a-4510-9a8b-8a6a353c1a14" providerId="AD" clId="Web-{EE9FE3F3-00D8-8CBD-E79C-73E334440792}" dt="2024-05-04T09:47:34.173" v="190"/>
-          <ac:picMkLst>
-            <pc:docMk/>
-            <pc:sldMk cId="268790272" sldId="273"/>
-            <ac:picMk id="11" creationId="{0217CD34-D9AF-9F0B-AC44-A47AEF1EB428}"/>
-          </ac:picMkLst>
-        </pc:picChg>
-        <pc:picChg chg="add mod">
-          <ac:chgData name="Jakub Wiatr" userId="S::jwiatr@student.agh.edu.pl::c51b12c6-656a-4510-9a8b-8a6a353c1a14" providerId="AD" clId="Web-{EE9FE3F3-00D8-8CBD-E79C-73E334440792}" dt="2024-05-04T09:47:43.861" v="192" actId="1076"/>
-          <ac:picMkLst>
-            <pc:docMk/>
-            <pc:sldMk cId="268790272" sldId="273"/>
-            <ac:picMk id="12" creationId="{5E9C0772-05D9-6521-8F21-D2291EE376D9}"/>
-          </ac:picMkLst>
-        </pc:picChg>
-        <pc:picChg chg="del">
-          <ac:chgData name="Jakub Wiatr" userId="S::jwiatr@student.agh.edu.pl::c51b12c6-656a-4510-9a8b-8a6a353c1a14" providerId="AD" clId="Web-{EE9FE3F3-00D8-8CBD-E79C-73E334440792}" dt="2024-05-04T09:45:30.338" v="177"/>
-          <ac:picMkLst>
-            <pc:docMk/>
-            <pc:sldMk cId="268790272" sldId="273"/>
-            <ac:picMk id="13" creationId="{6758111E-0A7C-DBE4-CB5A-0A010FB3AEB9}"/>
-          </ac:picMkLst>
-        </pc:picChg>
-      </pc:sldChg>
-    </pc:docChg>
-  </pc:docChgLst>
-</pc:chgInfo>
 </file>
 
 <file path=ppt/slideLayouts/slideLayout1.xml><?xml version="1.0" encoding="utf-8"?>
@@ -7279,7 +6969,7 @@
           <p:cNvPr id="2" name="Tytuł 1">
             <a:extLst>
               <a:ext uri="{FF2B5EF4-FFF2-40B4-BE49-F238E27FC236}">
-                <a16:creationId xmlns:a16="http://schemas.microsoft.com/office/drawing/2014/main" id="{16DF0D97-7848-D1BF-A6ED-41F4B2A7BCE2}"/>
+                <a16:creationId xmlns:a16="http://schemas.microsoft.com/office/drawing/2014/main" id="{71D9271F-0AB7-3751-D644-DDA4D7AF1EE6}"/>
               </a:ext>
             </a:extLst>
           </p:cNvPr>
@@ -7295,312 +6985,93 @@
           <a:bodyPr/>
           <a:lstStyle/>
           <a:p>
+            <a:r>
+              <a:rPr lang="pl-PL" dirty="0" err="1"/>
+              <a:t>OpenWeather</a:t>
+            </a:r>
+            <a:r>
+              <a:rPr lang="pl-PL" dirty="0"/>
+              <a:t> – API </a:t>
+            </a:r>
+          </a:p>
+        </p:txBody>
+      </p:sp>
+      <p:sp>
+        <p:nvSpPr>
+          <p:cNvPr id="3" name="Symbol zastępczy zawartości 2">
+            <a:extLst>
+              <a:ext uri="{FF2B5EF4-FFF2-40B4-BE49-F238E27FC236}">
+                <a16:creationId xmlns:a16="http://schemas.microsoft.com/office/drawing/2014/main" id="{78052039-9EE2-039F-724B-2FD026FC547F}"/>
+              </a:ext>
+            </a:extLst>
+          </p:cNvPr>
+          <p:cNvSpPr>
+            <a:spLocks noGrp="1"/>
+          </p:cNvSpPr>
+          <p:nvPr>
+            <p:ph idx="1"/>
+          </p:nvPr>
+        </p:nvSpPr>
+        <p:spPr/>
+        <p:txBody>
+          <a:bodyPr/>
+          <a:lstStyle/>
+          <a:p>
             <a:endParaRPr lang="pl-PL"/>
           </a:p>
         </p:txBody>
       </p:sp>
-      <p:sp>
-        <p:nvSpPr>
-          <p:cNvPr id="3" name="Symbol zastępczy zawartości 2">
+      <p:pic>
+        <p:nvPicPr>
+          <p:cNvPr id="1026" name="Picture 2" descr="OpenWeather Aplikacja na Homey | Homey">
             <a:extLst>
               <a:ext uri="{FF2B5EF4-FFF2-40B4-BE49-F238E27FC236}">
-                <a16:creationId xmlns:a16="http://schemas.microsoft.com/office/drawing/2014/main" id="{7E187508-2999-E309-638E-2BE9C68B01B8}"/>
+                <a16:creationId xmlns:a16="http://schemas.microsoft.com/office/drawing/2014/main" id="{973AD4DC-C1CF-2DC8-867E-EA1C7831AFBF}"/>
               </a:ext>
             </a:extLst>
           </p:cNvPr>
-          <p:cNvSpPr>
-            <a:spLocks noGrp="1"/>
-          </p:cNvSpPr>
-          <p:nvPr>
-            <p:ph idx="1"/>
-          </p:nvPr>
-        </p:nvSpPr>
-        <p:spPr/>
-        <p:txBody>
-          <a:bodyPr/>
-          <a:lstStyle/>
-          <a:p>
-            <a:pPr indent="-305435"/>
-            <a:r>
-              <a:rPr lang="pl-PL" dirty="0">
-                <a:ln>
-                  <a:solidFill>
-                    <a:prstClr val="black">
-                      <a:lumMod val="75000"/>
-                      <a:lumOff val="25000"/>
-                      <a:alpha val="10000"/>
-                    </a:prstClr>
-                  </a:solidFill>
-                </a:ln>
-                <a:effectLst>
-                  <a:outerShdw blurRad="9525" dist="25400" dir="14640000" algn="tl" rotWithShape="0">
-                    <a:prstClr val="black">
-                      <a:alpha val="30000"/>
-                    </a:prstClr>
-                  </a:outerShdw>
-                </a:effectLst>
-              </a:rPr>
-              <a:t>Tu cos daj o tym </a:t>
-            </a:r>
-            <a:r>
-              <a:rPr lang="pl-PL" dirty="0" err="1">
-                <a:ln>
-                  <a:solidFill>
-                    <a:prstClr val="black">
-                      <a:lumMod val="75000"/>
-                      <a:lumOff val="25000"/>
-                      <a:alpha val="10000"/>
-                    </a:prstClr>
-                  </a:solidFill>
-                </a:ln>
-                <a:effectLst>
-                  <a:outerShdw blurRad="9525" dist="25400" dir="14640000" algn="tl" rotWithShape="0">
-                    <a:prstClr val="black">
-                      <a:alpha val="30000"/>
-                    </a:prstClr>
-                  </a:outerShdw>
-                </a:effectLst>
-              </a:rPr>
-              <a:t>api</a:t>
-            </a:r>
-            <a:r>
-              <a:rPr lang="pl-PL" dirty="0">
-                <a:ln>
-                  <a:solidFill>
-                    <a:prstClr val="black">
-                      <a:lumMod val="75000"/>
-                      <a:lumOff val="25000"/>
-                      <a:alpha val="10000"/>
-                    </a:prstClr>
-                  </a:solidFill>
-                </a:ln>
-                <a:effectLst>
-                  <a:outerShdw blurRad="9525" dist="25400" dir="14640000" algn="tl" rotWithShape="0">
-                    <a:prstClr val="black">
-                      <a:alpha val="30000"/>
-                    </a:prstClr>
-                  </a:outerShdw>
-                </a:effectLst>
-              </a:rPr>
-              <a:t> które </a:t>
-            </a:r>
-            <a:r>
-              <a:rPr lang="pl-PL" dirty="0" err="1">
-                <a:ln>
-                  <a:solidFill>
-                    <a:prstClr val="black">
-                      <a:lumMod val="75000"/>
-                      <a:lumOff val="25000"/>
-                      <a:alpha val="10000"/>
-                    </a:prstClr>
-                  </a:solidFill>
-                </a:ln>
-                <a:effectLst>
-                  <a:outerShdw blurRad="9525" dist="25400" dir="14640000" algn="tl" rotWithShape="0">
-                    <a:prstClr val="black">
-                      <a:alpha val="30000"/>
-                    </a:prstClr>
-                  </a:outerShdw>
-                </a:effectLst>
-              </a:rPr>
-              <a:t>wybralismy</a:t>
-            </a:r>
-            <a:r>
-              <a:rPr lang="pl-PL" dirty="0">
-                <a:ln>
-                  <a:solidFill>
-                    <a:prstClr val="black">
-                      <a:lumMod val="75000"/>
-                      <a:lumOff val="25000"/>
-                      <a:alpha val="10000"/>
-                    </a:prstClr>
-                  </a:solidFill>
-                </a:ln>
-                <a:effectLst>
-                  <a:outerShdw blurRad="9525" dist="25400" dir="14640000" algn="tl" rotWithShape="0">
-                    <a:prstClr val="black">
-                      <a:alpha val="30000"/>
-                    </a:prstClr>
-                  </a:outerShdw>
-                </a:effectLst>
-              </a:rPr>
-              <a:t> jak </a:t>
-            </a:r>
-            <a:r>
-              <a:rPr lang="pl-PL" dirty="0" err="1">
-                <a:ln>
-                  <a:solidFill>
-                    <a:prstClr val="black">
-                      <a:lumMod val="75000"/>
-                      <a:lumOff val="25000"/>
-                      <a:alpha val="10000"/>
-                    </a:prstClr>
-                  </a:solidFill>
-                </a:ln>
-                <a:effectLst>
-                  <a:outerShdw blurRad="9525" dist="25400" dir="14640000" algn="tl" rotWithShape="0">
-                    <a:prstClr val="black">
-                      <a:alpha val="30000"/>
-                    </a:prstClr>
-                  </a:outerShdw>
-                </a:effectLst>
-              </a:rPr>
-              <a:t>dziala</a:t>
-            </a:r>
-            <a:r>
-              <a:rPr lang="pl-PL" dirty="0">
-                <a:ln>
-                  <a:solidFill>
-                    <a:prstClr val="black">
-                      <a:lumMod val="75000"/>
-                      <a:lumOff val="25000"/>
-                      <a:alpha val="10000"/>
-                    </a:prstClr>
-                  </a:solidFill>
-                </a:ln>
-                <a:effectLst>
-                  <a:outerShdw blurRad="9525" dist="25400" dir="14640000" algn="tl" rotWithShape="0">
-                    <a:prstClr val="black">
-                      <a:alpha val="30000"/>
-                    </a:prstClr>
-                  </a:outerShdw>
-                </a:effectLst>
-              </a:rPr>
-              <a:t> tam razem z tym jak te </a:t>
-            </a:r>
-            <a:r>
-              <a:rPr lang="pl-PL" dirty="0" err="1">
-                <a:ln>
-                  <a:solidFill>
-                    <a:prstClr val="black">
-                      <a:lumMod val="75000"/>
-                      <a:lumOff val="25000"/>
-                      <a:alpha val="10000"/>
-                    </a:prstClr>
-                  </a:solidFill>
-                </a:ln>
-                <a:effectLst>
-                  <a:outerShdw blurRad="9525" dist="25400" dir="14640000" algn="tl" rotWithShape="0">
-                    <a:prstClr val="black">
-                      <a:alpha val="30000"/>
-                    </a:prstClr>
-                  </a:outerShdw>
-                </a:effectLst>
-              </a:rPr>
-              <a:t>wspolrzedne</a:t>
-            </a:r>
-            <a:r>
-              <a:rPr lang="pl-PL" dirty="0">
-                <a:ln>
-                  <a:solidFill>
-                    <a:prstClr val="black">
-                      <a:lumMod val="75000"/>
-                      <a:lumOff val="25000"/>
-                      <a:alpha val="10000"/>
-                    </a:prstClr>
-                  </a:solidFill>
-                </a:ln>
-                <a:effectLst>
-                  <a:outerShdw blurRad="9525" dist="25400" dir="14640000" algn="tl" rotWithShape="0">
-                    <a:prstClr val="black">
-                      <a:alpha val="30000"/>
-                    </a:prstClr>
-                  </a:outerShdw>
-                </a:effectLst>
-              </a:rPr>
-              <a:t> </a:t>
-            </a:r>
-            <a:r>
-              <a:rPr lang="pl-PL" dirty="0" err="1">
-                <a:ln>
-                  <a:solidFill>
-                    <a:prstClr val="black">
-                      <a:lumMod val="75000"/>
-                      <a:lumOff val="25000"/>
-                      <a:alpha val="10000"/>
-                    </a:prstClr>
-                  </a:solidFill>
-                </a:ln>
-                <a:effectLst>
-                  <a:outerShdw blurRad="9525" dist="25400" dir="14640000" algn="tl" rotWithShape="0">
-                    <a:prstClr val="black">
-                      <a:alpha val="30000"/>
-                    </a:prstClr>
-                  </a:outerShdw>
-                </a:effectLst>
-              </a:rPr>
-              <a:t>sa</a:t>
-            </a:r>
-            <a:r>
-              <a:rPr lang="pl-PL" dirty="0">
-                <a:ln>
-                  <a:solidFill>
-                    <a:prstClr val="black">
-                      <a:lumMod val="75000"/>
-                      <a:lumOff val="25000"/>
-                      <a:alpha val="10000"/>
-                    </a:prstClr>
-                  </a:solidFill>
-                </a:ln>
-                <a:effectLst>
-                  <a:outerShdw blurRad="9525" dist="25400" dir="14640000" algn="tl" rotWithShape="0">
-                    <a:prstClr val="black">
-                      <a:alpha val="30000"/>
-                    </a:prstClr>
-                  </a:outerShdw>
-                </a:effectLst>
-              </a:rPr>
-              <a:t> zamieniane na </a:t>
-            </a:r>
-            <a:r>
-              <a:rPr lang="pl-PL" dirty="0" err="1">
-                <a:ln>
-                  <a:solidFill>
-                    <a:prstClr val="black">
-                      <a:lumMod val="75000"/>
-                      <a:lumOff val="25000"/>
-                      <a:alpha val="10000"/>
-                    </a:prstClr>
-                  </a:solidFill>
-                </a:ln>
-                <a:effectLst>
-                  <a:outerShdw blurRad="9525" dist="25400" dir="14640000" algn="tl" rotWithShape="0">
-                    <a:prstClr val="black">
-                      <a:alpha val="30000"/>
-                    </a:prstClr>
-                  </a:outerShdw>
-                </a:effectLst>
-              </a:rPr>
-              <a:t>nazwe</a:t>
-            </a:r>
-            <a:r>
-              <a:rPr lang="pl-PL" dirty="0">
-                <a:ln>
-                  <a:solidFill>
-                    <a:prstClr val="black">
-                      <a:lumMod val="75000"/>
-                      <a:lumOff val="25000"/>
-                      <a:alpha val="10000"/>
-                    </a:prstClr>
-                  </a:solidFill>
-                </a:ln>
-                <a:effectLst>
-                  <a:outerShdw blurRad="9525" dist="25400" dir="14640000" algn="tl" rotWithShape="0">
-                    <a:prstClr val="black">
-                      <a:alpha val="30000"/>
-                    </a:prstClr>
-                  </a:outerShdw>
-                </a:effectLst>
-              </a:rPr>
-              <a:t> miasta itp. </a:t>
-            </a:r>
-          </a:p>
-        </p:txBody>
-      </p:sp>
+          <p:cNvPicPr>
+            <a:picLocks noChangeAspect="1" noChangeArrowheads="1"/>
+          </p:cNvPicPr>
+          <p:nvPr/>
+        </p:nvPicPr>
+        <p:blipFill>
+          <a:blip r:embed="rId2">
+            <a:extLst>
+              <a:ext uri="{28A0092B-C50C-407E-A947-70E740481C1C}">
+                <a14:useLocalDpi xmlns:a14="http://schemas.microsoft.com/office/drawing/2010/main" val="0"/>
+              </a:ext>
+            </a:extLst>
+          </a:blip>
+          <a:srcRect/>
+          <a:stretch>
+            <a:fillRect/>
+          </a:stretch>
+        </p:blipFill>
+        <p:spPr bwMode="auto">
+          <a:xfrm>
+            <a:off x="3067478" y="1732449"/>
+            <a:ext cx="6220361" cy="4354253"/>
+          </a:xfrm>
+          <a:prstGeom prst="rect">
+            <a:avLst/>
+          </a:prstGeom>
+          <a:noFill/>
+          <a:extLst>
+            <a:ext uri="{909E8E84-426E-40DD-AFC4-6F175D3DCCD1}">
+              <a14:hiddenFill xmlns:a14="http://schemas.microsoft.com/office/drawing/2010/main">
+                <a:solidFill>
+                  <a:srgbClr val="FFFFFF"/>
+                </a:solidFill>
+              </a14:hiddenFill>
+            </a:ext>
+          </a:extLst>
+        </p:spPr>
+      </p:pic>
     </p:spTree>
     <p:extLst>
       <p:ext uri="{BB962C8B-B14F-4D97-AF65-F5344CB8AC3E}">
-        <p14:creationId xmlns:p14="http://schemas.microsoft.com/office/powerpoint/2010/main" val="3212077194"/>
+        <p14:creationId xmlns:p14="http://schemas.microsoft.com/office/powerpoint/2010/main" val="2190226404"/>
       </p:ext>
     </p:extLst>
   </p:cSld>
@@ -7632,7 +7103,7 @@
           <p:cNvPr id="2" name="Tytuł 1">
             <a:extLst>
               <a:ext uri="{FF2B5EF4-FFF2-40B4-BE49-F238E27FC236}">
-                <a16:creationId xmlns:a16="http://schemas.microsoft.com/office/drawing/2014/main" id="{26A9AB5A-4272-F863-AFED-718BB9082247}"/>
+                <a16:creationId xmlns:a16="http://schemas.microsoft.com/office/drawing/2014/main" id="{6680AB93-378F-E75D-E94F-D744665A2EFD}"/>
               </a:ext>
             </a:extLst>
           </p:cNvPr>
@@ -7649,36 +7120,22 @@
           <a:lstStyle/>
           <a:p>
             <a:r>
-              <a:rPr lang="pl-PL" dirty="0">
-                <a:ln>
-                  <a:solidFill>
-                    <a:prstClr val="black">
-                      <a:lumMod val="75000"/>
-                      <a:lumOff val="25000"/>
-                      <a:alpha val="10000"/>
-                    </a:prstClr>
-                  </a:solidFill>
-                </a:ln>
-                <a:effectLst>
-                  <a:outerShdw blurRad="9525" dist="25400" dir="14640000" algn="tl" rotWithShape="0">
-                    <a:prstClr val="black">
-                      <a:alpha val="30000"/>
-                    </a:prstClr>
-                  </a:outerShdw>
-                </a:effectLst>
-              </a:rPr>
-              <a:t>Wykorzystanie lokalizacji</a:t>
-            </a:r>
-            <a:endParaRPr lang="pl-PL" dirty="0"/>
+              <a:rPr lang="pl-PL" dirty="0" err="1"/>
+              <a:t>OpenWeather</a:t>
+            </a:r>
+            <a:r>
+              <a:rPr lang="pl-PL" dirty="0"/>
+              <a:t> – Plan </a:t>
+            </a:r>
           </a:p>
         </p:txBody>
       </p:sp>
       <p:pic>
         <p:nvPicPr>
-          <p:cNvPr id="8" name="Symbol zastępczy zawartości 7" descr="Obraz zawierający tekst, zrzut ekranu, Czcionka&#10;&#10;Opis wygenerowany automatycznie">
+          <p:cNvPr id="5" name="Symbol zastępczy zawartości 4">
             <a:extLst>
               <a:ext uri="{FF2B5EF4-FFF2-40B4-BE49-F238E27FC236}">
-                <a16:creationId xmlns:a16="http://schemas.microsoft.com/office/drawing/2014/main" id="{2C308CAF-9E8B-A3A1-8693-E270C47C6245}"/>
+                <a16:creationId xmlns:a16="http://schemas.microsoft.com/office/drawing/2014/main" id="{8440A564-63EC-36A4-6F92-AFC1C9B86768}"/>
               </a:ext>
             </a:extLst>
           </p:cNvPr>
@@ -7697,17 +7154,17 @@
         </p:blipFill>
         <p:spPr>
           <a:xfrm>
-            <a:off x="422141" y="3061864"/>
-            <a:ext cx="7877175" cy="1276350"/>
+            <a:off x="2408688" y="5277949"/>
+            <a:ext cx="7057268" cy="1469895"/>
           </a:xfrm>
         </p:spPr>
       </p:pic>
       <p:pic>
         <p:nvPicPr>
-          <p:cNvPr id="7" name="Picture 7" descr="A red location pin with a circle in the middle&#10;&#10;Description automatically generated">
+          <p:cNvPr id="9" name="Obraz 8">
             <a:extLst>
               <a:ext uri="{FF2B5EF4-FFF2-40B4-BE49-F238E27FC236}">
-                <a16:creationId xmlns:a16="http://schemas.microsoft.com/office/drawing/2014/main" id="{FEA52D90-C60C-8660-6CE6-1F1151981E32}"/>
+                <a16:creationId xmlns:a16="http://schemas.microsoft.com/office/drawing/2014/main" id="{66FA00FB-DD90-F10A-2F05-703A2BA1CA6B}"/>
               </a:ext>
             </a:extLst>
           </p:cNvPr>
@@ -7717,67 +7174,25 @@
           <p:nvPr/>
         </p:nvPicPr>
         <p:blipFill>
-          <a:blip r:embed="rId3">
-            <a:extLst>
-              <a:ext uri="{28A0092B-C50C-407E-A947-70E740481C1C}">
-                <a14:useLocalDpi xmlns:a14="http://schemas.microsoft.com/office/drawing/2010/main" val="0"/>
-              </a:ext>
-            </a:extLst>
-          </a:blip>
+          <a:blip r:embed="rId3"/>
           <a:stretch>
             <a:fillRect/>
           </a:stretch>
         </p:blipFill>
         <p:spPr>
           <a:xfrm>
-            <a:off x="8124910" y="1808058"/>
-            <a:ext cx="3299400" cy="3247914"/>
+            <a:off x="4605543" y="1580050"/>
+            <a:ext cx="2970265" cy="3538383"/>
           </a:xfrm>
           <a:prstGeom prst="rect">
             <a:avLst/>
           </a:prstGeom>
         </p:spPr>
       </p:pic>
-      <p:sp>
-        <p:nvSpPr>
-          <p:cNvPr id="11" name="TextBox 11">
-            <a:extLst>
-              <a:ext uri="{FF2B5EF4-FFF2-40B4-BE49-F238E27FC236}">
-                <a16:creationId xmlns:a16="http://schemas.microsoft.com/office/drawing/2014/main" id="{C6B66A61-1AE6-58F7-74B5-9473BA81C8E4}"/>
-              </a:ext>
-            </a:extLst>
-          </p:cNvPr>
-          <p:cNvSpPr txBox="1"/>
-          <p:nvPr/>
-        </p:nvSpPr>
-        <p:spPr>
-          <a:xfrm>
-            <a:off x="1436544" y="2521053"/>
-            <a:ext cx="6954402" cy="523220"/>
-          </a:xfrm>
-          <a:prstGeom prst="rect">
-            <a:avLst/>
-          </a:prstGeom>
-          <a:noFill/>
-        </p:spPr>
-        <p:txBody>
-          <a:bodyPr wrap="square" lIns="91440" tIns="45720" rIns="91440" bIns="45720" rtlCol="0" anchor="t">
-            <a:spAutoFit/>
-          </a:bodyPr>
-          <a:lstStyle/>
-          <a:p>
-            <a:r>
-              <a:rPr lang="pl-PL" sz="2800" dirty="0"/>
-              <a:t>Sprawdzenie uprawnień aplikacji</a:t>
-            </a:r>
-            <a:endParaRPr lang="pl-PL" dirty="0"/>
-          </a:p>
-        </p:txBody>
-      </p:sp>
     </p:spTree>
     <p:extLst>
       <p:ext uri="{BB962C8B-B14F-4D97-AF65-F5344CB8AC3E}">
-        <p14:creationId xmlns:p14="http://schemas.microsoft.com/office/powerpoint/2010/main" val="2508872199"/>
+        <p14:creationId xmlns:p14="http://schemas.microsoft.com/office/powerpoint/2010/main" val="1820885349"/>
       </p:ext>
     </p:extLst>
   </p:cSld>
@@ -7809,7 +7224,7 @@
           <p:cNvPr id="2" name="Tytuł 1">
             <a:extLst>
               <a:ext uri="{FF2B5EF4-FFF2-40B4-BE49-F238E27FC236}">
-                <a16:creationId xmlns:a16="http://schemas.microsoft.com/office/drawing/2014/main" id="{7290EBE8-B550-D4D8-353A-E08A4B838078}"/>
+                <a16:creationId xmlns:a16="http://schemas.microsoft.com/office/drawing/2014/main" id="{39D1C695-97F5-FC6D-8D4F-7E43D8B3CAD2}"/>
               </a:ext>
             </a:extLst>
           </p:cNvPr>
@@ -7826,45 +7241,125 @@
           <a:lstStyle/>
           <a:p>
             <a:r>
-              <a:rPr lang="pl-PL" dirty="0">
-                <a:ln>
-                  <a:solidFill>
-                    <a:prstClr val="black">
-                      <a:lumMod val="75000"/>
-                      <a:lumOff val="25000"/>
-                      <a:alpha val="10000"/>
-                    </a:prstClr>
-                  </a:solidFill>
-                </a:ln>
-                <a:effectLst>
-                  <a:outerShdw blurRad="9525" dist="25400" dir="14640000" algn="tl" rotWithShape="0">
-                    <a:prstClr val="black">
-                      <a:alpha val="30000"/>
-                    </a:prstClr>
-                  </a:outerShdw>
-                </a:effectLst>
-              </a:rPr>
-              <a:t>Wykorzystanie lokalizacji</a:t>
-            </a:r>
+              <a:rPr lang="pl-PL" dirty="0" err="1"/>
+              <a:t>OpenWeather</a:t>
+            </a:r>
+            <a:r>
+              <a:rPr lang="pl-PL" dirty="0"/>
+              <a:t> – Jak zacząć?</a:t>
+            </a:r>
+          </a:p>
+        </p:txBody>
+      </p:sp>
+      <p:sp>
+        <p:nvSpPr>
+          <p:cNvPr id="3" name="Symbol zastępczy zawartości 2">
+            <a:extLst>
+              <a:ext uri="{FF2B5EF4-FFF2-40B4-BE49-F238E27FC236}">
+                <a16:creationId xmlns:a16="http://schemas.microsoft.com/office/drawing/2014/main" id="{AE312449-307C-D9ED-8B46-1933E96AEF8C}"/>
+              </a:ext>
+            </a:extLst>
+          </p:cNvPr>
+          <p:cNvSpPr>
+            <a:spLocks noGrp="1"/>
+          </p:cNvSpPr>
+          <p:nvPr>
+            <p:ph idx="1"/>
+          </p:nvPr>
+        </p:nvSpPr>
+        <p:spPr/>
+        <p:txBody>
+          <a:bodyPr/>
+          <a:lstStyle/>
+          <a:p>
+            <a:r>
+              <a:rPr lang="pl-PL" dirty="0" err="1"/>
+              <a:t>Skrotowe</a:t>
+            </a:r>
+            <a:r>
+              <a:rPr lang="pl-PL" dirty="0"/>
+              <a:t> myśli „Niestety </a:t>
+            </a:r>
+            <a:r>
+              <a:rPr lang="pl-PL" dirty="0" err="1"/>
+              <a:t>OpenWeather</a:t>
+            </a:r>
+            <a:r>
+              <a:rPr lang="pl-PL" dirty="0"/>
+              <a:t> od 2023 wprowadziło </a:t>
+            </a:r>
+            <a:r>
+              <a:rPr lang="pl-PL" dirty="0" err="1"/>
+              <a:t>wymog</a:t>
+            </a:r>
+            <a:r>
+              <a:rPr lang="pl-PL" dirty="0"/>
+              <a:t> że potrzeba szerokości geograficznej aby wyszukać prognozę pogody nie jak wcześniej że po samej nazwie </a:t>
+            </a:r>
+            <a:r>
+              <a:rPr lang="pl-PL" dirty="0" err="1"/>
+              <a:t>miejscowosci</a:t>
+            </a:r>
+            <a:r>
+              <a:rPr lang="pl-PL" dirty="0"/>
+              <a:t>”</a:t>
+            </a:r>
+          </a:p>
+          <a:p>
+            <a:r>
+              <a:rPr lang="pl-PL" dirty="0"/>
+              <a:t>Potrzebujemy zatem wyszukać szerokości geograficzne podanej przez użytkownika miejscowości , skorzystamy z  </a:t>
+            </a:r>
+            <a:r>
+              <a:rPr lang="pl-PL" dirty="0" err="1"/>
+              <a:t>Geocoder</a:t>
+            </a:r>
+            <a:r>
+              <a:rPr lang="pl-PL" dirty="0"/>
+              <a:t> API Open </a:t>
+            </a:r>
+            <a:r>
+              <a:rPr lang="pl-PL" dirty="0" err="1"/>
+              <a:t>Weather</a:t>
+            </a:r>
+            <a:r>
+              <a:rPr lang="pl-PL" dirty="0"/>
+              <a:t> (Dokumentacja git warto skorzystać z niej)</a:t>
+            </a:r>
+          </a:p>
+          <a:p>
+            <a:endParaRPr lang="pl-PL" dirty="0"/>
+          </a:p>
+          <a:p>
+            <a:pPr marL="36900" indent="0">
+              <a:buNone/>
+            </a:pPr>
+            <a:r>
+              <a:rPr lang="pl-PL" dirty="0"/>
+              <a:t> </a:t>
+            </a:r>
+          </a:p>
+          <a:p>
+            <a:pPr marL="36900" indent="0">
+              <a:buNone/>
+            </a:pPr>
             <a:endParaRPr lang="pl-PL" dirty="0"/>
           </a:p>
         </p:txBody>
       </p:sp>
       <p:pic>
         <p:nvPicPr>
-          <p:cNvPr id="7" name="Symbol zastępczy zawartości 6" descr="Obraz zawierający tekst, zrzut ekranu, Czcionka, oprogramowanie&#10;&#10;Opis wygenerowany automatycznie">
+          <p:cNvPr id="5" name="Obraz 4">
             <a:extLst>
               <a:ext uri="{FF2B5EF4-FFF2-40B4-BE49-F238E27FC236}">
-                <a16:creationId xmlns:a16="http://schemas.microsoft.com/office/drawing/2014/main" id="{A01C630D-94E9-B72D-ED54-6318120A5604}"/>
+                <a16:creationId xmlns:a16="http://schemas.microsoft.com/office/drawing/2014/main" id="{048ABD7B-2752-EF3F-82F9-7B37FAAEF920}"/>
               </a:ext>
             </a:extLst>
           </p:cNvPr>
           <p:cNvPicPr>
-            <a:picLocks noGrp="1" noChangeAspect="1"/>
+            <a:picLocks noChangeAspect="1"/>
           </p:cNvPicPr>
-          <p:nvPr>
-            <p:ph idx="1"/>
-          </p:nvPr>
+          <p:nvPr/>
         </p:nvPicPr>
         <p:blipFill>
           <a:blip r:embed="rId2"/>
@@ -7874,15 +7369,18 @@
         </p:blipFill>
         <p:spPr>
           <a:xfrm>
-            <a:off x="1290076" y="2004462"/>
-            <a:ext cx="9601200" cy="3514725"/>
-          </a:xfrm>
+            <a:off x="3679534" y="3761824"/>
+            <a:ext cx="4258049" cy="3027512"/>
+          </a:xfrm>
+          <a:prstGeom prst="rect">
+            <a:avLst/>
+          </a:prstGeom>
         </p:spPr>
       </p:pic>
     </p:spTree>
     <p:extLst>
       <p:ext uri="{BB962C8B-B14F-4D97-AF65-F5344CB8AC3E}">
-        <p14:creationId xmlns:p14="http://schemas.microsoft.com/office/powerpoint/2010/main" val="911334357"/>
+        <p14:creationId xmlns:p14="http://schemas.microsoft.com/office/powerpoint/2010/main" val="1000054552"/>
       </p:ext>
     </p:extLst>
   </p:cSld>
@@ -7909,12 +7407,44 @@
           <a:chExt cx="0" cy="0"/>
         </a:xfrm>
       </p:grpSpPr>
+      <p:sp>
+        <p:nvSpPr>
+          <p:cNvPr id="2" name="Tytuł 1">
+            <a:extLst>
+              <a:ext uri="{FF2B5EF4-FFF2-40B4-BE49-F238E27FC236}">
+                <a16:creationId xmlns:a16="http://schemas.microsoft.com/office/drawing/2014/main" id="{86FB530B-037C-24CE-A143-7B034B326481}"/>
+              </a:ext>
+            </a:extLst>
+          </p:cNvPr>
+          <p:cNvSpPr>
+            <a:spLocks noGrp="1"/>
+          </p:cNvSpPr>
+          <p:nvPr>
+            <p:ph type="title"/>
+          </p:nvPr>
+        </p:nvSpPr>
+        <p:spPr/>
+        <p:txBody>
+          <a:bodyPr/>
+          <a:lstStyle/>
+          <a:p>
+            <a:r>
+              <a:rPr lang="pl-PL" dirty="0" err="1"/>
+              <a:t>OpenWeather</a:t>
+            </a:r>
+            <a:r>
+              <a:rPr lang="pl-PL" dirty="0"/>
+              <a:t> – Odpowiedz API</a:t>
+            </a:r>
+          </a:p>
+        </p:txBody>
+      </p:sp>
       <p:pic>
         <p:nvPicPr>
-          <p:cNvPr id="11" name="Picture 10" descr="A yellow sun with black background&#10;&#10;Description automatically generated">
+          <p:cNvPr id="7" name="Obraz 6">
             <a:extLst>
               <a:ext uri="{FF2B5EF4-FFF2-40B4-BE49-F238E27FC236}">
-                <a16:creationId xmlns:a16="http://schemas.microsoft.com/office/drawing/2014/main" id="{6758B9F0-4EAD-04A3-6DD6-5EEBBC165C96}"/>
+                <a16:creationId xmlns:a16="http://schemas.microsoft.com/office/drawing/2014/main" id="{9EF7EA9F-4D93-C410-D549-00F3D256833A}"/>
               </a:ext>
             </a:extLst>
           </p:cNvPr>
@@ -7924,21 +7454,15 @@
           <p:nvPr/>
         </p:nvPicPr>
         <p:blipFill>
-          <a:blip r:embed="rId2">
-            <a:extLst>
-              <a:ext uri="{28A0092B-C50C-407E-A947-70E740481C1C}">
-                <a14:useLocalDpi xmlns:a14="http://schemas.microsoft.com/office/drawing/2010/main" val="0"/>
-              </a:ext>
-            </a:extLst>
-          </a:blip>
+          <a:blip r:embed="rId2"/>
           <a:stretch>
             <a:fillRect/>
           </a:stretch>
         </p:blipFill>
         <p:spPr>
           <a:xfrm>
-            <a:off x="-582964" y="-579337"/>
-            <a:ext cx="1725966" cy="1725966"/>
+            <a:off x="292627" y="1948261"/>
+            <a:ext cx="11282924" cy="963750"/>
           </a:xfrm>
           <a:prstGeom prst="rect">
             <a:avLst/>
@@ -7947,10 +7471,10 @@
       </p:pic>
       <p:sp>
         <p:nvSpPr>
-          <p:cNvPr id="2" name="Title 1">
+          <p:cNvPr id="10" name="Symbol zastępczy zawartości 9">
             <a:extLst>
               <a:ext uri="{FF2B5EF4-FFF2-40B4-BE49-F238E27FC236}">
-                <a16:creationId xmlns:a16="http://schemas.microsoft.com/office/drawing/2014/main" id="{4652AB7B-027D-C765-D4EA-D50A06A0C5C0}"/>
+                <a16:creationId xmlns:a16="http://schemas.microsoft.com/office/drawing/2014/main" id="{7EAD116C-96A9-7468-EBFA-6A61ABF4D262}"/>
               </a:ext>
             </a:extLst>
           </p:cNvPr>
@@ -7958,50 +7482,82 @@
             <a:spLocks noGrp="1"/>
           </p:cNvSpPr>
           <p:nvPr>
-            <p:ph type="ctrTitle"/>
-          </p:nvPr>
-        </p:nvSpPr>
-        <p:spPr>
-          <a:xfrm>
-            <a:off x="1370693" y="1718738"/>
-            <a:ext cx="9440034" cy="1828801"/>
-          </a:xfrm>
-        </p:spPr>
+            <p:ph idx="1"/>
+          </p:nvPr>
+        </p:nvSpPr>
+        <p:spPr/>
         <p:txBody>
           <a:bodyPr/>
           <a:lstStyle/>
           <a:p>
+            <a:endParaRPr lang="pl-PL" dirty="0"/>
+          </a:p>
+        </p:txBody>
+      </p:sp>
+    </p:spTree>
+    <p:extLst>
+      <p:ext uri="{BB962C8B-B14F-4D97-AF65-F5344CB8AC3E}">
+        <p14:creationId xmlns:p14="http://schemas.microsoft.com/office/powerpoint/2010/main" val="2086475549"/>
+      </p:ext>
+    </p:extLst>
+  </p:cSld>
+  <p:clrMapOvr>
+    <a:masterClrMapping/>
+  </p:clrMapOvr>
+</p:sld>
+</file>
+
+<file path=ppt/slides/slide18.xml><?xml version="1.0" encoding="utf-8"?>
+<p:sld xmlns:a="http://schemas.openxmlformats.org/drawingml/2006/main" xmlns:r="http://schemas.openxmlformats.org/officeDocument/2006/relationships" xmlns:p="http://schemas.openxmlformats.org/presentationml/2006/main">
+  <p:cSld>
+    <p:spTree>
+      <p:nvGrpSpPr>
+        <p:cNvPr id="1" name=""/>
+        <p:cNvGrpSpPr/>
+        <p:nvPr/>
+      </p:nvGrpSpPr>
+      <p:grpSpPr>
+        <a:xfrm>
+          <a:off x="0" y="0"/>
+          <a:ext cx="0" cy="0"/>
+          <a:chOff x="0" y="0"/>
+          <a:chExt cx="0" cy="0"/>
+        </a:xfrm>
+      </p:grpSpPr>
+      <p:sp>
+        <p:nvSpPr>
+          <p:cNvPr id="2" name="Tytuł 1">
+            <a:extLst>
+              <a:ext uri="{FF2B5EF4-FFF2-40B4-BE49-F238E27FC236}">
+                <a16:creationId xmlns:a16="http://schemas.microsoft.com/office/drawing/2014/main" id="{D9E8BEE9-9ADC-2D46-0946-A85EEC1145BB}"/>
+              </a:ext>
+            </a:extLst>
+          </p:cNvPr>
+          <p:cNvSpPr>
+            <a:spLocks noGrp="1"/>
+          </p:cNvSpPr>
+          <p:nvPr>
+            <p:ph type="title"/>
+          </p:nvPr>
+        </p:nvSpPr>
+        <p:spPr/>
+        <p:txBody>
+          <a:bodyPr/>
+          <a:lstStyle/>
+          <a:p>
             <a:r>
               <a:rPr lang="pl-PL" dirty="0"/>
-              <a:t>Prezentacja działania aplikacji</a:t>
-            </a:r>
-            <a:endParaRPr lang="pl-PL" dirty="0">
-              <a:ln>
-                <a:solidFill>
-                  <a:prstClr val="black">
-                    <a:lumMod val="75000"/>
-                    <a:lumOff val="25000"/>
-                    <a:alpha val="10000"/>
-                  </a:prstClr>
-                </a:solidFill>
-              </a:ln>
-              <a:effectLst>
-                <a:outerShdw blurRad="9525" dist="25400" dir="14640000" algn="tl" rotWithShape="0">
-                  <a:prstClr val="black">
-                    <a:alpha val="30000"/>
-                  </a:prstClr>
-                </a:outerShdw>
-              </a:effectLst>
-            </a:endParaRPr>
-          </a:p>
-        </p:txBody>
-      </p:sp>
-      <p:sp>
-        <p:nvSpPr>
-          <p:cNvPr id="3" name="Subtitle 2">
+              <a:t>Jak poradzić sobie z JSON-em?</a:t>
+            </a:r>
+          </a:p>
+        </p:txBody>
+      </p:sp>
+      <p:sp>
+        <p:nvSpPr>
+          <p:cNvPr id="3" name="Symbol zastępczy zawartości 2">
             <a:extLst>
               <a:ext uri="{FF2B5EF4-FFF2-40B4-BE49-F238E27FC236}">
-                <a16:creationId xmlns:a16="http://schemas.microsoft.com/office/drawing/2014/main" id="{B621761A-B99C-DD9C-B836-6A1354073E4A}"/>
+                <a16:creationId xmlns:a16="http://schemas.microsoft.com/office/drawing/2014/main" id="{8E358CCB-20DC-9DD0-8191-E0C63677770D}"/>
               </a:ext>
             </a:extLst>
           </p:cNvPr>
@@ -8009,46 +7565,59 @@
             <a:spLocks noGrp="1"/>
           </p:cNvSpPr>
           <p:nvPr>
-            <p:ph type="subTitle" idx="1"/>
-          </p:nvPr>
-        </p:nvSpPr>
-        <p:spPr>
-          <a:xfrm>
-            <a:off x="1416626" y="6214539"/>
-            <a:ext cx="8359627" cy="740822"/>
-          </a:xfrm>
-        </p:spPr>
+            <p:ph idx="1"/>
+          </p:nvPr>
+        </p:nvSpPr>
+        <p:spPr/>
         <p:txBody>
           <a:bodyPr/>
           <a:lstStyle/>
           <a:p>
-            <a:endParaRPr lang="pl-PL">
-              <a:ln>
-                <a:solidFill>
-                  <a:prstClr val="black">
-                    <a:lumMod val="75000"/>
-                    <a:lumOff val="25000"/>
-                    <a:alpha val="10000"/>
-                  </a:prstClr>
-                </a:solidFill>
-              </a:ln>
-              <a:effectLst>
-                <a:outerShdw blurRad="9525" dist="25400" dir="14640000" algn="tl" rotWithShape="0">
-                  <a:prstClr val="black">
-                    <a:alpha val="30000"/>
-                  </a:prstClr>
-                </a:outerShdw>
-              </a:effectLst>
-            </a:endParaRPr>
+            <a:r>
+              <a:rPr lang="pl-PL" dirty="0"/>
+              <a:t>Warto skorzystać z pomocy takich </a:t>
+            </a:r>
+            <a:r>
+              <a:rPr lang="pl-PL" dirty="0" err="1"/>
+              <a:t>narzedzi</a:t>
+            </a:r>
+            <a:r>
+              <a:rPr lang="pl-PL" dirty="0"/>
+              <a:t> formatujących odpowiedzi API jak </a:t>
+            </a:r>
+            <a:r>
+              <a:rPr lang="pl-PL" dirty="0" err="1"/>
+              <a:t>JsonViewer</a:t>
+            </a:r>
+            <a:r>
+              <a:rPr lang="pl-PL" dirty="0"/>
+              <a:t> https://jsonviewer.stack.hu/ kopiujemy odpowiedz API i </a:t>
+            </a:r>
+            <a:r>
+              <a:rPr lang="pl-PL" dirty="0" err="1"/>
+              <a:t>wklejami</a:t>
+            </a:r>
+            <a:r>
+              <a:rPr lang="pl-PL" dirty="0"/>
+              <a:t> ja do </a:t>
+            </a:r>
+            <a:r>
+              <a:rPr lang="pl-PL" dirty="0" err="1"/>
+              <a:t>JsonViewer</a:t>
+            </a:r>
+            <a:r>
+              <a:rPr lang="pl-PL" dirty="0"/>
+              <a:t> dzięki któremu nasza odpowiedz API jest czytelniejsza i można połapać się o co w niej chodzi, co pomoże nam w dalszej pracy z JSON-em i wyłuskiwaniem danych.</a:t>
+            </a:r>
           </a:p>
         </p:txBody>
       </p:sp>
       <p:pic>
         <p:nvPicPr>
-          <p:cNvPr id="13" name="Picture 12" descr="A blue cloud with rain drops&#10;&#10;Description automatically generated">
+          <p:cNvPr id="7" name="Obraz 6">
             <a:extLst>
               <a:ext uri="{FF2B5EF4-FFF2-40B4-BE49-F238E27FC236}">
-                <a16:creationId xmlns:a16="http://schemas.microsoft.com/office/drawing/2014/main" id="{D33654B6-7546-AF8B-43F8-A2184F237DF5}"/>
+                <a16:creationId xmlns:a16="http://schemas.microsoft.com/office/drawing/2014/main" id="{1D5434AF-9EA9-8F08-BA9D-C1C7FD99D443}"/>
               </a:ext>
             </a:extLst>
           </p:cNvPr>
@@ -8058,33 +7627,85 @@
           <p:nvPr/>
         </p:nvPicPr>
         <p:blipFill>
-          <a:blip r:embed="rId3">
-            <a:extLst>
-              <a:ext uri="{28A0092B-C50C-407E-A947-70E740481C1C}">
-                <a14:useLocalDpi xmlns:a14="http://schemas.microsoft.com/office/drawing/2010/main" val="0"/>
-              </a:ext>
-            </a:extLst>
-          </a:blip>
+          <a:blip r:embed="rId2"/>
           <a:stretch>
             <a:fillRect/>
           </a:stretch>
         </p:blipFill>
         <p:spPr>
           <a:xfrm>
-            <a:off x="9234718" y="283646"/>
-            <a:ext cx="2071609" cy="2071609"/>
+            <a:off x="3678360" y="3201022"/>
+            <a:ext cx="4629796" cy="3353268"/>
           </a:xfrm>
           <a:prstGeom prst="rect">
             <a:avLst/>
           </a:prstGeom>
         </p:spPr>
       </p:pic>
+    </p:spTree>
+    <p:extLst>
+      <p:ext uri="{BB962C8B-B14F-4D97-AF65-F5344CB8AC3E}">
+        <p14:creationId xmlns:p14="http://schemas.microsoft.com/office/powerpoint/2010/main" val="2218385880"/>
+      </p:ext>
+    </p:extLst>
+  </p:cSld>
+  <p:clrMapOvr>
+    <a:masterClrMapping/>
+  </p:clrMapOvr>
+</p:sld>
+</file>
+
+<file path=ppt/slides/slide19.xml><?xml version="1.0" encoding="utf-8"?>
+<p:sld xmlns:a="http://schemas.openxmlformats.org/drawingml/2006/main" xmlns:r="http://schemas.openxmlformats.org/officeDocument/2006/relationships" xmlns:p="http://schemas.openxmlformats.org/presentationml/2006/main">
+  <p:cSld>
+    <p:spTree>
+      <p:nvGrpSpPr>
+        <p:cNvPr id="1" name=""/>
+        <p:cNvGrpSpPr/>
+        <p:nvPr/>
+      </p:nvGrpSpPr>
+      <p:grpSpPr>
+        <a:xfrm>
+          <a:off x="0" y="0"/>
+          <a:ext cx="0" cy="0"/>
+          <a:chOff x="0" y="0"/>
+          <a:chExt cx="0" cy="0"/>
+        </a:xfrm>
+      </p:grpSpPr>
+      <p:sp>
+        <p:nvSpPr>
+          <p:cNvPr id="2" name="Tytuł 1">
+            <a:extLst>
+              <a:ext uri="{FF2B5EF4-FFF2-40B4-BE49-F238E27FC236}">
+                <a16:creationId xmlns:a16="http://schemas.microsoft.com/office/drawing/2014/main" id="{E51F58DB-92A1-8DEE-E729-A5C2B4705C2A}"/>
+              </a:ext>
+            </a:extLst>
+          </p:cNvPr>
+          <p:cNvSpPr>
+            <a:spLocks noGrp="1"/>
+          </p:cNvSpPr>
+          <p:nvPr>
+            <p:ph type="title"/>
+          </p:nvPr>
+        </p:nvSpPr>
+        <p:spPr/>
+        <p:txBody>
+          <a:bodyPr/>
+          <a:lstStyle/>
+          <a:p>
+            <a:r>
+              <a:rPr lang="pl-PL" dirty="0"/>
+              <a:t>Wyłuskiwanie danych z JSON-a</a:t>
+            </a:r>
+          </a:p>
+        </p:txBody>
+      </p:sp>
       <p:pic>
         <p:nvPicPr>
-          <p:cNvPr id="15" name="Picture 14" descr="A thermometer with a red circle&#10;&#10;Description automatically generated">
+          <p:cNvPr id="6" name="Obraz 5">
             <a:extLst>
               <a:ext uri="{FF2B5EF4-FFF2-40B4-BE49-F238E27FC236}">
-                <a16:creationId xmlns:a16="http://schemas.microsoft.com/office/drawing/2014/main" id="{0D68F01F-8A9F-DEC9-346D-A7A5F91A206F}"/>
+                <a16:creationId xmlns:a16="http://schemas.microsoft.com/office/drawing/2014/main" id="{B2816C5F-6E43-D884-7EEA-BEB2D65BC605}"/>
               </a:ext>
             </a:extLst>
           </p:cNvPr>
@@ -8094,33 +7715,52 @@
           <p:nvPr/>
         </p:nvPicPr>
         <p:blipFill>
-          <a:blip r:embed="rId4">
-            <a:extLst>
-              <a:ext uri="{28A0092B-C50C-407E-A947-70E740481C1C}">
-                <a14:useLocalDpi xmlns:a14="http://schemas.microsoft.com/office/drawing/2010/main" val="0"/>
-              </a:ext>
-            </a:extLst>
-          </a:blip>
+          <a:blip r:embed="rId2"/>
           <a:stretch>
             <a:fillRect/>
           </a:stretch>
         </p:blipFill>
         <p:spPr>
-          <a:xfrm rot="20616928">
-            <a:off x="379337" y="3633402"/>
-            <a:ext cx="2071919" cy="2071919"/>
+          <a:xfrm>
+            <a:off x="7298607" y="2354260"/>
+            <a:ext cx="4629796" cy="3353268"/>
           </a:xfrm>
           <a:prstGeom prst="rect">
             <a:avLst/>
           </a:prstGeom>
         </p:spPr>
       </p:pic>
+      <p:sp>
+        <p:nvSpPr>
+          <p:cNvPr id="8" name="Symbol zastępczy zawartości 7">
+            <a:extLst>
+              <a:ext uri="{FF2B5EF4-FFF2-40B4-BE49-F238E27FC236}">
+                <a16:creationId xmlns:a16="http://schemas.microsoft.com/office/drawing/2014/main" id="{1B5DC451-66A1-9161-67F2-18B3F05E0585}"/>
+              </a:ext>
+            </a:extLst>
+          </p:cNvPr>
+          <p:cNvSpPr>
+            <a:spLocks noGrp="1"/>
+          </p:cNvSpPr>
+          <p:nvPr>
+            <p:ph idx="1"/>
+          </p:nvPr>
+        </p:nvSpPr>
+        <p:spPr/>
+        <p:txBody>
+          <a:bodyPr/>
+          <a:lstStyle/>
+          <a:p>
+            <a:endParaRPr lang="pl-PL" dirty="0"/>
+          </a:p>
+        </p:txBody>
+      </p:sp>
       <p:pic>
         <p:nvPicPr>
-          <p:cNvPr id="17" name="Picture 16" descr="A green robot with two arms&#10;&#10;Description automatically generated">
+          <p:cNvPr id="12" name="Obraz 11">
             <a:extLst>
               <a:ext uri="{FF2B5EF4-FFF2-40B4-BE49-F238E27FC236}">
-                <a16:creationId xmlns:a16="http://schemas.microsoft.com/office/drawing/2014/main" id="{810F0172-0CF1-B0AC-8ED1-49993D0313F5}"/>
+                <a16:creationId xmlns:a16="http://schemas.microsoft.com/office/drawing/2014/main" id="{B5E74A79-FC44-4B30-C766-562824856392}"/>
               </a:ext>
             </a:extLst>
           </p:cNvPr>
@@ -8130,21 +7770,15 @@
           <p:nvPr/>
         </p:nvPicPr>
         <p:blipFill>
-          <a:blip r:embed="rId5">
-            <a:extLst>
-              <a:ext uri="{28A0092B-C50C-407E-A947-70E740481C1C}">
-                <a14:useLocalDpi xmlns:a14="http://schemas.microsoft.com/office/drawing/2010/main" val="0"/>
-              </a:ext>
-            </a:extLst>
-          </a:blip>
+          <a:blip r:embed="rId3"/>
           <a:stretch>
             <a:fillRect/>
           </a:stretch>
         </p:blipFill>
         <p:spPr>
           <a:xfrm>
-            <a:off x="8739117" y="4047108"/>
-            <a:ext cx="2071609" cy="2071609"/>
+            <a:off x="629086" y="2887038"/>
+            <a:ext cx="6480930" cy="1918159"/>
           </a:xfrm>
           <a:prstGeom prst="rect">
             <a:avLst/>
@@ -8154,7 +7788,7 @@
     </p:spTree>
     <p:extLst>
       <p:ext uri="{BB962C8B-B14F-4D97-AF65-F5344CB8AC3E}">
-        <p14:creationId xmlns:p14="http://schemas.microsoft.com/office/powerpoint/2010/main" val="2399576122"/>
+        <p14:creationId xmlns:p14="http://schemas.microsoft.com/office/powerpoint/2010/main" val="2131219339"/>
       </p:ext>
     </p:extLst>
   </p:cSld>
@@ -8538,6 +8172,1564 @@
     <p:extLst>
       <p:ext uri="{BB962C8B-B14F-4D97-AF65-F5344CB8AC3E}">
         <p14:creationId xmlns:p14="http://schemas.microsoft.com/office/powerpoint/2010/main" val="4239087136"/>
+      </p:ext>
+    </p:extLst>
+  </p:cSld>
+  <p:clrMapOvr>
+    <a:masterClrMapping/>
+  </p:clrMapOvr>
+</p:sld>
+</file>
+
+<file path=ppt/slides/slide20.xml><?xml version="1.0" encoding="utf-8"?>
+<p:sld xmlns:a="http://schemas.openxmlformats.org/drawingml/2006/main" xmlns:r="http://schemas.openxmlformats.org/officeDocument/2006/relationships" xmlns:p="http://schemas.openxmlformats.org/presentationml/2006/main">
+  <p:cSld>
+    <p:spTree>
+      <p:nvGrpSpPr>
+        <p:cNvPr id="1" name=""/>
+        <p:cNvGrpSpPr/>
+        <p:nvPr/>
+      </p:nvGrpSpPr>
+      <p:grpSpPr>
+        <a:xfrm>
+          <a:off x="0" y="0"/>
+          <a:ext cx="0" cy="0"/>
+          <a:chOff x="0" y="0"/>
+          <a:chExt cx="0" cy="0"/>
+        </a:xfrm>
+      </p:grpSpPr>
+      <p:sp>
+        <p:nvSpPr>
+          <p:cNvPr id="2" name="Tytuł 1">
+            <a:extLst>
+              <a:ext uri="{FF2B5EF4-FFF2-40B4-BE49-F238E27FC236}">
+                <a16:creationId xmlns:a16="http://schemas.microsoft.com/office/drawing/2014/main" id="{EDC07792-B78A-DDD1-BC81-81C2F466A58C}"/>
+              </a:ext>
+            </a:extLst>
+          </p:cNvPr>
+          <p:cNvSpPr>
+            <a:spLocks noGrp="1"/>
+          </p:cNvSpPr>
+          <p:nvPr>
+            <p:ph type="title"/>
+          </p:nvPr>
+        </p:nvSpPr>
+        <p:spPr/>
+        <p:txBody>
+          <a:bodyPr/>
+          <a:lstStyle/>
+          <a:p>
+            <a:r>
+              <a:rPr lang="pl-PL" dirty="0" err="1"/>
+              <a:t>OpenWeather</a:t>
+            </a:r>
+            <a:r>
+              <a:rPr lang="pl-PL" dirty="0"/>
+              <a:t> – API pogodowe</a:t>
+            </a:r>
+          </a:p>
+        </p:txBody>
+      </p:sp>
+      <p:sp>
+        <p:nvSpPr>
+          <p:cNvPr id="3" name="Symbol zastępczy zawartości 2">
+            <a:extLst>
+              <a:ext uri="{FF2B5EF4-FFF2-40B4-BE49-F238E27FC236}">
+                <a16:creationId xmlns:a16="http://schemas.microsoft.com/office/drawing/2014/main" id="{9AA1F083-E744-AD99-8C47-D13BBF37E978}"/>
+              </a:ext>
+            </a:extLst>
+          </p:cNvPr>
+          <p:cNvSpPr>
+            <a:spLocks noGrp="1"/>
+          </p:cNvSpPr>
+          <p:nvPr>
+            <p:ph idx="1"/>
+          </p:nvPr>
+        </p:nvSpPr>
+        <p:spPr>
+          <a:xfrm>
+            <a:off x="7140538" y="2410544"/>
+            <a:ext cx="3829067" cy="4058751"/>
+          </a:xfrm>
+        </p:spPr>
+        <p:txBody>
+          <a:bodyPr/>
+          <a:lstStyle/>
+          <a:p>
+            <a:r>
+              <a:rPr lang="pl-PL" dirty="0"/>
+              <a:t>Mamy już szerokość geograficzna naszej miejscowości więc teraz możemy zrobić zapytanie o aktualna </a:t>
+            </a:r>
+            <a:r>
+              <a:rPr lang="pl-PL" dirty="0" err="1"/>
+              <a:t>prognoze</a:t>
+            </a:r>
+            <a:r>
+              <a:rPr lang="pl-PL" dirty="0"/>
+              <a:t> pogody. </a:t>
+            </a:r>
+          </a:p>
+        </p:txBody>
+      </p:sp>
+      <p:pic>
+        <p:nvPicPr>
+          <p:cNvPr id="5" name="Obraz 4">
+            <a:extLst>
+              <a:ext uri="{FF2B5EF4-FFF2-40B4-BE49-F238E27FC236}">
+                <a16:creationId xmlns:a16="http://schemas.microsoft.com/office/drawing/2014/main" id="{0FA968B9-9DA8-A87B-DD86-928A8633ABFD}"/>
+              </a:ext>
+            </a:extLst>
+          </p:cNvPr>
+          <p:cNvPicPr>
+            <a:picLocks noChangeAspect="1"/>
+          </p:cNvPicPr>
+          <p:nvPr/>
+        </p:nvPicPr>
+        <p:blipFill>
+          <a:blip r:embed="rId2"/>
+          <a:stretch>
+            <a:fillRect/>
+          </a:stretch>
+        </p:blipFill>
+        <p:spPr>
+          <a:xfrm>
+            <a:off x="2051178" y="1660654"/>
+            <a:ext cx="4655322" cy="4808641"/>
+          </a:xfrm>
+          <a:prstGeom prst="rect">
+            <a:avLst/>
+          </a:prstGeom>
+        </p:spPr>
+      </p:pic>
+    </p:spTree>
+    <p:extLst>
+      <p:ext uri="{BB962C8B-B14F-4D97-AF65-F5344CB8AC3E}">
+        <p14:creationId xmlns:p14="http://schemas.microsoft.com/office/powerpoint/2010/main" val="747325663"/>
+      </p:ext>
+    </p:extLst>
+  </p:cSld>
+  <p:clrMapOvr>
+    <a:masterClrMapping/>
+  </p:clrMapOvr>
+</p:sld>
+</file>
+
+<file path=ppt/slides/slide21.xml><?xml version="1.0" encoding="utf-8"?>
+<p:sld xmlns:a="http://schemas.openxmlformats.org/drawingml/2006/main" xmlns:r="http://schemas.openxmlformats.org/officeDocument/2006/relationships" xmlns:p="http://schemas.openxmlformats.org/presentationml/2006/main">
+  <p:cSld>
+    <p:spTree>
+      <p:nvGrpSpPr>
+        <p:cNvPr id="1" name=""/>
+        <p:cNvGrpSpPr/>
+        <p:nvPr/>
+      </p:nvGrpSpPr>
+      <p:grpSpPr>
+        <a:xfrm>
+          <a:off x="0" y="0"/>
+          <a:ext cx="0" cy="0"/>
+          <a:chOff x="0" y="0"/>
+          <a:chExt cx="0" cy="0"/>
+        </a:xfrm>
+      </p:grpSpPr>
+      <p:sp>
+        <p:nvSpPr>
+          <p:cNvPr id="2" name="Tytuł 1">
+            <a:extLst>
+              <a:ext uri="{FF2B5EF4-FFF2-40B4-BE49-F238E27FC236}">
+                <a16:creationId xmlns:a16="http://schemas.microsoft.com/office/drawing/2014/main" id="{90BF28EE-D0F4-B874-87FB-8FA91FDC18D4}"/>
+              </a:ext>
+            </a:extLst>
+          </p:cNvPr>
+          <p:cNvSpPr>
+            <a:spLocks noGrp="1"/>
+          </p:cNvSpPr>
+          <p:nvPr>
+            <p:ph type="title"/>
+          </p:nvPr>
+        </p:nvSpPr>
+        <p:spPr/>
+        <p:txBody>
+          <a:bodyPr/>
+          <a:lstStyle/>
+          <a:p>
+            <a:r>
+              <a:rPr lang="pl-PL" dirty="0"/>
+              <a:t>Wyłuskiwanie danych pogodowych z JSON-a</a:t>
+            </a:r>
+          </a:p>
+        </p:txBody>
+      </p:sp>
+      <p:pic>
+        <p:nvPicPr>
+          <p:cNvPr id="5" name="Symbol zastępczy zawartości 4">
+            <a:extLst>
+              <a:ext uri="{FF2B5EF4-FFF2-40B4-BE49-F238E27FC236}">
+                <a16:creationId xmlns:a16="http://schemas.microsoft.com/office/drawing/2014/main" id="{B9403503-96EF-258B-D924-874CDE2B0B7F}"/>
+              </a:ext>
+            </a:extLst>
+          </p:cNvPr>
+          <p:cNvPicPr>
+            <a:picLocks noGrp="1" noChangeAspect="1"/>
+          </p:cNvPicPr>
+          <p:nvPr>
+            <p:ph idx="1"/>
+          </p:nvPr>
+        </p:nvPicPr>
+        <p:blipFill>
+          <a:blip r:embed="rId2"/>
+          <a:stretch>
+            <a:fillRect/>
+          </a:stretch>
+        </p:blipFill>
+        <p:spPr>
+          <a:xfrm>
+            <a:off x="1020909" y="2301411"/>
+            <a:ext cx="6345410" cy="3243210"/>
+          </a:xfrm>
+        </p:spPr>
+      </p:pic>
+      <p:pic>
+        <p:nvPicPr>
+          <p:cNvPr id="9" name="Obraz 8">
+            <a:extLst>
+              <a:ext uri="{FF2B5EF4-FFF2-40B4-BE49-F238E27FC236}">
+                <a16:creationId xmlns:a16="http://schemas.microsoft.com/office/drawing/2014/main" id="{0F90E0F9-3E36-DABF-4017-B5D03DE6B609}"/>
+              </a:ext>
+            </a:extLst>
+          </p:cNvPr>
+          <p:cNvPicPr>
+            <a:picLocks noChangeAspect="1"/>
+          </p:cNvPicPr>
+          <p:nvPr/>
+        </p:nvPicPr>
+        <p:blipFill>
+          <a:blip r:embed="rId3"/>
+          <a:stretch>
+            <a:fillRect/>
+          </a:stretch>
+        </p:blipFill>
+        <p:spPr>
+          <a:xfrm>
+            <a:off x="8257851" y="1536670"/>
+            <a:ext cx="2333951" cy="4772691"/>
+          </a:xfrm>
+          <a:prstGeom prst="rect">
+            <a:avLst/>
+          </a:prstGeom>
+        </p:spPr>
+      </p:pic>
+    </p:spTree>
+    <p:extLst>
+      <p:ext uri="{BB962C8B-B14F-4D97-AF65-F5344CB8AC3E}">
+        <p14:creationId xmlns:p14="http://schemas.microsoft.com/office/powerpoint/2010/main" val="2633772386"/>
+      </p:ext>
+    </p:extLst>
+  </p:cSld>
+  <p:clrMapOvr>
+    <a:masterClrMapping/>
+  </p:clrMapOvr>
+</p:sld>
+</file>
+
+<file path=ppt/slides/slide22.xml><?xml version="1.0" encoding="utf-8"?>
+<p:sld xmlns:a="http://schemas.openxmlformats.org/drawingml/2006/main" xmlns:r="http://schemas.openxmlformats.org/officeDocument/2006/relationships" xmlns:p="http://schemas.openxmlformats.org/presentationml/2006/main">
+  <p:cSld>
+    <p:spTree>
+      <p:nvGrpSpPr>
+        <p:cNvPr id="1" name=""/>
+        <p:cNvGrpSpPr/>
+        <p:nvPr/>
+      </p:nvGrpSpPr>
+      <p:grpSpPr>
+        <a:xfrm>
+          <a:off x="0" y="0"/>
+          <a:ext cx="0" cy="0"/>
+          <a:chOff x="0" y="0"/>
+          <a:chExt cx="0" cy="0"/>
+        </a:xfrm>
+      </p:grpSpPr>
+      <p:sp>
+        <p:nvSpPr>
+          <p:cNvPr id="2" name="Tytuł 1">
+            <a:extLst>
+              <a:ext uri="{FF2B5EF4-FFF2-40B4-BE49-F238E27FC236}">
+                <a16:creationId xmlns:a16="http://schemas.microsoft.com/office/drawing/2014/main" id="{C8B850F8-BB9E-1874-0FD0-C66F7EA6F02D}"/>
+              </a:ext>
+            </a:extLst>
+          </p:cNvPr>
+          <p:cNvSpPr>
+            <a:spLocks noGrp="1"/>
+          </p:cNvSpPr>
+          <p:nvPr>
+            <p:ph type="title"/>
+          </p:nvPr>
+        </p:nvSpPr>
+        <p:spPr/>
+        <p:txBody>
+          <a:bodyPr/>
+          <a:lstStyle/>
+          <a:p>
+            <a:r>
+              <a:rPr lang="pl-PL" dirty="0"/>
+              <a:t>Wyświetlenie danych w aplikacji</a:t>
+            </a:r>
+          </a:p>
+        </p:txBody>
+      </p:sp>
+      <p:pic>
+        <p:nvPicPr>
+          <p:cNvPr id="9" name="Obraz 8">
+            <a:extLst>
+              <a:ext uri="{FF2B5EF4-FFF2-40B4-BE49-F238E27FC236}">
+                <a16:creationId xmlns:a16="http://schemas.microsoft.com/office/drawing/2014/main" id="{8AFF9E21-E2BE-2051-03CA-02A8B175AEC6}"/>
+              </a:ext>
+            </a:extLst>
+          </p:cNvPr>
+          <p:cNvPicPr>
+            <a:picLocks noChangeAspect="1"/>
+          </p:cNvPicPr>
+          <p:nvPr/>
+        </p:nvPicPr>
+        <p:blipFill>
+          <a:blip r:embed="rId2"/>
+          <a:stretch>
+            <a:fillRect/>
+          </a:stretch>
+        </p:blipFill>
+        <p:spPr>
+          <a:xfrm>
+            <a:off x="913795" y="2326743"/>
+            <a:ext cx="10421804" cy="333422"/>
+          </a:xfrm>
+          <a:prstGeom prst="rect">
+            <a:avLst/>
+          </a:prstGeom>
+        </p:spPr>
+      </p:pic>
+      <p:sp>
+        <p:nvSpPr>
+          <p:cNvPr id="10" name="pole tekstowe 9">
+            <a:extLst>
+              <a:ext uri="{FF2B5EF4-FFF2-40B4-BE49-F238E27FC236}">
+                <a16:creationId xmlns:a16="http://schemas.microsoft.com/office/drawing/2014/main" id="{8D8DA635-FF26-8FD3-C17A-368A47AF3826}"/>
+              </a:ext>
+            </a:extLst>
+          </p:cNvPr>
+          <p:cNvSpPr txBox="1"/>
+          <p:nvPr/>
+        </p:nvSpPr>
+        <p:spPr>
+          <a:xfrm>
+            <a:off x="913795" y="1931542"/>
+            <a:ext cx="8456236" cy="369332"/>
+          </a:xfrm>
+          <a:prstGeom prst="rect">
+            <a:avLst/>
+          </a:prstGeom>
+          <a:noFill/>
+        </p:spPr>
+        <p:txBody>
+          <a:bodyPr wrap="square" rtlCol="0">
+            <a:spAutoFit/>
+          </a:bodyPr>
+          <a:lstStyle/>
+          <a:p>
+            <a:r>
+              <a:rPr lang="pl-PL" dirty="0"/>
+              <a:t>1) </a:t>
+            </a:r>
+            <a:r>
+              <a:rPr lang="pl-PL" dirty="0" err="1"/>
+              <a:t>Zdefiniowac</a:t>
+            </a:r>
+            <a:r>
+              <a:rPr lang="pl-PL" dirty="0"/>
+              <a:t> typ zmiennej i jej </a:t>
+            </a:r>
+            <a:r>
+              <a:rPr lang="pl-PL" dirty="0" err="1"/>
+              <a:t>nazwe</a:t>
+            </a:r>
+            <a:endParaRPr lang="pl-PL" dirty="0"/>
+          </a:p>
+        </p:txBody>
+      </p:sp>
+      <p:pic>
+        <p:nvPicPr>
+          <p:cNvPr id="12" name="Obraz 11">
+            <a:extLst>
+              <a:ext uri="{FF2B5EF4-FFF2-40B4-BE49-F238E27FC236}">
+                <a16:creationId xmlns:a16="http://schemas.microsoft.com/office/drawing/2014/main" id="{AEBDACD6-9AE9-A588-1D32-9CF8C534647A}"/>
+              </a:ext>
+            </a:extLst>
+          </p:cNvPr>
+          <p:cNvPicPr>
+            <a:picLocks noChangeAspect="1"/>
+          </p:cNvPicPr>
+          <p:nvPr/>
+        </p:nvPicPr>
+        <p:blipFill>
+          <a:blip r:embed="rId3"/>
+          <a:stretch>
+            <a:fillRect/>
+          </a:stretch>
+        </p:blipFill>
+        <p:spPr>
+          <a:xfrm>
+            <a:off x="1863283" y="3138097"/>
+            <a:ext cx="7506748" cy="1305107"/>
+          </a:xfrm>
+          <a:prstGeom prst="rect">
+            <a:avLst/>
+          </a:prstGeom>
+        </p:spPr>
+      </p:pic>
+      <p:sp>
+        <p:nvSpPr>
+          <p:cNvPr id="13" name="pole tekstowe 12">
+            <a:extLst>
+              <a:ext uri="{FF2B5EF4-FFF2-40B4-BE49-F238E27FC236}">
+                <a16:creationId xmlns:a16="http://schemas.microsoft.com/office/drawing/2014/main" id="{2139F3BA-599E-E36C-5F88-D799AF89C37C}"/>
+              </a:ext>
+            </a:extLst>
+          </p:cNvPr>
+          <p:cNvSpPr txBox="1"/>
+          <p:nvPr/>
+        </p:nvSpPr>
+        <p:spPr>
+          <a:xfrm>
+            <a:off x="913795" y="2660165"/>
+            <a:ext cx="9052138" cy="369332"/>
+          </a:xfrm>
+          <a:prstGeom prst="rect">
+            <a:avLst/>
+          </a:prstGeom>
+          <a:noFill/>
+        </p:spPr>
+        <p:txBody>
+          <a:bodyPr wrap="square" rtlCol="0">
+            <a:spAutoFit/>
+          </a:bodyPr>
+          <a:lstStyle/>
+          <a:p>
+            <a:r>
+              <a:rPr lang="pl-PL" dirty="0"/>
+              <a:t>2) Przypisać do zmiennej element o zadanym id podanym w trakcie projektowania</a:t>
+            </a:r>
+          </a:p>
+        </p:txBody>
+      </p:sp>
+      <p:sp>
+        <p:nvSpPr>
+          <p:cNvPr id="15" name="Symbol zastępczy zawartości 14">
+            <a:extLst>
+              <a:ext uri="{FF2B5EF4-FFF2-40B4-BE49-F238E27FC236}">
+                <a16:creationId xmlns:a16="http://schemas.microsoft.com/office/drawing/2014/main" id="{BD24CBE5-2B4C-223B-162B-34408982B913}"/>
+              </a:ext>
+            </a:extLst>
+          </p:cNvPr>
+          <p:cNvSpPr>
+            <a:spLocks noGrp="1"/>
+          </p:cNvSpPr>
+          <p:nvPr>
+            <p:ph idx="1"/>
+          </p:nvPr>
+        </p:nvSpPr>
+        <p:spPr>
+          <a:xfrm>
+            <a:off x="913795" y="4551804"/>
+            <a:ext cx="7506748" cy="503081"/>
+          </a:xfrm>
+        </p:spPr>
+        <p:txBody>
+          <a:bodyPr/>
+          <a:lstStyle/>
+          <a:p>
+            <a:pPr marL="36900" indent="0">
+              <a:buNone/>
+            </a:pPr>
+            <a:r>
+              <a:rPr lang="pl-PL" dirty="0"/>
+              <a:t>3) Ustawić wyświetlany tekst za pomocą </a:t>
+            </a:r>
+            <a:r>
+              <a:rPr lang="pl-PL" dirty="0" err="1"/>
+              <a:t>setText</a:t>
+            </a:r>
+            <a:r>
+              <a:rPr lang="pl-PL" dirty="0"/>
+              <a:t>()</a:t>
+            </a:r>
+          </a:p>
+        </p:txBody>
+      </p:sp>
+      <p:pic>
+        <p:nvPicPr>
+          <p:cNvPr id="17" name="Obraz 16">
+            <a:extLst>
+              <a:ext uri="{FF2B5EF4-FFF2-40B4-BE49-F238E27FC236}">
+                <a16:creationId xmlns:a16="http://schemas.microsoft.com/office/drawing/2014/main" id="{469EA8B0-AD74-75A3-7A6D-C3028BAA6878}"/>
+              </a:ext>
+            </a:extLst>
+          </p:cNvPr>
+          <p:cNvPicPr>
+            <a:picLocks noChangeAspect="1"/>
+          </p:cNvPicPr>
+          <p:nvPr/>
+        </p:nvPicPr>
+        <p:blipFill>
+          <a:blip r:embed="rId4"/>
+          <a:stretch>
+            <a:fillRect/>
+          </a:stretch>
+        </p:blipFill>
+        <p:spPr>
+          <a:xfrm>
+            <a:off x="1620673" y="5054885"/>
+            <a:ext cx="8745170" cy="1314633"/>
+          </a:xfrm>
+          <a:prstGeom prst="rect">
+            <a:avLst/>
+          </a:prstGeom>
+        </p:spPr>
+      </p:pic>
+    </p:spTree>
+    <p:extLst>
+      <p:ext uri="{BB962C8B-B14F-4D97-AF65-F5344CB8AC3E}">
+        <p14:creationId xmlns:p14="http://schemas.microsoft.com/office/powerpoint/2010/main" val="72863198"/>
+      </p:ext>
+    </p:extLst>
+  </p:cSld>
+  <p:clrMapOvr>
+    <a:masterClrMapping/>
+  </p:clrMapOvr>
+</p:sld>
+</file>
+
+<file path=ppt/slides/slide23.xml><?xml version="1.0" encoding="utf-8"?>
+<p:sld xmlns:a="http://schemas.openxmlformats.org/drawingml/2006/main" xmlns:r="http://schemas.openxmlformats.org/officeDocument/2006/relationships" xmlns:p="http://schemas.openxmlformats.org/presentationml/2006/main">
+  <p:cSld>
+    <p:spTree>
+      <p:nvGrpSpPr>
+        <p:cNvPr id="1" name=""/>
+        <p:cNvGrpSpPr/>
+        <p:nvPr/>
+      </p:nvGrpSpPr>
+      <p:grpSpPr>
+        <a:xfrm>
+          <a:off x="0" y="0"/>
+          <a:ext cx="0" cy="0"/>
+          <a:chOff x="0" y="0"/>
+          <a:chExt cx="0" cy="0"/>
+        </a:xfrm>
+      </p:grpSpPr>
+      <p:sp>
+        <p:nvSpPr>
+          <p:cNvPr id="2" name="Tytuł 1">
+            <a:extLst>
+              <a:ext uri="{FF2B5EF4-FFF2-40B4-BE49-F238E27FC236}">
+                <a16:creationId xmlns:a16="http://schemas.microsoft.com/office/drawing/2014/main" id="{EA4C8C52-36E0-374A-2E2E-BAEE71BBD001}"/>
+              </a:ext>
+            </a:extLst>
+          </p:cNvPr>
+          <p:cNvSpPr>
+            <a:spLocks noGrp="1"/>
+          </p:cNvSpPr>
+          <p:nvPr>
+            <p:ph type="title"/>
+          </p:nvPr>
+        </p:nvSpPr>
+        <p:spPr/>
+        <p:txBody>
+          <a:bodyPr/>
+          <a:lstStyle/>
+          <a:p>
+            <a:r>
+              <a:rPr lang="pl-PL" dirty="0"/>
+              <a:t>Wyświetlenie danych w aplikacji </a:t>
+            </a:r>
+          </a:p>
+        </p:txBody>
+      </p:sp>
+      <p:sp>
+        <p:nvSpPr>
+          <p:cNvPr id="3" name="Symbol zastępczy zawartości 2">
+            <a:extLst>
+              <a:ext uri="{FF2B5EF4-FFF2-40B4-BE49-F238E27FC236}">
+                <a16:creationId xmlns:a16="http://schemas.microsoft.com/office/drawing/2014/main" id="{9B9F6ECC-DF76-FEB1-C6A9-FA5BEA73783B}"/>
+              </a:ext>
+            </a:extLst>
+          </p:cNvPr>
+          <p:cNvSpPr>
+            <a:spLocks noGrp="1"/>
+          </p:cNvSpPr>
+          <p:nvPr>
+            <p:ph idx="1"/>
+          </p:nvPr>
+        </p:nvSpPr>
+        <p:spPr/>
+        <p:txBody>
+          <a:bodyPr/>
+          <a:lstStyle/>
+          <a:p>
+            <a:endParaRPr lang="pl-PL" dirty="0"/>
+          </a:p>
+        </p:txBody>
+      </p:sp>
+      <p:pic>
+        <p:nvPicPr>
+          <p:cNvPr id="5" name="Symbol zastępczy zawartości 4" descr="Obraz zawierający tekst, Czcionka, zrzut ekranu, numer&#10;&#10;Opis wygenerowany automatycznie">
+            <a:extLst>
+              <a:ext uri="{FF2B5EF4-FFF2-40B4-BE49-F238E27FC236}">
+                <a16:creationId xmlns:a16="http://schemas.microsoft.com/office/drawing/2014/main" id="{3088EF81-71A7-15FA-DF69-CD097FA97D1B}"/>
+              </a:ext>
+            </a:extLst>
+          </p:cNvPr>
+          <p:cNvPicPr>
+            <a:picLocks noChangeAspect="1"/>
+          </p:cNvPicPr>
+          <p:nvPr/>
+        </p:nvPicPr>
+        <p:blipFill>
+          <a:blip r:embed="rId2">
+            <a:extLst>
+              <a:ext uri="{28A0092B-C50C-407E-A947-70E740481C1C}">
+                <a14:useLocalDpi xmlns:a14="http://schemas.microsoft.com/office/drawing/2010/main" val="0"/>
+              </a:ext>
+            </a:extLst>
+          </a:blip>
+          <a:stretch>
+            <a:fillRect/>
+          </a:stretch>
+        </p:blipFill>
+        <p:spPr>
+          <a:xfrm>
+            <a:off x="3162879" y="2259228"/>
+            <a:ext cx="6010382" cy="3005191"/>
+          </a:xfrm>
+          <a:prstGeom prst="rect">
+            <a:avLst/>
+          </a:prstGeom>
+          <a:effectLst>
+            <a:outerShdw blurRad="25400" dir="17880000">
+              <a:srgbClr val="000000">
+                <a:alpha val="46000"/>
+              </a:srgbClr>
+            </a:outerShdw>
+          </a:effectLst>
+        </p:spPr>
+      </p:pic>
+    </p:spTree>
+    <p:extLst>
+      <p:ext uri="{BB962C8B-B14F-4D97-AF65-F5344CB8AC3E}">
+        <p14:creationId xmlns:p14="http://schemas.microsoft.com/office/powerpoint/2010/main" val="1325128164"/>
+      </p:ext>
+    </p:extLst>
+  </p:cSld>
+  <p:clrMapOvr>
+    <a:masterClrMapping/>
+  </p:clrMapOvr>
+</p:sld>
+</file>
+
+<file path=ppt/slides/slide24.xml><?xml version="1.0" encoding="utf-8"?>
+<p:sld xmlns:a="http://schemas.openxmlformats.org/drawingml/2006/main" xmlns:r="http://schemas.openxmlformats.org/officeDocument/2006/relationships" xmlns:p="http://schemas.openxmlformats.org/presentationml/2006/main">
+  <p:cSld>
+    <p:spTree>
+      <p:nvGrpSpPr>
+        <p:cNvPr id="1" name=""/>
+        <p:cNvGrpSpPr/>
+        <p:nvPr/>
+      </p:nvGrpSpPr>
+      <p:grpSpPr>
+        <a:xfrm>
+          <a:off x="0" y="0"/>
+          <a:ext cx="0" cy="0"/>
+          <a:chOff x="0" y="0"/>
+          <a:chExt cx="0" cy="0"/>
+        </a:xfrm>
+      </p:grpSpPr>
+      <p:sp>
+        <p:nvSpPr>
+          <p:cNvPr id="2" name="Tytuł 1">
+            <a:extLst>
+              <a:ext uri="{FF2B5EF4-FFF2-40B4-BE49-F238E27FC236}">
+                <a16:creationId xmlns:a16="http://schemas.microsoft.com/office/drawing/2014/main" id="{16DF0D97-7848-D1BF-A6ED-41F4B2A7BCE2}"/>
+              </a:ext>
+            </a:extLst>
+          </p:cNvPr>
+          <p:cNvSpPr>
+            <a:spLocks noGrp="1"/>
+          </p:cNvSpPr>
+          <p:nvPr>
+            <p:ph type="title"/>
+          </p:nvPr>
+        </p:nvSpPr>
+        <p:spPr/>
+        <p:txBody>
+          <a:bodyPr/>
+          <a:lstStyle/>
+          <a:p>
+            <a:endParaRPr lang="pl-PL" dirty="0"/>
+          </a:p>
+        </p:txBody>
+      </p:sp>
+      <p:sp>
+        <p:nvSpPr>
+          <p:cNvPr id="3" name="Symbol zastępczy zawartości 2">
+            <a:extLst>
+              <a:ext uri="{FF2B5EF4-FFF2-40B4-BE49-F238E27FC236}">
+                <a16:creationId xmlns:a16="http://schemas.microsoft.com/office/drawing/2014/main" id="{7E187508-2999-E309-638E-2BE9C68B01B8}"/>
+              </a:ext>
+            </a:extLst>
+          </p:cNvPr>
+          <p:cNvSpPr>
+            <a:spLocks noGrp="1"/>
+          </p:cNvSpPr>
+          <p:nvPr>
+            <p:ph idx="1"/>
+          </p:nvPr>
+        </p:nvSpPr>
+        <p:spPr/>
+        <p:txBody>
+          <a:bodyPr/>
+          <a:lstStyle/>
+          <a:p>
+            <a:pPr indent="-305435"/>
+            <a:r>
+              <a:rPr lang="pl-PL" dirty="0">
+                <a:ln>
+                  <a:solidFill>
+                    <a:prstClr val="black">
+                      <a:lumMod val="75000"/>
+                      <a:lumOff val="25000"/>
+                      <a:alpha val="10000"/>
+                    </a:prstClr>
+                  </a:solidFill>
+                </a:ln>
+                <a:effectLst>
+                  <a:outerShdw blurRad="9525" dist="25400" dir="14640000" algn="tl" rotWithShape="0">
+                    <a:prstClr val="black">
+                      <a:alpha val="30000"/>
+                    </a:prstClr>
+                  </a:outerShdw>
+                </a:effectLst>
+              </a:rPr>
+              <a:t>Tu cos daj o tym </a:t>
+            </a:r>
+            <a:r>
+              <a:rPr lang="pl-PL" dirty="0" err="1">
+                <a:ln>
+                  <a:solidFill>
+                    <a:prstClr val="black">
+                      <a:lumMod val="75000"/>
+                      <a:lumOff val="25000"/>
+                      <a:alpha val="10000"/>
+                    </a:prstClr>
+                  </a:solidFill>
+                </a:ln>
+                <a:effectLst>
+                  <a:outerShdw blurRad="9525" dist="25400" dir="14640000" algn="tl" rotWithShape="0">
+                    <a:prstClr val="black">
+                      <a:alpha val="30000"/>
+                    </a:prstClr>
+                  </a:outerShdw>
+                </a:effectLst>
+              </a:rPr>
+              <a:t>api</a:t>
+            </a:r>
+            <a:r>
+              <a:rPr lang="pl-PL" dirty="0">
+                <a:ln>
+                  <a:solidFill>
+                    <a:prstClr val="black">
+                      <a:lumMod val="75000"/>
+                      <a:lumOff val="25000"/>
+                      <a:alpha val="10000"/>
+                    </a:prstClr>
+                  </a:solidFill>
+                </a:ln>
+                <a:effectLst>
+                  <a:outerShdw blurRad="9525" dist="25400" dir="14640000" algn="tl" rotWithShape="0">
+                    <a:prstClr val="black">
+                      <a:alpha val="30000"/>
+                    </a:prstClr>
+                  </a:outerShdw>
+                </a:effectLst>
+              </a:rPr>
+              <a:t> które </a:t>
+            </a:r>
+            <a:r>
+              <a:rPr lang="pl-PL" dirty="0" err="1">
+                <a:ln>
+                  <a:solidFill>
+                    <a:prstClr val="black">
+                      <a:lumMod val="75000"/>
+                      <a:lumOff val="25000"/>
+                      <a:alpha val="10000"/>
+                    </a:prstClr>
+                  </a:solidFill>
+                </a:ln>
+                <a:effectLst>
+                  <a:outerShdw blurRad="9525" dist="25400" dir="14640000" algn="tl" rotWithShape="0">
+                    <a:prstClr val="black">
+                      <a:alpha val="30000"/>
+                    </a:prstClr>
+                  </a:outerShdw>
+                </a:effectLst>
+              </a:rPr>
+              <a:t>wybralismy</a:t>
+            </a:r>
+            <a:r>
+              <a:rPr lang="pl-PL" dirty="0">
+                <a:ln>
+                  <a:solidFill>
+                    <a:prstClr val="black">
+                      <a:lumMod val="75000"/>
+                      <a:lumOff val="25000"/>
+                      <a:alpha val="10000"/>
+                    </a:prstClr>
+                  </a:solidFill>
+                </a:ln>
+                <a:effectLst>
+                  <a:outerShdw blurRad="9525" dist="25400" dir="14640000" algn="tl" rotWithShape="0">
+                    <a:prstClr val="black">
+                      <a:alpha val="30000"/>
+                    </a:prstClr>
+                  </a:outerShdw>
+                </a:effectLst>
+              </a:rPr>
+              <a:t> jak </a:t>
+            </a:r>
+            <a:r>
+              <a:rPr lang="pl-PL" dirty="0" err="1">
+                <a:ln>
+                  <a:solidFill>
+                    <a:prstClr val="black">
+                      <a:lumMod val="75000"/>
+                      <a:lumOff val="25000"/>
+                      <a:alpha val="10000"/>
+                    </a:prstClr>
+                  </a:solidFill>
+                </a:ln>
+                <a:effectLst>
+                  <a:outerShdw blurRad="9525" dist="25400" dir="14640000" algn="tl" rotWithShape="0">
+                    <a:prstClr val="black">
+                      <a:alpha val="30000"/>
+                    </a:prstClr>
+                  </a:outerShdw>
+                </a:effectLst>
+              </a:rPr>
+              <a:t>dziala</a:t>
+            </a:r>
+            <a:r>
+              <a:rPr lang="pl-PL" dirty="0">
+                <a:ln>
+                  <a:solidFill>
+                    <a:prstClr val="black">
+                      <a:lumMod val="75000"/>
+                      <a:lumOff val="25000"/>
+                      <a:alpha val="10000"/>
+                    </a:prstClr>
+                  </a:solidFill>
+                </a:ln>
+                <a:effectLst>
+                  <a:outerShdw blurRad="9525" dist="25400" dir="14640000" algn="tl" rotWithShape="0">
+                    <a:prstClr val="black">
+                      <a:alpha val="30000"/>
+                    </a:prstClr>
+                  </a:outerShdw>
+                </a:effectLst>
+              </a:rPr>
+              <a:t> tam razem z tym jak te </a:t>
+            </a:r>
+            <a:r>
+              <a:rPr lang="pl-PL" dirty="0" err="1">
+                <a:ln>
+                  <a:solidFill>
+                    <a:prstClr val="black">
+                      <a:lumMod val="75000"/>
+                      <a:lumOff val="25000"/>
+                      <a:alpha val="10000"/>
+                    </a:prstClr>
+                  </a:solidFill>
+                </a:ln>
+                <a:effectLst>
+                  <a:outerShdw blurRad="9525" dist="25400" dir="14640000" algn="tl" rotWithShape="0">
+                    <a:prstClr val="black">
+                      <a:alpha val="30000"/>
+                    </a:prstClr>
+                  </a:outerShdw>
+                </a:effectLst>
+              </a:rPr>
+              <a:t>wspolrzedne</a:t>
+            </a:r>
+            <a:r>
+              <a:rPr lang="pl-PL" dirty="0">
+                <a:ln>
+                  <a:solidFill>
+                    <a:prstClr val="black">
+                      <a:lumMod val="75000"/>
+                      <a:lumOff val="25000"/>
+                      <a:alpha val="10000"/>
+                    </a:prstClr>
+                  </a:solidFill>
+                </a:ln>
+                <a:effectLst>
+                  <a:outerShdw blurRad="9525" dist="25400" dir="14640000" algn="tl" rotWithShape="0">
+                    <a:prstClr val="black">
+                      <a:alpha val="30000"/>
+                    </a:prstClr>
+                  </a:outerShdw>
+                </a:effectLst>
+              </a:rPr>
+              <a:t> </a:t>
+            </a:r>
+            <a:r>
+              <a:rPr lang="pl-PL" dirty="0" err="1">
+                <a:ln>
+                  <a:solidFill>
+                    <a:prstClr val="black">
+                      <a:lumMod val="75000"/>
+                      <a:lumOff val="25000"/>
+                      <a:alpha val="10000"/>
+                    </a:prstClr>
+                  </a:solidFill>
+                </a:ln>
+                <a:effectLst>
+                  <a:outerShdw blurRad="9525" dist="25400" dir="14640000" algn="tl" rotWithShape="0">
+                    <a:prstClr val="black">
+                      <a:alpha val="30000"/>
+                    </a:prstClr>
+                  </a:outerShdw>
+                </a:effectLst>
+              </a:rPr>
+              <a:t>sa</a:t>
+            </a:r>
+            <a:r>
+              <a:rPr lang="pl-PL" dirty="0">
+                <a:ln>
+                  <a:solidFill>
+                    <a:prstClr val="black">
+                      <a:lumMod val="75000"/>
+                      <a:lumOff val="25000"/>
+                      <a:alpha val="10000"/>
+                    </a:prstClr>
+                  </a:solidFill>
+                </a:ln>
+                <a:effectLst>
+                  <a:outerShdw blurRad="9525" dist="25400" dir="14640000" algn="tl" rotWithShape="0">
+                    <a:prstClr val="black">
+                      <a:alpha val="30000"/>
+                    </a:prstClr>
+                  </a:outerShdw>
+                </a:effectLst>
+              </a:rPr>
+              <a:t> zamieniane na </a:t>
+            </a:r>
+            <a:r>
+              <a:rPr lang="pl-PL" dirty="0" err="1">
+                <a:ln>
+                  <a:solidFill>
+                    <a:prstClr val="black">
+                      <a:lumMod val="75000"/>
+                      <a:lumOff val="25000"/>
+                      <a:alpha val="10000"/>
+                    </a:prstClr>
+                  </a:solidFill>
+                </a:ln>
+                <a:effectLst>
+                  <a:outerShdw blurRad="9525" dist="25400" dir="14640000" algn="tl" rotWithShape="0">
+                    <a:prstClr val="black">
+                      <a:alpha val="30000"/>
+                    </a:prstClr>
+                  </a:outerShdw>
+                </a:effectLst>
+              </a:rPr>
+              <a:t>nazwe</a:t>
+            </a:r>
+            <a:r>
+              <a:rPr lang="pl-PL" dirty="0">
+                <a:ln>
+                  <a:solidFill>
+                    <a:prstClr val="black">
+                      <a:lumMod val="75000"/>
+                      <a:lumOff val="25000"/>
+                      <a:alpha val="10000"/>
+                    </a:prstClr>
+                  </a:solidFill>
+                </a:ln>
+                <a:effectLst>
+                  <a:outerShdw blurRad="9525" dist="25400" dir="14640000" algn="tl" rotWithShape="0">
+                    <a:prstClr val="black">
+                      <a:alpha val="30000"/>
+                    </a:prstClr>
+                  </a:outerShdw>
+                </a:effectLst>
+              </a:rPr>
+              <a:t> miasta itp. </a:t>
+            </a:r>
+          </a:p>
+        </p:txBody>
+      </p:sp>
+    </p:spTree>
+    <p:extLst>
+      <p:ext uri="{BB962C8B-B14F-4D97-AF65-F5344CB8AC3E}">
+        <p14:creationId xmlns:p14="http://schemas.microsoft.com/office/powerpoint/2010/main" val="3212077194"/>
+      </p:ext>
+    </p:extLst>
+  </p:cSld>
+  <p:clrMapOvr>
+    <a:masterClrMapping/>
+  </p:clrMapOvr>
+</p:sld>
+</file>
+
+<file path=ppt/slides/slide25.xml><?xml version="1.0" encoding="utf-8"?>
+<p:sld xmlns:a="http://schemas.openxmlformats.org/drawingml/2006/main" xmlns:r="http://schemas.openxmlformats.org/officeDocument/2006/relationships" xmlns:p="http://schemas.openxmlformats.org/presentationml/2006/main">
+  <p:cSld>
+    <p:spTree>
+      <p:nvGrpSpPr>
+        <p:cNvPr id="1" name=""/>
+        <p:cNvGrpSpPr/>
+        <p:nvPr/>
+      </p:nvGrpSpPr>
+      <p:grpSpPr>
+        <a:xfrm>
+          <a:off x="0" y="0"/>
+          <a:ext cx="0" cy="0"/>
+          <a:chOff x="0" y="0"/>
+          <a:chExt cx="0" cy="0"/>
+        </a:xfrm>
+      </p:grpSpPr>
+      <p:sp>
+        <p:nvSpPr>
+          <p:cNvPr id="2" name="Tytuł 1">
+            <a:extLst>
+              <a:ext uri="{FF2B5EF4-FFF2-40B4-BE49-F238E27FC236}">
+                <a16:creationId xmlns:a16="http://schemas.microsoft.com/office/drawing/2014/main" id="{26A9AB5A-4272-F863-AFED-718BB9082247}"/>
+              </a:ext>
+            </a:extLst>
+          </p:cNvPr>
+          <p:cNvSpPr>
+            <a:spLocks noGrp="1"/>
+          </p:cNvSpPr>
+          <p:nvPr>
+            <p:ph type="title"/>
+          </p:nvPr>
+        </p:nvSpPr>
+        <p:spPr/>
+        <p:txBody>
+          <a:bodyPr/>
+          <a:lstStyle/>
+          <a:p>
+            <a:r>
+              <a:rPr lang="pl-PL" dirty="0">
+                <a:ln>
+                  <a:solidFill>
+                    <a:prstClr val="black">
+                      <a:lumMod val="75000"/>
+                      <a:lumOff val="25000"/>
+                      <a:alpha val="10000"/>
+                    </a:prstClr>
+                  </a:solidFill>
+                </a:ln>
+                <a:effectLst>
+                  <a:outerShdw blurRad="9525" dist="25400" dir="14640000" algn="tl" rotWithShape="0">
+                    <a:prstClr val="black">
+                      <a:alpha val="30000"/>
+                    </a:prstClr>
+                  </a:outerShdw>
+                </a:effectLst>
+              </a:rPr>
+              <a:t>Wykorzystanie lokalizacji</a:t>
+            </a:r>
+            <a:endParaRPr lang="pl-PL" dirty="0"/>
+          </a:p>
+        </p:txBody>
+      </p:sp>
+      <p:pic>
+        <p:nvPicPr>
+          <p:cNvPr id="8" name="Symbol zastępczy zawartości 7" descr="Obraz zawierający tekst, zrzut ekranu, Czcionka&#10;&#10;Opis wygenerowany automatycznie">
+            <a:extLst>
+              <a:ext uri="{FF2B5EF4-FFF2-40B4-BE49-F238E27FC236}">
+                <a16:creationId xmlns:a16="http://schemas.microsoft.com/office/drawing/2014/main" id="{2C308CAF-9E8B-A3A1-8693-E270C47C6245}"/>
+              </a:ext>
+            </a:extLst>
+          </p:cNvPr>
+          <p:cNvPicPr>
+            <a:picLocks noGrp="1" noChangeAspect="1"/>
+          </p:cNvPicPr>
+          <p:nvPr>
+            <p:ph idx="1"/>
+          </p:nvPr>
+        </p:nvPicPr>
+        <p:blipFill>
+          <a:blip r:embed="rId2"/>
+          <a:stretch>
+            <a:fillRect/>
+          </a:stretch>
+        </p:blipFill>
+        <p:spPr>
+          <a:xfrm>
+            <a:off x="422141" y="3061864"/>
+            <a:ext cx="7877175" cy="1276350"/>
+          </a:xfrm>
+        </p:spPr>
+      </p:pic>
+      <p:pic>
+        <p:nvPicPr>
+          <p:cNvPr id="7" name="Picture 7" descr="A red location pin with a circle in the middle&#10;&#10;Description automatically generated">
+            <a:extLst>
+              <a:ext uri="{FF2B5EF4-FFF2-40B4-BE49-F238E27FC236}">
+                <a16:creationId xmlns:a16="http://schemas.microsoft.com/office/drawing/2014/main" id="{FEA52D90-C60C-8660-6CE6-1F1151981E32}"/>
+              </a:ext>
+            </a:extLst>
+          </p:cNvPr>
+          <p:cNvPicPr>
+            <a:picLocks noChangeAspect="1"/>
+          </p:cNvPicPr>
+          <p:nvPr/>
+        </p:nvPicPr>
+        <p:blipFill>
+          <a:blip r:embed="rId3">
+            <a:extLst>
+              <a:ext uri="{28A0092B-C50C-407E-A947-70E740481C1C}">
+                <a14:useLocalDpi xmlns:a14="http://schemas.microsoft.com/office/drawing/2010/main" val="0"/>
+              </a:ext>
+            </a:extLst>
+          </a:blip>
+          <a:stretch>
+            <a:fillRect/>
+          </a:stretch>
+        </p:blipFill>
+        <p:spPr>
+          <a:xfrm>
+            <a:off x="8124910" y="1808058"/>
+            <a:ext cx="3299400" cy="3247914"/>
+          </a:xfrm>
+          <a:prstGeom prst="rect">
+            <a:avLst/>
+          </a:prstGeom>
+        </p:spPr>
+      </p:pic>
+      <p:sp>
+        <p:nvSpPr>
+          <p:cNvPr id="11" name="TextBox 11">
+            <a:extLst>
+              <a:ext uri="{FF2B5EF4-FFF2-40B4-BE49-F238E27FC236}">
+                <a16:creationId xmlns:a16="http://schemas.microsoft.com/office/drawing/2014/main" id="{C6B66A61-1AE6-58F7-74B5-9473BA81C8E4}"/>
+              </a:ext>
+            </a:extLst>
+          </p:cNvPr>
+          <p:cNvSpPr txBox="1"/>
+          <p:nvPr/>
+        </p:nvSpPr>
+        <p:spPr>
+          <a:xfrm>
+            <a:off x="1436544" y="2521053"/>
+            <a:ext cx="6954402" cy="523220"/>
+          </a:xfrm>
+          <a:prstGeom prst="rect">
+            <a:avLst/>
+          </a:prstGeom>
+          <a:noFill/>
+        </p:spPr>
+        <p:txBody>
+          <a:bodyPr wrap="square" lIns="91440" tIns="45720" rIns="91440" bIns="45720" rtlCol="0" anchor="t">
+            <a:spAutoFit/>
+          </a:bodyPr>
+          <a:lstStyle/>
+          <a:p>
+            <a:r>
+              <a:rPr lang="pl-PL" sz="2800" dirty="0"/>
+              <a:t>Sprawdzenie uprawnień aplikacji</a:t>
+            </a:r>
+            <a:endParaRPr lang="pl-PL" dirty="0"/>
+          </a:p>
+        </p:txBody>
+      </p:sp>
+    </p:spTree>
+    <p:extLst>
+      <p:ext uri="{BB962C8B-B14F-4D97-AF65-F5344CB8AC3E}">
+        <p14:creationId xmlns:p14="http://schemas.microsoft.com/office/powerpoint/2010/main" val="2508872199"/>
+      </p:ext>
+    </p:extLst>
+  </p:cSld>
+  <p:clrMapOvr>
+    <a:masterClrMapping/>
+  </p:clrMapOvr>
+</p:sld>
+</file>
+
+<file path=ppt/slides/slide26.xml><?xml version="1.0" encoding="utf-8"?>
+<p:sld xmlns:a="http://schemas.openxmlformats.org/drawingml/2006/main" xmlns:r="http://schemas.openxmlformats.org/officeDocument/2006/relationships" xmlns:p="http://schemas.openxmlformats.org/presentationml/2006/main">
+  <p:cSld>
+    <p:spTree>
+      <p:nvGrpSpPr>
+        <p:cNvPr id="1" name=""/>
+        <p:cNvGrpSpPr/>
+        <p:nvPr/>
+      </p:nvGrpSpPr>
+      <p:grpSpPr>
+        <a:xfrm>
+          <a:off x="0" y="0"/>
+          <a:ext cx="0" cy="0"/>
+          <a:chOff x="0" y="0"/>
+          <a:chExt cx="0" cy="0"/>
+        </a:xfrm>
+      </p:grpSpPr>
+      <p:sp>
+        <p:nvSpPr>
+          <p:cNvPr id="2" name="Tytuł 1">
+            <a:extLst>
+              <a:ext uri="{FF2B5EF4-FFF2-40B4-BE49-F238E27FC236}">
+                <a16:creationId xmlns:a16="http://schemas.microsoft.com/office/drawing/2014/main" id="{7290EBE8-B550-D4D8-353A-E08A4B838078}"/>
+              </a:ext>
+            </a:extLst>
+          </p:cNvPr>
+          <p:cNvSpPr>
+            <a:spLocks noGrp="1"/>
+          </p:cNvSpPr>
+          <p:nvPr>
+            <p:ph type="title"/>
+          </p:nvPr>
+        </p:nvSpPr>
+        <p:spPr/>
+        <p:txBody>
+          <a:bodyPr/>
+          <a:lstStyle/>
+          <a:p>
+            <a:r>
+              <a:rPr lang="pl-PL" dirty="0">
+                <a:ln>
+                  <a:solidFill>
+                    <a:prstClr val="black">
+                      <a:lumMod val="75000"/>
+                      <a:lumOff val="25000"/>
+                      <a:alpha val="10000"/>
+                    </a:prstClr>
+                  </a:solidFill>
+                </a:ln>
+                <a:effectLst>
+                  <a:outerShdw blurRad="9525" dist="25400" dir="14640000" algn="tl" rotWithShape="0">
+                    <a:prstClr val="black">
+                      <a:alpha val="30000"/>
+                    </a:prstClr>
+                  </a:outerShdw>
+                </a:effectLst>
+              </a:rPr>
+              <a:t>Wykorzystanie lokalizacji</a:t>
+            </a:r>
+            <a:endParaRPr lang="pl-PL" dirty="0"/>
+          </a:p>
+        </p:txBody>
+      </p:sp>
+      <p:pic>
+        <p:nvPicPr>
+          <p:cNvPr id="7" name="Symbol zastępczy zawartości 6" descr="Obraz zawierający tekst, zrzut ekranu, Czcionka, oprogramowanie&#10;&#10;Opis wygenerowany automatycznie">
+            <a:extLst>
+              <a:ext uri="{FF2B5EF4-FFF2-40B4-BE49-F238E27FC236}">
+                <a16:creationId xmlns:a16="http://schemas.microsoft.com/office/drawing/2014/main" id="{A01C630D-94E9-B72D-ED54-6318120A5604}"/>
+              </a:ext>
+            </a:extLst>
+          </p:cNvPr>
+          <p:cNvPicPr>
+            <a:picLocks noGrp="1" noChangeAspect="1"/>
+          </p:cNvPicPr>
+          <p:nvPr>
+            <p:ph idx="1"/>
+          </p:nvPr>
+        </p:nvPicPr>
+        <p:blipFill>
+          <a:blip r:embed="rId2"/>
+          <a:stretch>
+            <a:fillRect/>
+          </a:stretch>
+        </p:blipFill>
+        <p:spPr>
+          <a:xfrm>
+            <a:off x="1290076" y="2004462"/>
+            <a:ext cx="9601200" cy="3514725"/>
+          </a:xfrm>
+        </p:spPr>
+      </p:pic>
+    </p:spTree>
+    <p:extLst>
+      <p:ext uri="{BB962C8B-B14F-4D97-AF65-F5344CB8AC3E}">
+        <p14:creationId xmlns:p14="http://schemas.microsoft.com/office/powerpoint/2010/main" val="911334357"/>
+      </p:ext>
+    </p:extLst>
+  </p:cSld>
+  <p:clrMapOvr>
+    <a:masterClrMapping/>
+  </p:clrMapOvr>
+</p:sld>
+</file>
+
+<file path=ppt/slides/slide27.xml><?xml version="1.0" encoding="utf-8"?>
+<p:sld xmlns:a="http://schemas.openxmlformats.org/drawingml/2006/main" xmlns:r="http://schemas.openxmlformats.org/officeDocument/2006/relationships" xmlns:p="http://schemas.openxmlformats.org/presentationml/2006/main">
+  <p:cSld>
+    <p:spTree>
+      <p:nvGrpSpPr>
+        <p:cNvPr id="1" name=""/>
+        <p:cNvGrpSpPr/>
+        <p:nvPr/>
+      </p:nvGrpSpPr>
+      <p:grpSpPr>
+        <a:xfrm>
+          <a:off x="0" y="0"/>
+          <a:ext cx="0" cy="0"/>
+          <a:chOff x="0" y="0"/>
+          <a:chExt cx="0" cy="0"/>
+        </a:xfrm>
+      </p:grpSpPr>
+      <p:pic>
+        <p:nvPicPr>
+          <p:cNvPr id="11" name="Picture 10" descr="A yellow sun with black background&#10;&#10;Description automatically generated">
+            <a:extLst>
+              <a:ext uri="{FF2B5EF4-FFF2-40B4-BE49-F238E27FC236}">
+                <a16:creationId xmlns:a16="http://schemas.microsoft.com/office/drawing/2014/main" id="{6758B9F0-4EAD-04A3-6DD6-5EEBBC165C96}"/>
+              </a:ext>
+            </a:extLst>
+          </p:cNvPr>
+          <p:cNvPicPr>
+            <a:picLocks noChangeAspect="1"/>
+          </p:cNvPicPr>
+          <p:nvPr/>
+        </p:nvPicPr>
+        <p:blipFill>
+          <a:blip r:embed="rId2">
+            <a:extLst>
+              <a:ext uri="{28A0092B-C50C-407E-A947-70E740481C1C}">
+                <a14:useLocalDpi xmlns:a14="http://schemas.microsoft.com/office/drawing/2010/main" val="0"/>
+              </a:ext>
+            </a:extLst>
+          </a:blip>
+          <a:stretch>
+            <a:fillRect/>
+          </a:stretch>
+        </p:blipFill>
+        <p:spPr>
+          <a:xfrm>
+            <a:off x="-582964" y="-579337"/>
+            <a:ext cx="1725966" cy="1725966"/>
+          </a:xfrm>
+          <a:prstGeom prst="rect">
+            <a:avLst/>
+          </a:prstGeom>
+        </p:spPr>
+      </p:pic>
+      <p:sp>
+        <p:nvSpPr>
+          <p:cNvPr id="2" name="Title 1">
+            <a:extLst>
+              <a:ext uri="{FF2B5EF4-FFF2-40B4-BE49-F238E27FC236}">
+                <a16:creationId xmlns:a16="http://schemas.microsoft.com/office/drawing/2014/main" id="{4652AB7B-027D-C765-D4EA-D50A06A0C5C0}"/>
+              </a:ext>
+            </a:extLst>
+          </p:cNvPr>
+          <p:cNvSpPr>
+            <a:spLocks noGrp="1"/>
+          </p:cNvSpPr>
+          <p:nvPr>
+            <p:ph type="ctrTitle"/>
+          </p:nvPr>
+        </p:nvSpPr>
+        <p:spPr>
+          <a:xfrm>
+            <a:off x="1370693" y="1718738"/>
+            <a:ext cx="9440034" cy="1828801"/>
+          </a:xfrm>
+        </p:spPr>
+        <p:txBody>
+          <a:bodyPr/>
+          <a:lstStyle/>
+          <a:p>
+            <a:r>
+              <a:rPr lang="pl-PL" dirty="0"/>
+              <a:t>Prezentacja działania aplikacji</a:t>
+            </a:r>
+            <a:endParaRPr lang="pl-PL" dirty="0">
+              <a:ln>
+                <a:solidFill>
+                  <a:prstClr val="black">
+                    <a:lumMod val="75000"/>
+                    <a:lumOff val="25000"/>
+                    <a:alpha val="10000"/>
+                  </a:prstClr>
+                </a:solidFill>
+              </a:ln>
+              <a:effectLst>
+                <a:outerShdw blurRad="9525" dist="25400" dir="14640000" algn="tl" rotWithShape="0">
+                  <a:prstClr val="black">
+                    <a:alpha val="30000"/>
+                  </a:prstClr>
+                </a:outerShdw>
+              </a:effectLst>
+            </a:endParaRPr>
+          </a:p>
+        </p:txBody>
+      </p:sp>
+      <p:sp>
+        <p:nvSpPr>
+          <p:cNvPr id="3" name="Subtitle 2">
+            <a:extLst>
+              <a:ext uri="{FF2B5EF4-FFF2-40B4-BE49-F238E27FC236}">
+                <a16:creationId xmlns:a16="http://schemas.microsoft.com/office/drawing/2014/main" id="{B621761A-B99C-DD9C-B836-6A1354073E4A}"/>
+              </a:ext>
+            </a:extLst>
+          </p:cNvPr>
+          <p:cNvSpPr>
+            <a:spLocks noGrp="1"/>
+          </p:cNvSpPr>
+          <p:nvPr>
+            <p:ph type="subTitle" idx="1"/>
+          </p:nvPr>
+        </p:nvSpPr>
+        <p:spPr>
+          <a:xfrm>
+            <a:off x="1416626" y="6214539"/>
+            <a:ext cx="8359627" cy="740822"/>
+          </a:xfrm>
+        </p:spPr>
+        <p:txBody>
+          <a:bodyPr/>
+          <a:lstStyle/>
+          <a:p>
+            <a:endParaRPr lang="pl-PL">
+              <a:ln>
+                <a:solidFill>
+                  <a:prstClr val="black">
+                    <a:lumMod val="75000"/>
+                    <a:lumOff val="25000"/>
+                    <a:alpha val="10000"/>
+                  </a:prstClr>
+                </a:solidFill>
+              </a:ln>
+              <a:effectLst>
+                <a:outerShdw blurRad="9525" dist="25400" dir="14640000" algn="tl" rotWithShape="0">
+                  <a:prstClr val="black">
+                    <a:alpha val="30000"/>
+                  </a:prstClr>
+                </a:outerShdw>
+              </a:effectLst>
+            </a:endParaRPr>
+          </a:p>
+        </p:txBody>
+      </p:sp>
+      <p:pic>
+        <p:nvPicPr>
+          <p:cNvPr id="13" name="Picture 12" descr="A blue cloud with rain drops&#10;&#10;Description automatically generated">
+            <a:extLst>
+              <a:ext uri="{FF2B5EF4-FFF2-40B4-BE49-F238E27FC236}">
+                <a16:creationId xmlns:a16="http://schemas.microsoft.com/office/drawing/2014/main" id="{D33654B6-7546-AF8B-43F8-A2184F237DF5}"/>
+              </a:ext>
+            </a:extLst>
+          </p:cNvPr>
+          <p:cNvPicPr>
+            <a:picLocks noChangeAspect="1"/>
+          </p:cNvPicPr>
+          <p:nvPr/>
+        </p:nvPicPr>
+        <p:blipFill>
+          <a:blip r:embed="rId3">
+            <a:extLst>
+              <a:ext uri="{28A0092B-C50C-407E-A947-70E740481C1C}">
+                <a14:useLocalDpi xmlns:a14="http://schemas.microsoft.com/office/drawing/2010/main" val="0"/>
+              </a:ext>
+            </a:extLst>
+          </a:blip>
+          <a:stretch>
+            <a:fillRect/>
+          </a:stretch>
+        </p:blipFill>
+        <p:spPr>
+          <a:xfrm>
+            <a:off x="9234718" y="283646"/>
+            <a:ext cx="2071609" cy="2071609"/>
+          </a:xfrm>
+          <a:prstGeom prst="rect">
+            <a:avLst/>
+          </a:prstGeom>
+        </p:spPr>
+      </p:pic>
+      <p:pic>
+        <p:nvPicPr>
+          <p:cNvPr id="15" name="Picture 14" descr="A thermometer with a red circle&#10;&#10;Description automatically generated">
+            <a:extLst>
+              <a:ext uri="{FF2B5EF4-FFF2-40B4-BE49-F238E27FC236}">
+                <a16:creationId xmlns:a16="http://schemas.microsoft.com/office/drawing/2014/main" id="{0D68F01F-8A9F-DEC9-346D-A7A5F91A206F}"/>
+              </a:ext>
+            </a:extLst>
+          </p:cNvPr>
+          <p:cNvPicPr>
+            <a:picLocks noChangeAspect="1"/>
+          </p:cNvPicPr>
+          <p:nvPr/>
+        </p:nvPicPr>
+        <p:blipFill>
+          <a:blip r:embed="rId4">
+            <a:extLst>
+              <a:ext uri="{28A0092B-C50C-407E-A947-70E740481C1C}">
+                <a14:useLocalDpi xmlns:a14="http://schemas.microsoft.com/office/drawing/2010/main" val="0"/>
+              </a:ext>
+            </a:extLst>
+          </a:blip>
+          <a:stretch>
+            <a:fillRect/>
+          </a:stretch>
+        </p:blipFill>
+        <p:spPr>
+          <a:xfrm rot="20616928">
+            <a:off x="379337" y="3633402"/>
+            <a:ext cx="2071919" cy="2071919"/>
+          </a:xfrm>
+          <a:prstGeom prst="rect">
+            <a:avLst/>
+          </a:prstGeom>
+        </p:spPr>
+      </p:pic>
+      <p:pic>
+        <p:nvPicPr>
+          <p:cNvPr id="17" name="Picture 16" descr="A green robot with two arms&#10;&#10;Description automatically generated">
+            <a:extLst>
+              <a:ext uri="{FF2B5EF4-FFF2-40B4-BE49-F238E27FC236}">
+                <a16:creationId xmlns:a16="http://schemas.microsoft.com/office/drawing/2014/main" id="{810F0172-0CF1-B0AC-8ED1-49993D0313F5}"/>
+              </a:ext>
+            </a:extLst>
+          </p:cNvPr>
+          <p:cNvPicPr>
+            <a:picLocks noChangeAspect="1"/>
+          </p:cNvPicPr>
+          <p:nvPr/>
+        </p:nvPicPr>
+        <p:blipFill>
+          <a:blip r:embed="rId5">
+            <a:extLst>
+              <a:ext uri="{28A0092B-C50C-407E-A947-70E740481C1C}">
+                <a14:useLocalDpi xmlns:a14="http://schemas.microsoft.com/office/drawing/2010/main" val="0"/>
+              </a:ext>
+            </a:extLst>
+          </a:blip>
+          <a:stretch>
+            <a:fillRect/>
+          </a:stretch>
+        </p:blipFill>
+        <p:spPr>
+          <a:xfrm>
+            <a:off x="8739117" y="4047108"/>
+            <a:ext cx="2071609" cy="2071609"/>
+          </a:xfrm>
+          <a:prstGeom prst="rect">
+            <a:avLst/>
+          </a:prstGeom>
+        </p:spPr>
+      </p:pic>
+    </p:spTree>
+    <p:extLst>
+      <p:ext uri="{BB962C8B-B14F-4D97-AF65-F5344CB8AC3E}">
+        <p14:creationId xmlns:p14="http://schemas.microsoft.com/office/powerpoint/2010/main" val="2399576122"/>
       </p:ext>
     </p:extLst>
   </p:cSld>

</xml_diff>